<commit_message>
Inclusão de regras da tela list pedidos de compra e inicio da tela detalhar pedido de compra.
</commit_message>
<xml_diff>
--- a/prototipo/PedidoDeCompra.pptx
+++ b/prototipo/PedidoDeCompra.pptx
@@ -2,12 +2,12 @@
 <file path=ppt/presentation.xml><?xml version="1.0" encoding="utf-8"?>
 <p:presentation xmlns:a="http://schemas.openxmlformats.org/drawingml/2006/main" xmlns:r="http://schemas.openxmlformats.org/officeDocument/2006/relationships" xmlns:p="http://schemas.openxmlformats.org/presentationml/2006/main" saveSubsetFonts="1">
   <p:sldMasterIdLst>
-    <p:sldMasterId id="2147483648" r:id="rId66"/>
-    <p:sldMasterId id="2147483660" r:id="rId67"/>
+    <p:sldMasterId id="2147483648" r:id="rId90"/>
+    <p:sldMasterId id="2147483660" r:id="rId91"/>
   </p:sldMasterIdLst>
   <p:sldIdLst>
-    <p:sldId id="256" r:id="rId68"/>
-    <p:sldId id="257" r:id="rId69"/>
+    <p:sldId id="256" r:id="rId92"/>
+    <p:sldId id="257" r:id="rId93"/>
   </p:sldIdLst>
   <p:sldSz cx="12192000" cy="6858000"/>
   <p:notesSz cx="6858000" cy="9144000"/>
@@ -106,7 +106,128 @@
       </a:defRPr>
     </a:lvl9pPr>
   </p:defaultTextStyle>
+  <p:extLst>
+    <p:ext uri="{EFAFB233-063F-42B5-8137-9DF3F51BA10A}">
+      <p15:sldGuideLst xmlns:p15="http://schemas.microsoft.com/office/powerpoint/2012/main"/>
+    </p:ext>
+  </p:extLst>
 </p:presentation>
+</file>
+
+<file path=ppt/commentAuthors.xml><?xml version="1.0" encoding="utf-8"?>
+<p:cmAuthorLst xmlns:a="http://schemas.openxmlformats.org/drawingml/2006/main" xmlns:r="http://schemas.openxmlformats.org/officeDocument/2006/relationships" xmlns:p="http://schemas.openxmlformats.org/presentationml/2006/main">
+  <p:cmAuthor id="1" name="Eric Silva" initials="ES" lastIdx="11" clrIdx="0">
+    <p:extLst>
+      <p:ext uri="{19B8F6BF-5375-455C-9EA6-DF929625EA0E}">
+        <p15:presenceInfo xmlns:p15="http://schemas.microsoft.com/office/powerpoint/2012/main" userId="ceafcd6f3c1941a0" providerId="Windows Live"/>
+      </p:ext>
+    </p:extLst>
+  </p:cmAuthor>
+</p:cmAuthorLst>
+</file>
+
+<file path=ppt/comments/comment1.xml><?xml version="1.0" encoding="utf-8"?>
+<p:cmLst xmlns:a="http://schemas.openxmlformats.org/drawingml/2006/main" xmlns:r="http://schemas.openxmlformats.org/officeDocument/2006/relationships" xmlns:p="http://schemas.openxmlformats.org/presentationml/2006/main">
+  <p:cm authorId="1" dt="2018-09-30T16:49:16.875" idx="1">
+    <p:pos x="2964" y="2407"/>
+    <p:text>A caixa da linha inteira é clicável, e quando acionada leva para a tela de detalhes do pedido de compra.</p:text>
+    <p:extLst>
+      <p:ext uri="{C676402C-5697-4E1C-873F-D02D1690AC5C}">
+        <p15:threadingInfo xmlns:p15="http://schemas.microsoft.com/office/powerpoint/2012/main" timeZoneBias="180"/>
+      </p:ext>
+    </p:extLst>
+  </p:cm>
+  <p:cm authorId="1" dt="2018-09-30T16:59:34.852" idx="3">
+    <p:pos x="4349" y="809"/>
+    <p:text>Os botões de limpar e pesquisar, tem efeito sob todos os filtros da tela, inclusive os recolhidos. (collapse)</p:text>
+    <p:extLst>
+      <p:ext uri="{C676402C-5697-4E1C-873F-D02D1690AC5C}">
+        <p15:threadingInfo xmlns:p15="http://schemas.microsoft.com/office/powerpoint/2012/main" timeZoneBias="180"/>
+      </p:ext>
+    </p:extLst>
+  </p:cm>
+  <p:cm authorId="1" dt="2018-09-30T17:01:55.804" idx="4">
+    <p:pos x="7303" y="2165"/>
+    <p:text>O cabeçalho inteiro tem função order by, por padrão a tela deverá ser montada com order by ASC.</p:text>
+    <p:extLst>
+      <p:ext uri="{C676402C-5697-4E1C-873F-D02D1690AC5C}">
+        <p15:threadingInfo xmlns:p15="http://schemas.microsoft.com/office/powerpoint/2012/main" timeZoneBias="180"/>
+      </p:ext>
+    </p:extLst>
+  </p:cm>
+  <p:cm authorId="1" dt="2018-09-30T17:04:30.068" idx="5">
+    <p:pos x="1051" y="3206"/>
+    <p:text>O contador deve ser atualizado de acordo com os filtros aplicados na tela, por padrão será exibido no formato "Exibindo &lt;total da página&gt; de &lt;total de registros&gt;"
+Exibir máximo  de 5 registros por página, quando existirem mais registros, paginar.</p:text>
+    <p:extLst>
+      <p:ext uri="{C676402C-5697-4E1C-873F-D02D1690AC5C}">
+        <p15:threadingInfo xmlns:p15="http://schemas.microsoft.com/office/powerpoint/2012/main" timeZoneBias="180"/>
+      </p:ext>
+    </p:extLst>
+  </p:cm>
+  <p:cm authorId="1" dt="2018-09-30T17:07:23.441" idx="6">
+    <p:pos x="3475" y="1589"/>
+    <p:text>Os filtros são aplicáveis a todas os registros, inclusve os paginados.</p:text>
+    <p:extLst>
+      <p:ext uri="{C676402C-5697-4E1C-873F-D02D1690AC5C}">
+        <p15:threadingInfo xmlns:p15="http://schemas.microsoft.com/office/powerpoint/2012/main" timeZoneBias="180"/>
+      </p:ext>
+    </p:extLst>
+  </p:cm>
+  <p:cm authorId="1" dt="2018-09-30T17:09:01.267" idx="7">
+    <p:pos x="2509" y="883"/>
+    <p:text>Quando inserido o texto da busca, disponibilizar a função de autocomplete quando digitados 3 caracteres o mais.</p:text>
+    <p:extLst>
+      <p:ext uri="{C676402C-5697-4E1C-873F-D02D1690AC5C}">
+        <p15:threadingInfo xmlns:p15="http://schemas.microsoft.com/office/powerpoint/2012/main" timeZoneBias="180"/>
+      </p:ext>
+    </p:extLst>
+  </p:cm>
+</p:cmLst>
+</file>
+
+<file path=ppt/comments/comment2.xml><?xml version="1.0" encoding="utf-8"?>
+<p:cmLst xmlns:a="http://schemas.openxmlformats.org/drawingml/2006/main" xmlns:r="http://schemas.openxmlformats.org/officeDocument/2006/relationships" xmlns:p="http://schemas.openxmlformats.org/presentationml/2006/main">
+  <p:cm authorId="1" dt="2018-09-30T17:28:06.196" idx="8">
+    <p:pos x="6337" y="732"/>
+    <p:text>Usuário  que criou o pedido de compra;
+Data e hora de criação do pedido, de compra;
+Data e hora da última modificação no pedido de compra;
+Em caso de pedidos clonados, as informações desta área devem estar associadas ao momento do clone.</p:text>
+    <p:extLst>
+      <p:ext uri="{C676402C-5697-4E1C-873F-D02D1690AC5C}">
+        <p15:threadingInfo xmlns:p15="http://schemas.microsoft.com/office/powerpoint/2012/main" timeZoneBias="180"/>
+      </p:ext>
+    </p:extLst>
+  </p:cm>
+  <p:cm authorId="1" dt="2018-09-30T17:31:24.210" idx="9">
+    <p:pos x="1948" y="385"/>
+    <p:text>No breadCrumb, é posssível voltar para a tela de listar pedidos de compra.</p:text>
+    <p:extLst>
+      <p:ext uri="{C676402C-5697-4E1C-873F-D02D1690AC5C}">
+        <p15:threadingInfo xmlns:p15="http://schemas.microsoft.com/office/powerpoint/2012/main" timeZoneBias="180"/>
+      </p:ext>
+    </p:extLst>
+  </p:cm>
+  <p:cm authorId="1" dt="2018-09-30T17:46:12.388" idx="10">
+    <p:pos x="2322" y="1674"/>
+    <p:text>O campo fornecedor tem autocomplete no preenchimento e poderá ter seu valor modificado até o envio do pedido ao fornecedor</p:text>
+    <p:extLst>
+      <p:ext uri="{C676402C-5697-4E1C-873F-D02D1690AC5C}">
+        <p15:threadingInfo xmlns:p15="http://schemas.microsoft.com/office/powerpoint/2012/main" timeZoneBias="180"/>
+      </p:ext>
+    </p:extLst>
+  </p:cm>
+  <p:cm authorId="1" dt="2018-09-30T17:52:31.321" idx="11">
+    <p:pos x="3622" y="1678"/>
+    <p:text>Data do pedido de compra junto ao fornecedor, este campo abrirá para seleção no datePicker, e não permitira exibir apenas datas anteriores a data de criação do pedido.</p:text>
+    <p:extLst>
+      <p:ext uri="{C676402C-5697-4E1C-873F-D02D1690AC5C}">
+        <p15:threadingInfo xmlns:p15="http://schemas.microsoft.com/office/powerpoint/2012/main" timeZoneBias="180"/>
+      </p:ext>
+    </p:extLst>
+  </p:cm>
+</p:cmLst>
 </file>
 
 <file path=ppt/slideLayouts/slideLayout1.xml><?xml version="1.0" encoding="utf-8"?>
@@ -256,7 +377,7 @@
           <a:p>
             <a:fld id="{8F9EAF97-829A-4C4C-B030-0EFD85FDA843}" type="datetimeFigureOut">
               <a:rPr lang="pt-BR" smtClean="0"/>
-              <a:t>23/09/2018</a:t>
+              <a:t>30/09/2018</a:t>
             </a:fld>
             <a:endParaRPr lang="pt-BR"/>
           </a:p>
@@ -454,7 +575,7 @@
           <a:p>
             <a:fld id="{8F9EAF97-829A-4C4C-B030-0EFD85FDA843}" type="datetimeFigureOut">
               <a:rPr lang="pt-BR" smtClean="0"/>
-              <a:t>23/09/2018</a:t>
+              <a:t>30/09/2018</a:t>
             </a:fld>
             <a:endParaRPr lang="pt-BR"/>
           </a:p>
@@ -662,7 +783,7 @@
           <a:p>
             <a:fld id="{8F9EAF97-829A-4C4C-B030-0EFD85FDA843}" type="datetimeFigureOut">
               <a:rPr lang="pt-BR" smtClean="0"/>
-              <a:t>23/09/2018</a:t>
+              <a:t>30/09/2018</a:t>
             </a:fld>
             <a:endParaRPr lang="pt-BR"/>
           </a:p>
@@ -1578,7 +1699,7 @@
           <a:p>
             <a:fld id="{8F9EAF97-829A-4C4C-B030-0EFD85FDA843}" type="datetimeFigureOut">
               <a:rPr lang="pt-BR" smtClean="0"/>
-              <a:t>23/09/2018</a:t>
+              <a:t>30/09/2018</a:t>
             </a:fld>
             <a:endParaRPr lang="pt-BR"/>
           </a:p>
@@ -1853,7 +1974,7 @@
           <a:p>
             <a:fld id="{8F9EAF97-829A-4C4C-B030-0EFD85FDA843}" type="datetimeFigureOut">
               <a:rPr lang="pt-BR" smtClean="0"/>
-              <a:t>23/09/2018</a:t>
+              <a:t>30/09/2018</a:t>
             </a:fld>
             <a:endParaRPr lang="pt-BR"/>
           </a:p>
@@ -2118,7 +2239,7 @@
           <a:p>
             <a:fld id="{8F9EAF97-829A-4C4C-B030-0EFD85FDA843}" type="datetimeFigureOut">
               <a:rPr lang="pt-BR" smtClean="0"/>
-              <a:t>23/09/2018</a:t>
+              <a:t>30/09/2018</a:t>
             </a:fld>
             <a:endParaRPr lang="pt-BR"/>
           </a:p>
@@ -2530,7 +2651,7 @@
           <a:p>
             <a:fld id="{8F9EAF97-829A-4C4C-B030-0EFD85FDA843}" type="datetimeFigureOut">
               <a:rPr lang="pt-BR" smtClean="0"/>
-              <a:t>23/09/2018</a:t>
+              <a:t>30/09/2018</a:t>
             </a:fld>
             <a:endParaRPr lang="pt-BR"/>
           </a:p>
@@ -2671,7 +2792,7 @@
           <a:p>
             <a:fld id="{8F9EAF97-829A-4C4C-B030-0EFD85FDA843}" type="datetimeFigureOut">
               <a:rPr lang="pt-BR" smtClean="0"/>
-              <a:t>23/09/2018</a:t>
+              <a:t>30/09/2018</a:t>
             </a:fld>
             <a:endParaRPr lang="pt-BR"/>
           </a:p>
@@ -2784,7 +2905,7 @@
           <a:p>
             <a:fld id="{8F9EAF97-829A-4C4C-B030-0EFD85FDA843}" type="datetimeFigureOut">
               <a:rPr lang="pt-BR" smtClean="0"/>
-              <a:t>23/09/2018</a:t>
+              <a:t>30/09/2018</a:t>
             </a:fld>
             <a:endParaRPr lang="pt-BR"/>
           </a:p>
@@ -3095,7 +3216,7 @@
           <a:p>
             <a:fld id="{8F9EAF97-829A-4C4C-B030-0EFD85FDA843}" type="datetimeFigureOut">
               <a:rPr lang="pt-BR" smtClean="0"/>
-              <a:t>23/09/2018</a:t>
+              <a:t>30/09/2018</a:t>
             </a:fld>
             <a:endParaRPr lang="pt-BR"/>
           </a:p>
@@ -3383,7 +3504,7 @@
           <a:p>
             <a:fld id="{8F9EAF97-829A-4C4C-B030-0EFD85FDA843}" type="datetimeFigureOut">
               <a:rPr lang="pt-BR" smtClean="0"/>
-              <a:t>23/09/2018</a:t>
+              <a:t>30/09/2018</a:t>
             </a:fld>
             <a:endParaRPr lang="pt-BR"/>
           </a:p>
@@ -3624,7 +3745,7 @@
           <a:p>
             <a:fld id="{8F9EAF97-829A-4C4C-B030-0EFD85FDA843}" type="datetimeFigureOut">
               <a:rPr lang="pt-BR" smtClean="0"/>
-              <a:t>23/09/2018</a:t>
+              <a:t>30/09/2018</a:t>
             </a:fld>
             <a:endParaRPr lang="pt-BR"/>
           </a:p>
@@ -4425,7 +4546,7 @@
         <p:spPr>
           <a:xfrm>
             <a:off x="602776" y="835717"/>
-            <a:ext cx="2138599" cy="353943"/>
+            <a:ext cx="2241191" cy="353943"/>
           </a:xfrm>
           <a:prstGeom prst="rect">
             <a:avLst/>
@@ -4446,7 +4567,7 @@
                 <a:ea typeface="Segoe UI" pitchFamily="34" charset="0"/>
                 <a:cs typeface="Segoe UI Semibold" panose="020B0702040204020203" pitchFamily="34" charset="0"/>
               </a:rPr>
-              <a:t>Pedido de Compra</a:t>
+              <a:t>Pedidos de Compra</a:t>
             </a:r>
           </a:p>
         </p:txBody>
@@ -4487,7 +4608,7 @@
             <p:cNvSpPr/>
             <p:nvPr>
               <p:custDataLst>
-                <p:custData r:id="rId21"/>
+                <p:custData r:id="rId25"/>
               </p:custDataLst>
             </p:nvPr>
           </p:nvSpPr>
@@ -4558,12 +4679,12 @@
             </p:cNvPicPr>
             <p:nvPr>
               <p:custDataLst>
-                <p:custData r:id="rId22"/>
+                <p:custData r:id="rId26"/>
               </p:custDataLst>
             </p:nvPr>
           </p:nvPicPr>
           <p:blipFill>
-            <a:blip r:embed="rId24" cstate="print">
+            <a:blip r:embed="rId28" cstate="print">
               <a:duotone>
                 <a:prstClr val="black"/>
                 <a:srgbClr val="002D73">
@@ -4717,7 +4838,7 @@
                 </a:solidFill>
                 <a:latin typeface="+mj-lt"/>
               </a:rPr>
-              <a:t>Pesquisa por Número do Pedido, Fornecedor...</a:t>
+              <a:t>Pesquisa por Número do Pedido ou Parte do nome do Fornecedor...</a:t>
             </a:r>
           </a:p>
         </p:txBody>
@@ -4874,7 +4995,7 @@
         </p:nvSpPr>
         <p:spPr>
           <a:xfrm rot="10800000">
-            <a:off x="957529" y="2202882"/>
+            <a:off x="959910" y="2214787"/>
             <a:ext cx="108000" cy="68400"/>
           </a:xfrm>
           <a:prstGeom prst="triangle">
@@ -4996,7 +5117,7 @@
         </p:nvSpPr>
         <p:spPr>
           <a:xfrm>
-            <a:off x="2295607" y="2442335"/>
+            <a:off x="1985899" y="2442335"/>
             <a:ext cx="1278174" cy="307063"/>
           </a:xfrm>
           <a:prstGeom prst="roundRect">
@@ -5068,7 +5189,7 @@
         </p:nvSpPr>
         <p:spPr>
           <a:xfrm>
-            <a:off x="793637" y="2480435"/>
+            <a:off x="896873" y="2480435"/>
             <a:ext cx="482824" cy="215444"/>
           </a:xfrm>
           <a:prstGeom prst="rect">
@@ -5114,7 +5235,7 @@
         </p:nvSpPr>
         <p:spPr>
           <a:xfrm>
-            <a:off x="3976700" y="2442335"/>
+            <a:off x="3666992" y="2442335"/>
             <a:ext cx="1278174" cy="307063"/>
           </a:xfrm>
           <a:prstGeom prst="roundRect">
@@ -5186,7 +5307,7 @@
         </p:nvSpPr>
         <p:spPr>
           <a:xfrm>
-            <a:off x="3573781" y="2478942"/>
+            <a:off x="3264073" y="2478942"/>
             <a:ext cx="380232" cy="215444"/>
           </a:xfrm>
           <a:prstGeom prst="rect">
@@ -5233,7 +5354,7 @@
           </p:nvPr>
         </p:nvPicPr>
         <p:blipFill>
-          <a:blip r:embed="rId25" cstate="print">
+          <a:blip r:embed="rId29" cstate="print">
             <a:duotone>
               <a:prstClr val="black"/>
               <a:srgbClr val="004080">
@@ -5254,7 +5375,7 @@
         </p:blipFill>
         <p:spPr bwMode="auto">
           <a:xfrm rot="17176203" flipH="1">
-            <a:off x="5405960" y="2514772"/>
+            <a:off x="5096252" y="2514772"/>
             <a:ext cx="162187" cy="162187"/>
           </a:xfrm>
           <a:prstGeom prst="rect">
@@ -5291,7 +5412,7 @@
         </p:nvSpPr>
         <p:spPr>
           <a:xfrm>
-            <a:off x="2295607" y="2878878"/>
+            <a:off x="1985899" y="2878878"/>
             <a:ext cx="1278174" cy="307063"/>
           </a:xfrm>
           <a:prstGeom prst="roundRect">
@@ -5360,7 +5481,7 @@
         </p:nvSpPr>
         <p:spPr>
           <a:xfrm>
-            <a:off x="793637" y="2916978"/>
+            <a:off x="896873" y="2916978"/>
             <a:ext cx="710451" cy="215444"/>
           </a:xfrm>
           <a:prstGeom prst="rect">
@@ -5406,7 +5527,7 @@
         </p:nvSpPr>
         <p:spPr>
           <a:xfrm>
-            <a:off x="3976700" y="2878878"/>
+            <a:off x="3666992" y="2878878"/>
             <a:ext cx="1278174" cy="307063"/>
           </a:xfrm>
           <a:prstGeom prst="roundRect">
@@ -5475,7 +5596,7 @@
         </p:nvSpPr>
         <p:spPr>
           <a:xfrm>
-            <a:off x="3573781" y="2915485"/>
+            <a:off x="3264073" y="2915485"/>
             <a:ext cx="380232" cy="215444"/>
           </a:xfrm>
           <a:prstGeom prst="rect">
@@ -5522,7 +5643,7 @@
           </p:nvPr>
         </p:nvPicPr>
         <p:blipFill>
-          <a:blip r:embed="rId25" cstate="print">
+          <a:blip r:embed="rId29" cstate="print">
             <a:duotone>
               <a:prstClr val="black"/>
               <a:srgbClr val="004080">
@@ -5543,7 +5664,7 @@
         </p:blipFill>
         <p:spPr bwMode="auto">
           <a:xfrm rot="17176203" flipH="1">
-            <a:off x="5409714" y="2949270"/>
+            <a:off x="5100006" y="2949270"/>
             <a:ext cx="162187" cy="162187"/>
           </a:xfrm>
           <a:prstGeom prst="rect">
@@ -5577,14 +5698,14 @@
           <p:nvPr>
             <p:extLst>
               <p:ext uri="{D42A27DB-BD31-4B8C-83A1-F6EECF244321}">
-                <p14:modId xmlns:p14="http://schemas.microsoft.com/office/powerpoint/2010/main" val="1548288464"/>
+                <p14:modId xmlns:p14="http://schemas.microsoft.com/office/powerpoint/2010/main" val="3657559629"/>
               </p:ext>
             </p:extLst>
           </p:nvPr>
         </p:nvGraphicFramePr>
         <p:xfrm>
           <a:off x="711200" y="3704998"/>
-          <a:ext cx="11366502" cy="1483360"/>
+          <a:ext cx="11384282" cy="1483360"/>
         </p:xfrm>
         <a:graphic>
           <a:graphicData uri="http://schemas.openxmlformats.org/drawingml/2006/table">
@@ -5593,7 +5714,7 @@
                 <a:tableStyleId>{5940675A-B579-460E-94D1-54222C63F5DA}</a:tableStyleId>
               </a:tblPr>
               <a:tblGrid>
-                <a:gridCol w="685800">
+                <a:gridCol w="703580">
                   <a:extLst>
                     <a:ext uri="{9D8B030D-6E8A-4147-A177-3AD203B41FA5}">
                       <a16:colId xmlns:a16="http://schemas.microsoft.com/office/drawing/2014/main" val="1586994285"/>
@@ -5974,9 +6095,9 @@
                     <a:lstStyle/>
                     <a:p>
                       <a:r>
-                        <a:rPr lang="pt-BR" sz="1100" b="1" dirty="0">
+                        <a:rPr lang="pt-BR" sz="1100" b="0" dirty="0">
                           <a:solidFill>
-                            <a:srgbClr val="003F7F"/>
+                            <a:schemeClr val="tx1"/>
                           </a:solidFill>
                           <a:latin typeface="Arial" panose="020B0604020202020204" pitchFamily="34" charset="0"/>
                           <a:cs typeface="Arial" panose="020B0604020202020204" pitchFamily="34" charset="0"/>
@@ -6341,9 +6462,9 @@
                     <a:lstStyle/>
                     <a:p>
                       <a:r>
-                        <a:rPr lang="pt-BR" sz="1100" b="1" dirty="0">
+                        <a:rPr lang="pt-BR" sz="1100" b="0" dirty="0">
                           <a:solidFill>
-                            <a:srgbClr val="003F7F"/>
+                            <a:schemeClr val="tx1"/>
                           </a:solidFill>
                           <a:latin typeface="Arial" panose="020B0604020202020204" pitchFamily="34" charset="0"/>
                           <a:cs typeface="Arial" panose="020B0604020202020204" pitchFamily="34" charset="0"/>
@@ -6738,9 +6859,9 @@
                     <a:lstStyle/>
                     <a:p>
                       <a:r>
-                        <a:rPr lang="pt-BR" sz="1100" b="1" dirty="0">
+                        <a:rPr lang="pt-BR" sz="1100" b="0" dirty="0">
                           <a:solidFill>
-                            <a:srgbClr val="003F7F"/>
+                            <a:schemeClr val="tx1"/>
                           </a:solidFill>
                           <a:latin typeface="Arial" panose="020B0604020202020204" pitchFamily="34" charset="0"/>
                           <a:cs typeface="Arial" panose="020B0604020202020204" pitchFamily="34" charset="0"/>
@@ -7123,7 +7244,7 @@
         <p:spPr>
           <a:xfrm>
             <a:off x="645920" y="5363709"/>
-            <a:ext cx="827471" cy="215444"/>
+            <a:ext cx="1157689" cy="215444"/>
           </a:xfrm>
           <a:prstGeom prst="rect">
             <a:avLst/>
@@ -7147,8 +7268,514 @@
                 <a:ea typeface="Segoe UI" pitchFamily="34" charset="0"/>
                 <a:cs typeface="Arial" panose="020B0604020202020204" pitchFamily="34" charset="0"/>
               </a:rPr>
-              <a:t>3 Records</a:t>
+              <a:t>Exibindo 3 de 5</a:t>
             </a:r>
+          </a:p>
+        </p:txBody>
+      </p:sp>
+      <p:sp>
+        <p:nvSpPr>
+          <p:cNvPr id="26" name="Content">
+            <a:extLst>
+              <a:ext uri="{FF2B5EF4-FFF2-40B4-BE49-F238E27FC236}">
+                <a16:creationId xmlns:a16="http://schemas.microsoft.com/office/drawing/2014/main" id="{CFAC0E9A-F42F-40C3-9AD9-9C2E9061F36A}"/>
+              </a:ext>
+            </a:extLst>
+          </p:cNvPr>
+          <p:cNvSpPr txBox="1"/>
+          <p:nvPr>
+            <p:custDataLst>
+              <p:custData r:id="rId21"/>
+            </p:custDataLst>
+          </p:nvPr>
+        </p:nvSpPr>
+        <p:spPr>
+          <a:xfrm>
+            <a:off x="5860028" y="2423593"/>
+            <a:ext cx="583814" cy="215444"/>
+          </a:xfrm>
+          <a:prstGeom prst="rect">
+            <a:avLst/>
+          </a:prstGeom>
+          <a:noFill/>
+        </p:spPr>
+        <p:txBody>
+          <a:bodyPr wrap="none" lIns="91440" tIns="18288" rIns="91440" bIns="27432" rtlCol="0" anchor="ctr" anchorCtr="0">
+            <a:spAutoFit/>
+          </a:bodyPr>
+          <a:lstStyle/>
+          <a:p>
+            <a:r>
+              <a:rPr lang="en-US" sz="1100" dirty="0">
+                <a:solidFill>
+                  <a:srgbClr val="000000"/>
+                </a:solidFill>
+                <a:latin typeface="Arial" panose="020B0604020202020204" pitchFamily="34" charset="0"/>
+                <a:ea typeface="Segoe UI" pitchFamily="34" charset="0"/>
+                <a:cs typeface="Arial" panose="020B0604020202020204" pitchFamily="34" charset="0"/>
+              </a:rPr>
+              <a:t>Status</a:t>
+            </a:r>
+          </a:p>
+        </p:txBody>
+      </p:sp>
+      <p:grpSp>
+        <p:nvGrpSpPr>
+          <p:cNvPr id="2" name="Agrupar 1">
+            <a:extLst>
+              <a:ext uri="{FF2B5EF4-FFF2-40B4-BE49-F238E27FC236}">
+                <a16:creationId xmlns:a16="http://schemas.microsoft.com/office/drawing/2014/main" id="{74DCBD05-558F-48DF-A97E-567208D69416}"/>
+              </a:ext>
+            </a:extLst>
+          </p:cNvPr>
+          <p:cNvGrpSpPr/>
+          <p:nvPr>
+            <p:custDataLst>
+              <p:custData r:id="rId22"/>
+            </p:custDataLst>
+          </p:nvPr>
+        </p:nvGrpSpPr>
+        <p:grpSpPr>
+          <a:xfrm>
+            <a:off x="6860566" y="2385493"/>
+            <a:ext cx="1278174" cy="307063"/>
+            <a:chOff x="6860566" y="2385493"/>
+            <a:chExt cx="1278174" cy="307063"/>
+          </a:xfrm>
+        </p:grpSpPr>
+        <p:sp>
+          <p:nvSpPr>
+            <p:cNvPr id="25" name="Retângulo: Cantos Arredondados 24">
+              <a:extLst>
+                <a:ext uri="{FF2B5EF4-FFF2-40B4-BE49-F238E27FC236}">
+                  <a16:creationId xmlns:a16="http://schemas.microsoft.com/office/drawing/2014/main" id="{E5F5C176-0D65-4E21-9FA1-F03BFF276C62}"/>
+                </a:ext>
+              </a:extLst>
+            </p:cNvPr>
+            <p:cNvSpPr/>
+            <p:nvPr>
+              <p:custDataLst>
+                <p:custData r:id="rId24"/>
+              </p:custDataLst>
+            </p:nvPr>
+          </p:nvSpPr>
+          <p:spPr>
+            <a:xfrm>
+              <a:off x="6860566" y="2385493"/>
+              <a:ext cx="1278174" cy="307063"/>
+            </a:xfrm>
+            <a:prstGeom prst="roundRect">
+              <a:avLst>
+                <a:gd name="adj" fmla="val 3212"/>
+              </a:avLst>
+            </a:prstGeom>
+            <a:noFill/>
+            <a:ln>
+              <a:solidFill>
+                <a:srgbClr val="D4D4D4"/>
+              </a:solidFill>
+            </a:ln>
+            <a:effectLst>
+              <a:outerShdw blurRad="12700" algn="ctr" rotWithShape="0">
+                <a:prstClr val="black">
+                  <a:alpha val="31000"/>
+                </a:prstClr>
+              </a:outerShdw>
+            </a:effectLst>
+          </p:spPr>
+          <p:style>
+            <a:lnRef idx="2">
+              <a:schemeClr val="accent1">
+                <a:shade val="50000"/>
+              </a:schemeClr>
+            </a:lnRef>
+            <a:fillRef idx="1">
+              <a:schemeClr val="accent1"/>
+            </a:fillRef>
+            <a:effectRef idx="0">
+              <a:schemeClr val="accent1"/>
+            </a:effectRef>
+            <a:fontRef idx="minor">
+              <a:schemeClr val="lt1"/>
+            </a:fontRef>
+          </p:style>
+          <p:txBody>
+            <a:bodyPr rtlCol="0" anchor="ctr"/>
+            <a:lstStyle/>
+            <a:p>
+              <a:r>
+                <a:rPr lang="pt-BR" sz="1300" dirty="0">
+                  <a:solidFill>
+                    <a:srgbClr val="757575"/>
+                  </a:solidFill>
+                  <a:latin typeface="+mj-lt"/>
+                </a:rPr>
+                <a:t>Pendente</a:t>
+              </a:r>
+            </a:p>
+          </p:txBody>
+        </p:sp>
+        <p:sp>
+          <p:nvSpPr>
+            <p:cNvPr id="29" name="DownArrow">
+              <a:extLst>
+                <a:ext uri="{FF2B5EF4-FFF2-40B4-BE49-F238E27FC236}">
+                  <a16:creationId xmlns:a16="http://schemas.microsoft.com/office/drawing/2014/main" id="{366B1BEE-3551-4502-973B-10784F8B220A}"/>
+                </a:ext>
+              </a:extLst>
+            </p:cNvPr>
+            <p:cNvSpPr>
+              <a:spLocks noChangeAspect="1"/>
+            </p:cNvSpPr>
+            <p:nvPr/>
+          </p:nvSpPr>
+          <p:spPr>
+            <a:xfrm rot="10800000">
+              <a:off x="7985843" y="2537897"/>
+              <a:ext cx="81307" cy="48767"/>
+            </a:xfrm>
+            <a:prstGeom prst="triangle">
+              <a:avLst/>
+            </a:prstGeom>
+            <a:solidFill>
+              <a:srgbClr val="FFFFFF">
+                <a:lumMod val="75000"/>
+              </a:srgbClr>
+            </a:solidFill>
+            <a:ln>
+              <a:noFill/>
+            </a:ln>
+          </p:spPr>
+          <p:style>
+            <a:lnRef idx="2">
+              <a:srgbClr val="4F81BD">
+                <a:shade val="50000"/>
+              </a:srgbClr>
+            </a:lnRef>
+            <a:fillRef idx="1">
+              <a:srgbClr val="4F81BD"/>
+            </a:fillRef>
+            <a:effectRef idx="0">
+              <a:srgbClr val="4F81BD"/>
+            </a:effectRef>
+            <a:fontRef idx="minor">
+              <a:srgbClr val="000000"/>
+            </a:fontRef>
+          </p:style>
+          <p:txBody>
+            <a:bodyPr wrap="square" rtlCol="0" anchor="ctr"/>
+            <a:lstStyle/>
+            <a:p>
+              <a:pPr algn="ctr"/>
+              <a:endParaRPr lang="en-US" sz="2400" dirty="0"/>
+            </a:p>
+          </p:txBody>
+        </p:sp>
+      </p:grpSp>
+      <p:sp>
+        <p:nvSpPr>
+          <p:cNvPr id="32" name="MouseClick">
+            <a:extLst>
+              <a:ext uri="{FF2B5EF4-FFF2-40B4-BE49-F238E27FC236}">
+                <a16:creationId xmlns:a16="http://schemas.microsoft.com/office/drawing/2014/main" id="{8C20FB95-7DAC-4AB1-AE1A-4DE1EA7F9EC3}"/>
+              </a:ext>
+            </a:extLst>
+          </p:cNvPr>
+          <p:cNvSpPr/>
+          <p:nvPr>
+            <p:custDataLst>
+              <p:custData r:id="rId23"/>
+            </p:custDataLst>
+          </p:nvPr>
+        </p:nvSpPr>
+        <p:spPr>
+          <a:xfrm rot="20359169">
+            <a:off x="5898899" y="3067770"/>
+            <a:ext cx="151053" cy="247694"/>
+          </a:xfrm>
+          <a:custGeom>
+            <a:avLst/>
+            <a:gdLst>
+              <a:gd name="connsiteX0" fmla="*/ 0 w 592890"/>
+              <a:gd name="connsiteY0" fmla="*/ 806746 h 997971"/>
+              <a:gd name="connsiteX1" fmla="*/ 296445 w 592890"/>
+              <a:gd name="connsiteY1" fmla="*/ 0 h 997971"/>
+              <a:gd name="connsiteX2" fmla="*/ 592890 w 592890"/>
+              <a:gd name="connsiteY2" fmla="*/ 806746 h 997971"/>
+              <a:gd name="connsiteX3" fmla="*/ 386188 w 592890"/>
+              <a:gd name="connsiteY3" fmla="*/ 806746 h 997971"/>
+              <a:gd name="connsiteX4" fmla="*/ 386188 w 592890"/>
+              <a:gd name="connsiteY4" fmla="*/ 997971 h 997971"/>
+              <a:gd name="connsiteX5" fmla="*/ 206702 w 592890"/>
+              <a:gd name="connsiteY5" fmla="*/ 997971 h 997971"/>
+              <a:gd name="connsiteX6" fmla="*/ 206702 w 592890"/>
+              <a:gd name="connsiteY6" fmla="*/ 806746 h 997971"/>
+              <a:gd name="connsiteX7" fmla="*/ 0 w 592890"/>
+              <a:gd name="connsiteY7" fmla="*/ 806746 h 997971"/>
+              <a:gd name="connsiteX0" fmla="*/ 0 w 592890"/>
+              <a:gd name="connsiteY0" fmla="*/ 806746 h 997971"/>
+              <a:gd name="connsiteX1" fmla="*/ 296445 w 592890"/>
+              <a:gd name="connsiteY1" fmla="*/ 0 h 997971"/>
+              <a:gd name="connsiteX2" fmla="*/ 592890 w 592890"/>
+              <a:gd name="connsiteY2" fmla="*/ 806746 h 997971"/>
+              <a:gd name="connsiteX3" fmla="*/ 386188 w 592890"/>
+              <a:gd name="connsiteY3" fmla="*/ 766438 h 997971"/>
+              <a:gd name="connsiteX4" fmla="*/ 386188 w 592890"/>
+              <a:gd name="connsiteY4" fmla="*/ 997971 h 997971"/>
+              <a:gd name="connsiteX5" fmla="*/ 206702 w 592890"/>
+              <a:gd name="connsiteY5" fmla="*/ 997971 h 997971"/>
+              <a:gd name="connsiteX6" fmla="*/ 206702 w 592890"/>
+              <a:gd name="connsiteY6" fmla="*/ 806746 h 997971"/>
+              <a:gd name="connsiteX7" fmla="*/ 0 w 592890"/>
+              <a:gd name="connsiteY7" fmla="*/ 806746 h 997971"/>
+              <a:gd name="connsiteX0" fmla="*/ 0 w 592890"/>
+              <a:gd name="connsiteY0" fmla="*/ 806746 h 997971"/>
+              <a:gd name="connsiteX1" fmla="*/ 296445 w 592890"/>
+              <a:gd name="connsiteY1" fmla="*/ 0 h 997971"/>
+              <a:gd name="connsiteX2" fmla="*/ 592890 w 592890"/>
+              <a:gd name="connsiteY2" fmla="*/ 806746 h 997971"/>
+              <a:gd name="connsiteX3" fmla="*/ 386188 w 592890"/>
+              <a:gd name="connsiteY3" fmla="*/ 766438 h 997971"/>
+              <a:gd name="connsiteX4" fmla="*/ 386188 w 592890"/>
+              <a:gd name="connsiteY4" fmla="*/ 997971 h 997971"/>
+              <a:gd name="connsiteX5" fmla="*/ 206702 w 592890"/>
+              <a:gd name="connsiteY5" fmla="*/ 997971 h 997971"/>
+              <a:gd name="connsiteX6" fmla="*/ 206702 w 592890"/>
+              <a:gd name="connsiteY6" fmla="*/ 764057 h 997971"/>
+              <a:gd name="connsiteX7" fmla="*/ 0 w 592890"/>
+              <a:gd name="connsiteY7" fmla="*/ 806746 h 997971"/>
+              <a:gd name="connsiteX0" fmla="*/ 0 w 592890"/>
+              <a:gd name="connsiteY0" fmla="*/ 806746 h 997971"/>
+              <a:gd name="connsiteX1" fmla="*/ 296445 w 592890"/>
+              <a:gd name="connsiteY1" fmla="*/ 0 h 997971"/>
+              <a:gd name="connsiteX2" fmla="*/ 592890 w 592890"/>
+              <a:gd name="connsiteY2" fmla="*/ 806746 h 997971"/>
+              <a:gd name="connsiteX3" fmla="*/ 386188 w 592890"/>
+              <a:gd name="connsiteY3" fmla="*/ 766438 h 997971"/>
+              <a:gd name="connsiteX4" fmla="*/ 386188 w 592890"/>
+              <a:gd name="connsiteY4" fmla="*/ 997971 h 997971"/>
+              <a:gd name="connsiteX5" fmla="*/ 206702 w 592890"/>
+              <a:gd name="connsiteY5" fmla="*/ 997971 h 997971"/>
+              <a:gd name="connsiteX6" fmla="*/ 206702 w 592890"/>
+              <a:gd name="connsiteY6" fmla="*/ 735333 h 997971"/>
+              <a:gd name="connsiteX7" fmla="*/ 0 w 592890"/>
+              <a:gd name="connsiteY7" fmla="*/ 806746 h 997971"/>
+              <a:gd name="connsiteX0" fmla="*/ 0 w 592890"/>
+              <a:gd name="connsiteY0" fmla="*/ 806746 h 997971"/>
+              <a:gd name="connsiteX1" fmla="*/ 296445 w 592890"/>
+              <a:gd name="connsiteY1" fmla="*/ 0 h 997971"/>
+              <a:gd name="connsiteX2" fmla="*/ 592890 w 592890"/>
+              <a:gd name="connsiteY2" fmla="*/ 806746 h 997971"/>
+              <a:gd name="connsiteX3" fmla="*/ 386188 w 592890"/>
+              <a:gd name="connsiteY3" fmla="*/ 730570 h 997971"/>
+              <a:gd name="connsiteX4" fmla="*/ 386188 w 592890"/>
+              <a:gd name="connsiteY4" fmla="*/ 997971 h 997971"/>
+              <a:gd name="connsiteX5" fmla="*/ 206702 w 592890"/>
+              <a:gd name="connsiteY5" fmla="*/ 997971 h 997971"/>
+              <a:gd name="connsiteX6" fmla="*/ 206702 w 592890"/>
+              <a:gd name="connsiteY6" fmla="*/ 735333 h 997971"/>
+              <a:gd name="connsiteX7" fmla="*/ 0 w 592890"/>
+              <a:gd name="connsiteY7" fmla="*/ 806746 h 997971"/>
+            </a:gdLst>
+            <a:ahLst/>
+            <a:cxnLst>
+              <a:cxn ang="0">
+                <a:pos x="connsiteX0" y="connsiteY0"/>
+              </a:cxn>
+              <a:cxn ang="0">
+                <a:pos x="connsiteX1" y="connsiteY1"/>
+              </a:cxn>
+              <a:cxn ang="0">
+                <a:pos x="connsiteX2" y="connsiteY2"/>
+              </a:cxn>
+              <a:cxn ang="0">
+                <a:pos x="connsiteX3" y="connsiteY3"/>
+              </a:cxn>
+              <a:cxn ang="0">
+                <a:pos x="connsiteX4" y="connsiteY4"/>
+              </a:cxn>
+              <a:cxn ang="0">
+                <a:pos x="connsiteX5" y="connsiteY5"/>
+              </a:cxn>
+              <a:cxn ang="0">
+                <a:pos x="connsiteX6" y="connsiteY6"/>
+              </a:cxn>
+              <a:cxn ang="0">
+                <a:pos x="connsiteX7" y="connsiteY7"/>
+              </a:cxn>
+            </a:cxnLst>
+            <a:rect l="l" t="t" r="r" b="b"/>
+            <a:pathLst>
+              <a:path w="592890" h="997971">
+                <a:moveTo>
+                  <a:pt x="0" y="806746"/>
+                </a:moveTo>
+                <a:lnTo>
+                  <a:pt x="296445" y="0"/>
+                </a:lnTo>
+                <a:lnTo>
+                  <a:pt x="592890" y="806746"/>
+                </a:lnTo>
+                <a:lnTo>
+                  <a:pt x="386188" y="730570"/>
+                </a:lnTo>
+                <a:lnTo>
+                  <a:pt x="386188" y="997971"/>
+                </a:lnTo>
+                <a:lnTo>
+                  <a:pt x="206702" y="997971"/>
+                </a:lnTo>
+                <a:lnTo>
+                  <a:pt x="206702" y="735333"/>
+                </a:lnTo>
+                <a:lnTo>
+                  <a:pt x="0" y="806746"/>
+                </a:lnTo>
+                <a:close/>
+              </a:path>
+            </a:pathLst>
+          </a:custGeom>
+          <a:solidFill>
+            <a:srgbClr val="FFFFFF"/>
+          </a:solidFill>
+          <a:ln w="3175">
+            <a:solidFill>
+              <a:srgbClr val="000000">
+                <a:lumMod val="85000"/>
+                <a:lumOff val="15000"/>
+              </a:srgbClr>
+            </a:solidFill>
+          </a:ln>
+          <a:effectLst>
+            <a:glow rad="139700">
+              <a:srgbClr val="F79646">
+                <a:satMod val="175000"/>
+                <a:alpha val="40000"/>
+              </a:srgbClr>
+            </a:glow>
+            <a:outerShdw blurRad="25400" dist="25400" dir="2040000" algn="tl" rotWithShape="0">
+              <a:prstClr val="black">
+                <a:alpha val="20000"/>
+              </a:prstClr>
+            </a:outerShdw>
+          </a:effectLst>
+        </p:spPr>
+        <p:style>
+          <a:lnRef idx="2">
+            <a:srgbClr val="4F81BD">
+              <a:shade val="50000"/>
+            </a:srgbClr>
+          </a:lnRef>
+          <a:fillRef idx="1">
+            <a:srgbClr val="4F81BD"/>
+          </a:fillRef>
+          <a:effectRef idx="0">
+            <a:srgbClr val="4F81BD"/>
+          </a:effectRef>
+          <a:fontRef idx="minor">
+            <a:srgbClr val="000000"/>
+          </a:fontRef>
+        </p:style>
+        <p:txBody>
+          <a:bodyPr lIns="97531" tIns="48766" rIns="97531" bIns="48766" rtlCol="0" anchor="ctr"/>
+          <a:lstStyle>
+            <a:defPPr>
+              <a:defRPr lang="en-US"/>
+            </a:defPPr>
+            <a:lvl1pPr marL="0" algn="l" defTabSz="914400" rtl="0" eaLnBrk="1" latinLnBrk="0" hangingPunct="1">
+              <a:defRPr sz="1800" kern="1200">
+                <a:solidFill>
+                  <a:srgbClr val="000000"/>
+                </a:solidFill>
+                <a:latin typeface="+mn-lt"/>
+                <a:ea typeface="+mn-ea"/>
+                <a:cs typeface="+mn-cs"/>
+              </a:defRPr>
+            </a:lvl1pPr>
+            <a:lvl2pPr marL="457200" algn="l" defTabSz="914400" rtl="0" eaLnBrk="1" latinLnBrk="0" hangingPunct="1">
+              <a:defRPr sz="1800" kern="1200">
+                <a:solidFill>
+                  <a:srgbClr val="000000"/>
+                </a:solidFill>
+                <a:latin typeface="+mn-lt"/>
+                <a:ea typeface="+mn-ea"/>
+                <a:cs typeface="+mn-cs"/>
+              </a:defRPr>
+            </a:lvl2pPr>
+            <a:lvl3pPr marL="914400" algn="l" defTabSz="914400" rtl="0" eaLnBrk="1" latinLnBrk="0" hangingPunct="1">
+              <a:defRPr sz="1800" kern="1200">
+                <a:solidFill>
+                  <a:srgbClr val="000000"/>
+                </a:solidFill>
+                <a:latin typeface="+mn-lt"/>
+                <a:ea typeface="+mn-ea"/>
+                <a:cs typeface="+mn-cs"/>
+              </a:defRPr>
+            </a:lvl3pPr>
+            <a:lvl4pPr marL="1371600" algn="l" defTabSz="914400" rtl="0" eaLnBrk="1" latinLnBrk="0" hangingPunct="1">
+              <a:defRPr sz="1800" kern="1200">
+                <a:solidFill>
+                  <a:srgbClr val="000000"/>
+                </a:solidFill>
+                <a:latin typeface="+mn-lt"/>
+                <a:ea typeface="+mn-ea"/>
+                <a:cs typeface="+mn-cs"/>
+              </a:defRPr>
+            </a:lvl4pPr>
+            <a:lvl5pPr marL="1828800" algn="l" defTabSz="914400" rtl="0" eaLnBrk="1" latinLnBrk="0" hangingPunct="1">
+              <a:defRPr sz="1800" kern="1200">
+                <a:solidFill>
+                  <a:srgbClr val="000000"/>
+                </a:solidFill>
+                <a:latin typeface="+mn-lt"/>
+                <a:ea typeface="+mn-ea"/>
+                <a:cs typeface="+mn-cs"/>
+              </a:defRPr>
+            </a:lvl5pPr>
+            <a:lvl6pPr marL="2286000" algn="l" defTabSz="914400" rtl="0" eaLnBrk="1" latinLnBrk="0" hangingPunct="1">
+              <a:defRPr sz="1800" kern="1200">
+                <a:solidFill>
+                  <a:srgbClr val="000000"/>
+                </a:solidFill>
+                <a:latin typeface="+mn-lt"/>
+                <a:ea typeface="+mn-ea"/>
+                <a:cs typeface="+mn-cs"/>
+              </a:defRPr>
+            </a:lvl6pPr>
+            <a:lvl7pPr marL="2743200" algn="l" defTabSz="914400" rtl="0" eaLnBrk="1" latinLnBrk="0" hangingPunct="1">
+              <a:defRPr sz="1800" kern="1200">
+                <a:solidFill>
+                  <a:srgbClr val="000000"/>
+                </a:solidFill>
+                <a:latin typeface="+mn-lt"/>
+                <a:ea typeface="+mn-ea"/>
+                <a:cs typeface="+mn-cs"/>
+              </a:defRPr>
+            </a:lvl7pPr>
+            <a:lvl8pPr marL="3200400" algn="l" defTabSz="914400" rtl="0" eaLnBrk="1" latinLnBrk="0" hangingPunct="1">
+              <a:defRPr sz="1800" kern="1200">
+                <a:solidFill>
+                  <a:srgbClr val="000000"/>
+                </a:solidFill>
+                <a:latin typeface="+mn-lt"/>
+                <a:ea typeface="+mn-ea"/>
+                <a:cs typeface="+mn-cs"/>
+              </a:defRPr>
+            </a:lvl8pPr>
+            <a:lvl9pPr marL="3657600" algn="l" defTabSz="914400" rtl="0" eaLnBrk="1" latinLnBrk="0" hangingPunct="1">
+              <a:defRPr sz="1800" kern="1200">
+                <a:solidFill>
+                  <a:srgbClr val="000000"/>
+                </a:solidFill>
+                <a:latin typeface="+mn-lt"/>
+                <a:ea typeface="+mn-ea"/>
+                <a:cs typeface="+mn-cs"/>
+              </a:defRPr>
+            </a:lvl9pPr>
+          </a:lstStyle>
+          <a:p>
+            <a:pPr algn="ctr"/>
+            <a:endParaRPr lang="en-US" dirty="0"/>
           </a:p>
         </p:txBody>
       </p:sp>
@@ -7162,6 +7789,162 @@
   <p:clrMapOvr>
     <a:masterClrMapping/>
   </p:clrMapOvr>
+  <p:timing>
+    <p:tnLst>
+      <p:par>
+        <p:cTn id="1" dur="indefinite" restart="never" nodeType="tmRoot">
+          <p:childTnLst>
+            <p:seq concurrent="1" nextAc="seek">
+              <p:cTn id="2" dur="indefinite" nodeType="mainSeq">
+                <p:childTnLst>
+                  <p:par>
+                    <p:cTn id="3" fill="hold">
+                      <p:stCondLst>
+                        <p:cond delay="indefinite"/>
+                      </p:stCondLst>
+                      <p:childTnLst>
+                        <p:par>
+                          <p:cTn id="4" fill="hold">
+                            <p:stCondLst>
+                              <p:cond delay="0"/>
+                            </p:stCondLst>
+                            <p:childTnLst>
+                              <p:par>
+                                <p:cTn id="5" presetID="0" presetClass="path" presetSubtype="0" accel="50000" decel="50000" fill="hold" grpId="0" nodeType="clickEffect">
+                                  <p:stCondLst>
+                                    <p:cond delay="0"/>
+                                  </p:stCondLst>
+                                  <p:childTnLst>
+                                    <p:animMotion origin="layout" path="M -0.00403 0.02592 C -0.00807 0.02778 -0.0125 0.02708 -0.01692 0.03055 C -0.0207 0.03264 -0.02395 0.03796 -0.02669 0.04213 C -0.03802 0.0581 -0.04153 0.07963 -0.05013 0.10648 C -0.04908 0.12222 -0.04908 0.13796 -0.04961 0.15416 " pathEditMode="relative" rAng="10500000" ptsTypes="AAAAA">
+                                      <p:cBhvr>
+                                        <p:cTn id="6" dur="2000" fill="hold"/>
+                                        <p:tgtEl>
+                                          <p:spTgt spid="32"/>
+                                        </p:tgtEl>
+                                        <p:attrNameLst>
+                                          <p:attrName>ppt_x</p:attrName>
+                                          <p:attrName>ppt_y</p:attrName>
+                                        </p:attrNameLst>
+                                      </p:cBhvr>
+                                      <p:rCtr x="-2279" y="6412"/>
+                                    </p:animMotion>
+                                  </p:childTnLst>
+                                </p:cTn>
+                              </p:par>
+                            </p:childTnLst>
+                          </p:cTn>
+                        </p:par>
+                        <p:par>
+                          <p:cTn id="7" fill="hold">
+                            <p:stCondLst>
+                              <p:cond delay="2000"/>
+                            </p:stCondLst>
+                            <p:childTnLst>
+                              <p:par>
+                                <p:cTn id="8" presetID="23" presetClass="exit" presetSubtype="32" fill="remove" grpId="1" nodeType="afterEffect">
+                                  <p:stCondLst>
+                                    <p:cond delay="0"/>
+                                  </p:stCondLst>
+                                  <p:childTnLst>
+                                    <p:anim calcmode="lin" valueType="num">
+                                      <p:cBhvr>
+                                        <p:cTn id="9" dur="100"/>
+                                        <p:tgtEl>
+                                          <p:spTgt spid="32"/>
+                                        </p:tgtEl>
+                                        <p:attrNameLst>
+                                          <p:attrName>ppt_w</p:attrName>
+                                        </p:attrNameLst>
+                                      </p:cBhvr>
+                                      <p:tavLst>
+                                        <p:tav tm="0">
+                                          <p:val>
+                                            <p:strVal val="ppt_w"/>
+                                          </p:val>
+                                        </p:tav>
+                                        <p:tav tm="100000">
+                                          <p:val>
+                                            <p:fltVal val="0"/>
+                                          </p:val>
+                                        </p:tav>
+                                      </p:tavLst>
+                                    </p:anim>
+                                    <p:anim calcmode="lin" valueType="num">
+                                      <p:cBhvr>
+                                        <p:cTn id="10" dur="100"/>
+                                        <p:tgtEl>
+                                          <p:spTgt spid="32"/>
+                                        </p:tgtEl>
+                                        <p:attrNameLst>
+                                          <p:attrName>ppt_h</p:attrName>
+                                        </p:attrNameLst>
+                                      </p:cBhvr>
+                                      <p:tavLst>
+                                        <p:tav tm="0">
+                                          <p:val>
+                                            <p:strVal val="ppt_h"/>
+                                          </p:val>
+                                        </p:tav>
+                                        <p:tav tm="100000">
+                                          <p:val>
+                                            <p:fltVal val="0"/>
+                                          </p:val>
+                                        </p:tav>
+                                      </p:tavLst>
+                                    </p:anim>
+                                    <p:set>
+                                      <p:cBhvr>
+                                        <p:cTn id="11" dur="1" fill="hold">
+                                          <p:stCondLst>
+                                            <p:cond delay="99"/>
+                                          </p:stCondLst>
+                                        </p:cTn>
+                                        <p:tgtEl>
+                                          <p:spTgt spid="32"/>
+                                        </p:tgtEl>
+                                        <p:attrNameLst>
+                                          <p:attrName>style.visibility</p:attrName>
+                                        </p:attrNameLst>
+                                      </p:cBhvr>
+                                      <p:to>
+                                        <p:strVal val="hidden"/>
+                                      </p:to>
+                                    </p:set>
+                                  </p:childTnLst>
+                                </p:cTn>
+                              </p:par>
+                            </p:childTnLst>
+                          </p:cTn>
+                        </p:par>
+                      </p:childTnLst>
+                    </p:cTn>
+                  </p:par>
+                </p:childTnLst>
+              </p:cTn>
+              <p:prevCondLst>
+                <p:cond evt="onPrev" delay="0">
+                  <p:tgtEl>
+                    <p:sldTgt/>
+                  </p:tgtEl>
+                </p:cond>
+              </p:prevCondLst>
+              <p:nextCondLst>
+                <p:cond evt="onNext" delay="0">
+                  <p:tgtEl>
+                    <p:sldTgt/>
+                  </p:tgtEl>
+                </p:cond>
+              </p:nextCondLst>
+            </p:seq>
+          </p:childTnLst>
+        </p:cTn>
+      </p:par>
+    </p:tnLst>
+    <p:bldLst>
+      <p:bldP spid="32" grpId="0" animBg="1"/>
+      <p:bldP spid="32" grpId="1" animBg="1"/>
+    </p:bldLst>
+  </p:timing>
 </p:sld>
 </file>
 
@@ -7182,6 +7965,734 @@
           <a:chExt cx="0" cy="0"/>
         </a:xfrm>
       </p:grpSpPr>
+      <p:sp>
+        <p:nvSpPr>
+          <p:cNvPr id="2" name="Retângulo: Cantos Arredondados 1">
+            <a:extLst>
+              <a:ext uri="{FF2B5EF4-FFF2-40B4-BE49-F238E27FC236}">
+                <a16:creationId xmlns:a16="http://schemas.microsoft.com/office/drawing/2014/main" id="{372594B3-F056-40E1-9641-6FE0AEDEDE7C}"/>
+              </a:ext>
+            </a:extLst>
+          </p:cNvPr>
+          <p:cNvSpPr/>
+          <p:nvPr>
+            <p:custDataLst>
+              <p:custData r:id="rId1"/>
+            </p:custDataLst>
+          </p:nvPr>
+        </p:nvSpPr>
+        <p:spPr>
+          <a:xfrm>
+            <a:off x="682172" y="2197578"/>
+            <a:ext cx="11366499" cy="1913592"/>
+          </a:xfrm>
+          <a:prstGeom prst="roundRect">
+            <a:avLst>
+              <a:gd name="adj" fmla="val 2204"/>
+            </a:avLst>
+          </a:prstGeom>
+          <a:noFill/>
+          <a:ln>
+            <a:solidFill>
+              <a:srgbClr val="D0CECE"/>
+            </a:solidFill>
+          </a:ln>
+        </p:spPr>
+        <p:style>
+          <a:lnRef idx="2">
+            <a:schemeClr val="accent1">
+              <a:shade val="50000"/>
+            </a:schemeClr>
+          </a:lnRef>
+          <a:fillRef idx="1">
+            <a:schemeClr val="accent1"/>
+          </a:fillRef>
+          <a:effectRef idx="0">
+            <a:schemeClr val="accent1"/>
+          </a:effectRef>
+          <a:fontRef idx="minor">
+            <a:schemeClr val="lt1"/>
+          </a:fontRef>
+        </p:style>
+        <p:txBody>
+          <a:bodyPr rtlCol="0" anchor="ctr"/>
+          <a:lstStyle/>
+          <a:p>
+            <a:pPr algn="ctr"/>
+            <a:endParaRPr lang="pt-BR"/>
+          </a:p>
+        </p:txBody>
+      </p:sp>
+      <p:cxnSp>
+        <p:nvCxnSpPr>
+          <p:cNvPr id="3" name="Conector reto 2">
+            <a:extLst>
+              <a:ext uri="{FF2B5EF4-FFF2-40B4-BE49-F238E27FC236}">
+                <a16:creationId xmlns:a16="http://schemas.microsoft.com/office/drawing/2014/main" id="{F1CB7F62-59E3-4769-8078-BC13C14106C6}"/>
+              </a:ext>
+            </a:extLst>
+          </p:cNvPr>
+          <p:cNvCxnSpPr/>
+          <p:nvPr>
+            <p:custDataLst>
+              <p:custData r:id="rId2"/>
+            </p:custDataLst>
+          </p:nvPr>
+        </p:nvCxnSpPr>
+        <p:spPr>
+          <a:xfrm>
+            <a:off x="508000" y="1291771"/>
+            <a:ext cx="11684000" cy="0"/>
+          </a:xfrm>
+          <a:prstGeom prst="line">
+            <a:avLst/>
+          </a:prstGeom>
+          <a:ln>
+            <a:solidFill>
+              <a:schemeClr val="bg2">
+                <a:lumMod val="90000"/>
+              </a:schemeClr>
+            </a:solidFill>
+          </a:ln>
+        </p:spPr>
+        <p:style>
+          <a:lnRef idx="1">
+            <a:schemeClr val="dk1"/>
+          </a:lnRef>
+          <a:fillRef idx="0">
+            <a:schemeClr val="dk1"/>
+          </a:fillRef>
+          <a:effectRef idx="0">
+            <a:schemeClr val="dk1"/>
+          </a:effectRef>
+          <a:fontRef idx="minor">
+            <a:schemeClr val="tx1"/>
+          </a:fontRef>
+        </p:style>
+      </p:cxnSp>
+      <p:sp>
+        <p:nvSpPr>
+          <p:cNvPr id="4" name="Content">
+            <a:extLst>
+              <a:ext uri="{FF2B5EF4-FFF2-40B4-BE49-F238E27FC236}">
+                <a16:creationId xmlns:a16="http://schemas.microsoft.com/office/drawing/2014/main" id="{5E4BFBAB-6A14-4D8A-8EB4-2D5E3907FDB8}"/>
+              </a:ext>
+            </a:extLst>
+          </p:cNvPr>
+          <p:cNvSpPr txBox="1"/>
+          <p:nvPr>
+            <p:custDataLst>
+              <p:custData r:id="rId3"/>
+            </p:custDataLst>
+          </p:nvPr>
+        </p:nvSpPr>
+        <p:spPr>
+          <a:xfrm>
+            <a:off x="602776" y="835717"/>
+            <a:ext cx="2614690" cy="353943"/>
+          </a:xfrm>
+          <a:prstGeom prst="rect">
+            <a:avLst/>
+          </a:prstGeom>
+          <a:noFill/>
+        </p:spPr>
+        <p:txBody>
+          <a:bodyPr wrap="none" lIns="91440" tIns="18288" rIns="91440" bIns="27432" rtlCol="0" anchor="ctr" anchorCtr="0">
+            <a:spAutoFit/>
+          </a:bodyPr>
+          <a:lstStyle/>
+          <a:p>
+            <a:r>
+              <a:rPr lang="en-US" sz="2000" b="1" u="sng" dirty="0">
+                <a:solidFill>
+                  <a:srgbClr val="003F7F"/>
+                </a:solidFill>
+                <a:ea typeface="Segoe UI" pitchFamily="34" charset="0"/>
+                <a:cs typeface="Segoe UI Semibold" panose="020B0702040204020203" pitchFamily="34" charset="0"/>
+              </a:rPr>
+              <a:t>Pedidos de Compra</a:t>
+            </a:r>
+            <a:r>
+              <a:rPr lang="en-US" sz="2000" b="1" dirty="0">
+                <a:solidFill>
+                  <a:srgbClr val="003F7F"/>
+                </a:solidFill>
+                <a:ea typeface="Segoe UI" pitchFamily="34" charset="0"/>
+                <a:cs typeface="Segoe UI Semibold" panose="020B0702040204020203" pitchFamily="34" charset="0"/>
+              </a:rPr>
+              <a:t> &gt; 0</a:t>
+            </a:r>
+          </a:p>
+        </p:txBody>
+      </p:sp>
+      <p:sp>
+        <p:nvSpPr>
+          <p:cNvPr id="5" name="Content">
+            <a:extLst>
+              <a:ext uri="{FF2B5EF4-FFF2-40B4-BE49-F238E27FC236}">
+                <a16:creationId xmlns:a16="http://schemas.microsoft.com/office/drawing/2014/main" id="{80F9EAC7-915C-4952-A839-DE760CB94A82}"/>
+              </a:ext>
+            </a:extLst>
+          </p:cNvPr>
+          <p:cNvSpPr txBox="1"/>
+          <p:nvPr>
+            <p:custDataLst>
+              <p:custData r:id="rId4"/>
+            </p:custDataLst>
+          </p:nvPr>
+        </p:nvSpPr>
+        <p:spPr>
+          <a:xfrm>
+            <a:off x="6096000" y="1353543"/>
+            <a:ext cx="5952671" cy="710131"/>
+          </a:xfrm>
+          <a:prstGeom prst="rect">
+            <a:avLst/>
+          </a:prstGeom>
+          <a:noFill/>
+        </p:spPr>
+        <p:txBody>
+          <a:bodyPr wrap="square" lIns="91440" tIns="18288" rIns="91440" bIns="27432" rtlCol="0" anchor="ctr" anchorCtr="0">
+            <a:spAutoFit/>
+          </a:bodyPr>
+          <a:lstStyle/>
+          <a:p>
+            <a:pPr marL="432000" algn="r">
+              <a:lnSpc>
+                <a:spcPct val="150000"/>
+              </a:lnSpc>
+            </a:pPr>
+            <a:r>
+              <a:rPr lang="pt-BR" sz="1000" b="1" dirty="0">
+                <a:latin typeface="Arial" panose="020B0604020202020204" pitchFamily="34" charset="0"/>
+                <a:cs typeface="Arial" panose="020B0604020202020204" pitchFamily="34" charset="0"/>
+              </a:rPr>
+              <a:t>Criado por</a:t>
+            </a:r>
+            <a:r>
+              <a:rPr lang="pt-BR" sz="1000" dirty="0">
+                <a:latin typeface="Arial" panose="020B0604020202020204" pitchFamily="34" charset="0"/>
+                <a:cs typeface="Arial" panose="020B0604020202020204" pitchFamily="34" charset="0"/>
+              </a:rPr>
+              <a:t>:  Eric</a:t>
+            </a:r>
+          </a:p>
+          <a:p>
+            <a:pPr marL="432000" algn="r">
+              <a:lnSpc>
+                <a:spcPct val="150000"/>
+              </a:lnSpc>
+            </a:pPr>
+            <a:r>
+              <a:rPr lang="pt-BR" sz="1000" b="1" dirty="0">
+                <a:latin typeface="Arial" panose="020B0604020202020204" pitchFamily="34" charset="0"/>
+                <a:cs typeface="Arial" panose="020B0604020202020204" pitchFamily="34" charset="0"/>
+              </a:rPr>
+              <a:t>Data de criação</a:t>
+            </a:r>
+            <a:r>
+              <a:rPr lang="pt-BR" sz="1000" dirty="0">
+                <a:latin typeface="Arial" panose="020B0604020202020204" pitchFamily="34" charset="0"/>
+                <a:cs typeface="Arial" panose="020B0604020202020204" pitchFamily="34" charset="0"/>
+              </a:rPr>
+              <a:t>: 16/09/2018 12:20:30</a:t>
+            </a:r>
+          </a:p>
+          <a:p>
+            <a:pPr marL="432000" algn="r">
+              <a:lnSpc>
+                <a:spcPct val="150000"/>
+              </a:lnSpc>
+            </a:pPr>
+            <a:r>
+              <a:rPr lang="pt-BR" sz="1000" b="1" dirty="0">
+                <a:latin typeface="Arial" panose="020B0604020202020204" pitchFamily="34" charset="0"/>
+                <a:cs typeface="Arial" panose="020B0604020202020204" pitchFamily="34" charset="0"/>
+              </a:rPr>
+              <a:t>Última alteração realizada por</a:t>
+            </a:r>
+            <a:r>
+              <a:rPr lang="pt-BR" sz="1000" dirty="0">
+                <a:latin typeface="Arial" panose="020B0604020202020204" pitchFamily="34" charset="0"/>
+                <a:cs typeface="Arial" panose="020B0604020202020204" pitchFamily="34" charset="0"/>
+              </a:rPr>
+              <a:t> Eric </a:t>
+            </a:r>
+            <a:r>
+              <a:rPr lang="pt-BR" sz="1000" b="1" dirty="0">
+                <a:latin typeface="Arial" panose="020B0604020202020204" pitchFamily="34" charset="0"/>
+                <a:cs typeface="Arial" panose="020B0604020202020204" pitchFamily="34" charset="0"/>
+              </a:rPr>
+              <a:t>às</a:t>
+            </a:r>
+            <a:r>
+              <a:rPr lang="pt-BR" sz="1000" dirty="0">
+                <a:latin typeface="Arial" panose="020B0604020202020204" pitchFamily="34" charset="0"/>
+                <a:cs typeface="Arial" panose="020B0604020202020204" pitchFamily="34" charset="0"/>
+              </a:rPr>
+              <a:t> 16/09/2018 12:27:55</a:t>
+            </a:r>
+          </a:p>
+        </p:txBody>
+      </p:sp>
+      <p:cxnSp>
+        <p:nvCxnSpPr>
+          <p:cNvPr id="6" name="Conector reto 5">
+            <a:extLst>
+              <a:ext uri="{FF2B5EF4-FFF2-40B4-BE49-F238E27FC236}">
+                <a16:creationId xmlns:a16="http://schemas.microsoft.com/office/drawing/2014/main" id="{6BEBC440-C21D-472A-BF5D-3D3B8D0F1AD6}"/>
+              </a:ext>
+            </a:extLst>
+          </p:cNvPr>
+          <p:cNvCxnSpPr>
+            <a:cxnSpLocks/>
+          </p:cNvCxnSpPr>
+          <p:nvPr>
+            <p:custDataLst>
+              <p:custData r:id="rId5"/>
+            </p:custDataLst>
+          </p:nvPr>
+        </p:nvCxnSpPr>
+        <p:spPr>
+          <a:xfrm>
+            <a:off x="774700" y="2550827"/>
+            <a:ext cx="11168771" cy="0"/>
+          </a:xfrm>
+          <a:prstGeom prst="line">
+            <a:avLst/>
+          </a:prstGeom>
+          <a:ln>
+            <a:solidFill>
+              <a:schemeClr val="bg2">
+                <a:lumMod val="90000"/>
+              </a:schemeClr>
+            </a:solidFill>
+          </a:ln>
+        </p:spPr>
+        <p:style>
+          <a:lnRef idx="1">
+            <a:schemeClr val="dk1"/>
+          </a:lnRef>
+          <a:fillRef idx="0">
+            <a:schemeClr val="dk1"/>
+          </a:fillRef>
+          <a:effectRef idx="0">
+            <a:schemeClr val="dk1"/>
+          </a:effectRef>
+          <a:fontRef idx="minor">
+            <a:schemeClr val="tx1"/>
+          </a:fontRef>
+        </p:style>
+      </p:cxnSp>
+      <p:sp>
+        <p:nvSpPr>
+          <p:cNvPr id="14" name="Content">
+            <a:extLst>
+              <a:ext uri="{FF2B5EF4-FFF2-40B4-BE49-F238E27FC236}">
+                <a16:creationId xmlns:a16="http://schemas.microsoft.com/office/drawing/2014/main" id="{A6CD3C43-0C03-4E6C-B813-3FCF70C17D45}"/>
+              </a:ext>
+            </a:extLst>
+          </p:cNvPr>
+          <p:cNvSpPr txBox="1"/>
+          <p:nvPr>
+            <p:custDataLst>
+              <p:custData r:id="rId6"/>
+            </p:custDataLst>
+          </p:nvPr>
+        </p:nvSpPr>
+        <p:spPr>
+          <a:xfrm>
+            <a:off x="682172" y="2246438"/>
+            <a:ext cx="1160126" cy="261610"/>
+          </a:xfrm>
+          <a:prstGeom prst="rect">
+            <a:avLst/>
+          </a:prstGeom>
+          <a:noFill/>
+        </p:spPr>
+        <p:txBody>
+          <a:bodyPr wrap="none" lIns="91440" tIns="18288" rIns="91440" bIns="27432" rtlCol="0" anchor="ctr" anchorCtr="0">
+            <a:spAutoFit/>
+          </a:bodyPr>
+          <a:lstStyle/>
+          <a:p>
+            <a:r>
+              <a:rPr lang="en-US" sz="1400" b="1" dirty="0">
+                <a:solidFill>
+                  <a:srgbClr val="003F7F"/>
+                </a:solidFill>
+                <a:ea typeface="Segoe UI" pitchFamily="34" charset="0"/>
+                <a:cs typeface="Segoe UI Semibold" panose="020B0702040204020203" pitchFamily="34" charset="0"/>
+              </a:rPr>
+              <a:t>Dados Gerais</a:t>
+            </a:r>
+          </a:p>
+        </p:txBody>
+      </p:sp>
+      <p:grpSp>
+        <p:nvGrpSpPr>
+          <p:cNvPr id="19" name="Agrupar 18">
+            <a:extLst>
+              <a:ext uri="{FF2B5EF4-FFF2-40B4-BE49-F238E27FC236}">
+                <a16:creationId xmlns:a16="http://schemas.microsoft.com/office/drawing/2014/main" id="{080D8867-2958-4314-8A3A-E8E7F71F3F75}"/>
+              </a:ext>
+            </a:extLst>
+          </p:cNvPr>
+          <p:cNvGrpSpPr/>
+          <p:nvPr>
+            <p:custDataLst>
+              <p:custData r:id="rId7"/>
+            </p:custDataLst>
+          </p:nvPr>
+        </p:nvGrpSpPr>
+        <p:grpSpPr>
+          <a:xfrm>
+            <a:off x="875773" y="2628001"/>
+            <a:ext cx="3137426" cy="518437"/>
+            <a:chOff x="875773" y="2628001"/>
+            <a:chExt cx="3050923" cy="518437"/>
+          </a:xfrm>
+        </p:grpSpPr>
+        <p:sp>
+          <p:nvSpPr>
+            <p:cNvPr id="16" name="Retângulo: Cantos Arredondados 15">
+              <a:extLst>
+                <a:ext uri="{FF2B5EF4-FFF2-40B4-BE49-F238E27FC236}">
+                  <a16:creationId xmlns:a16="http://schemas.microsoft.com/office/drawing/2014/main" id="{A5CCE756-95FC-45E6-BB07-75E94FC4190E}"/>
+                </a:ext>
+              </a:extLst>
+            </p:cNvPr>
+            <p:cNvSpPr/>
+            <p:nvPr>
+              <p:custDataLst>
+                <p:custData r:id="rId12"/>
+              </p:custDataLst>
+            </p:nvPr>
+          </p:nvSpPr>
+          <p:spPr>
+            <a:xfrm>
+              <a:off x="959737" y="2860011"/>
+              <a:ext cx="2966959" cy="286427"/>
+            </a:xfrm>
+            <a:prstGeom prst="roundRect">
+              <a:avLst>
+                <a:gd name="adj" fmla="val 3212"/>
+              </a:avLst>
+            </a:prstGeom>
+            <a:noFill/>
+            <a:ln>
+              <a:solidFill>
+                <a:srgbClr val="D4D4D4"/>
+              </a:solidFill>
+            </a:ln>
+            <a:effectLst>
+              <a:outerShdw blurRad="12700" algn="ctr" rotWithShape="0">
+                <a:prstClr val="black">
+                  <a:alpha val="31000"/>
+                </a:prstClr>
+              </a:outerShdw>
+            </a:effectLst>
+          </p:spPr>
+          <p:style>
+            <a:lnRef idx="2">
+              <a:schemeClr val="accent1">
+                <a:shade val="50000"/>
+              </a:schemeClr>
+            </a:lnRef>
+            <a:fillRef idx="1">
+              <a:schemeClr val="accent1"/>
+            </a:fillRef>
+            <a:effectRef idx="0">
+              <a:schemeClr val="accent1"/>
+            </a:effectRef>
+            <a:fontRef idx="minor">
+              <a:schemeClr val="lt1"/>
+            </a:fontRef>
+          </p:style>
+          <p:txBody>
+            <a:bodyPr rtlCol="0" anchor="ctr"/>
+            <a:lstStyle/>
+            <a:p>
+              <a:r>
+                <a:rPr lang="pt-BR" sz="1000" dirty="0">
+                  <a:solidFill>
+                    <a:schemeClr val="tx1"/>
+                  </a:solidFill>
+                  <a:latin typeface="Arial" panose="020B0604020202020204" pitchFamily="34" charset="0"/>
+                  <a:cs typeface="Arial" panose="020B0604020202020204" pitchFamily="34" charset="0"/>
+                </a:rPr>
+                <a:t>BIOTRONIK COMERCIAL MEDICA LTDA</a:t>
+              </a:r>
+            </a:p>
+          </p:txBody>
+        </p:sp>
+        <p:sp>
+          <p:nvSpPr>
+            <p:cNvPr id="18" name="Content">
+              <a:extLst>
+                <a:ext uri="{FF2B5EF4-FFF2-40B4-BE49-F238E27FC236}">
+                  <a16:creationId xmlns:a16="http://schemas.microsoft.com/office/drawing/2014/main" id="{7FC8F687-8380-4CE6-84F1-F9E5534C9910}"/>
+                </a:ext>
+              </a:extLst>
+            </p:cNvPr>
+            <p:cNvSpPr txBox="1"/>
+            <p:nvPr>
+              <p:custDataLst>
+                <p:custData r:id="rId13"/>
+              </p:custDataLst>
+            </p:nvPr>
+          </p:nvSpPr>
+          <p:spPr>
+            <a:xfrm>
+              <a:off x="875773" y="2628001"/>
+              <a:ext cx="962123" cy="215444"/>
+            </a:xfrm>
+            <a:prstGeom prst="rect">
+              <a:avLst/>
+            </a:prstGeom>
+            <a:noFill/>
+          </p:spPr>
+          <p:txBody>
+            <a:bodyPr wrap="none" lIns="91440" tIns="18288" rIns="91440" bIns="27432" rtlCol="0" anchor="ctr" anchorCtr="0">
+              <a:spAutoFit/>
+            </a:bodyPr>
+            <a:lstStyle/>
+            <a:p>
+              <a:r>
+                <a:rPr lang="en-US" sz="1100" b="1" dirty="0">
+                  <a:solidFill>
+                    <a:schemeClr val="bg2">
+                      <a:lumMod val="50000"/>
+                    </a:schemeClr>
+                  </a:solidFill>
+                  <a:latin typeface="Arial" panose="020B0604020202020204" pitchFamily="34" charset="0"/>
+                  <a:ea typeface="Segoe UI" pitchFamily="34" charset="0"/>
+                  <a:cs typeface="Arial" panose="020B0604020202020204" pitchFamily="34" charset="0"/>
+                </a:rPr>
+                <a:t>Fornecedor</a:t>
+              </a:r>
+            </a:p>
+          </p:txBody>
+        </p:sp>
+      </p:grpSp>
+      <p:grpSp>
+        <p:nvGrpSpPr>
+          <p:cNvPr id="26" name="Agrupar 25">
+            <a:extLst>
+              <a:ext uri="{FF2B5EF4-FFF2-40B4-BE49-F238E27FC236}">
+                <a16:creationId xmlns:a16="http://schemas.microsoft.com/office/drawing/2014/main" id="{01D9A1CA-7BF8-4871-9FAB-E6995EA48A5F}"/>
+              </a:ext>
+            </a:extLst>
+          </p:cNvPr>
+          <p:cNvGrpSpPr/>
+          <p:nvPr>
+            <p:custDataLst>
+              <p:custData r:id="rId8"/>
+            </p:custDataLst>
+          </p:nvPr>
+        </p:nvGrpSpPr>
+        <p:grpSpPr>
+          <a:xfrm>
+            <a:off x="4609186" y="2623258"/>
+            <a:ext cx="1212191" cy="518432"/>
+            <a:chOff x="4609186" y="2623258"/>
+            <a:chExt cx="1212191" cy="518432"/>
+          </a:xfrm>
+        </p:grpSpPr>
+        <p:grpSp>
+          <p:nvGrpSpPr>
+            <p:cNvPr id="20" name="Agrupar 19">
+              <a:extLst>
+                <a:ext uri="{FF2B5EF4-FFF2-40B4-BE49-F238E27FC236}">
+                  <a16:creationId xmlns:a16="http://schemas.microsoft.com/office/drawing/2014/main" id="{DAE6838B-7AD0-4E28-8D1A-9FCA9287FF4A}"/>
+                </a:ext>
+              </a:extLst>
+            </p:cNvPr>
+            <p:cNvGrpSpPr/>
+            <p:nvPr>
+              <p:custDataLst>
+                <p:custData r:id="rId9"/>
+              </p:custDataLst>
+            </p:nvPr>
+          </p:nvGrpSpPr>
+          <p:grpSpPr>
+            <a:xfrm>
+              <a:off x="4609186" y="2623258"/>
+              <a:ext cx="1212191" cy="518432"/>
+              <a:chOff x="875773" y="2628001"/>
+              <a:chExt cx="1212191" cy="518432"/>
+            </a:xfrm>
+          </p:grpSpPr>
+          <p:sp>
+            <p:nvSpPr>
+              <p:cNvPr id="21" name="Retângulo: Cantos Arredondados 20">
+                <a:extLst>
+                  <a:ext uri="{FF2B5EF4-FFF2-40B4-BE49-F238E27FC236}">
+                    <a16:creationId xmlns:a16="http://schemas.microsoft.com/office/drawing/2014/main" id="{2545BF15-8BEC-46D5-AF6B-753A3BB68CB0}"/>
+                  </a:ext>
+                </a:extLst>
+              </p:cNvPr>
+              <p:cNvSpPr/>
+              <p:nvPr>
+                <p:custDataLst>
+                  <p:custData r:id="rId10"/>
+                </p:custDataLst>
+              </p:nvPr>
+            </p:nvSpPr>
+            <p:spPr>
+              <a:xfrm>
+                <a:off x="959737" y="2860011"/>
+                <a:ext cx="1128227" cy="286422"/>
+              </a:xfrm>
+              <a:prstGeom prst="roundRect">
+                <a:avLst>
+                  <a:gd name="adj" fmla="val 3212"/>
+                </a:avLst>
+              </a:prstGeom>
+              <a:noFill/>
+              <a:ln>
+                <a:solidFill>
+                  <a:srgbClr val="D4D4D4"/>
+                </a:solidFill>
+              </a:ln>
+              <a:effectLst>
+                <a:outerShdw blurRad="12700" algn="ctr" rotWithShape="0">
+                  <a:prstClr val="black">
+                    <a:alpha val="31000"/>
+                  </a:prstClr>
+                </a:outerShdw>
+              </a:effectLst>
+            </p:spPr>
+            <p:style>
+              <a:lnRef idx="2">
+                <a:schemeClr val="accent1">
+                  <a:shade val="50000"/>
+                </a:schemeClr>
+              </a:lnRef>
+              <a:fillRef idx="1">
+                <a:schemeClr val="accent1"/>
+              </a:fillRef>
+              <a:effectRef idx="0">
+                <a:schemeClr val="accent1"/>
+              </a:effectRef>
+              <a:fontRef idx="minor">
+                <a:schemeClr val="lt1"/>
+              </a:fontRef>
+            </p:style>
+            <p:txBody>
+              <a:bodyPr rtlCol="0" anchor="ctr"/>
+              <a:lstStyle/>
+              <a:p>
+                <a:r>
+                  <a:rPr lang="pt-BR" sz="1000" dirty="0">
+                    <a:solidFill>
+                      <a:schemeClr val="tx1"/>
+                    </a:solidFill>
+                    <a:latin typeface="Arial" panose="020B0604020202020204" pitchFamily="34" charset="0"/>
+                    <a:cs typeface="Arial" panose="020B0604020202020204" pitchFamily="34" charset="0"/>
+                  </a:rPr>
+                  <a:t>22/09/2018</a:t>
+                </a:r>
+              </a:p>
+            </p:txBody>
+          </p:sp>
+          <p:sp>
+            <p:nvSpPr>
+              <p:cNvPr id="22" name="Content">
+                <a:extLst>
+                  <a:ext uri="{FF2B5EF4-FFF2-40B4-BE49-F238E27FC236}">
+                    <a16:creationId xmlns:a16="http://schemas.microsoft.com/office/drawing/2014/main" id="{EAF8CD66-A183-4463-B82B-8205DC0786B9}"/>
+                  </a:ext>
+                </a:extLst>
+              </p:cNvPr>
+              <p:cNvSpPr txBox="1"/>
+              <p:nvPr>
+                <p:custDataLst>
+                  <p:custData r:id="rId11"/>
+                </p:custDataLst>
+              </p:nvPr>
+            </p:nvSpPr>
+            <p:spPr>
+              <a:xfrm>
+                <a:off x="875773" y="2628001"/>
+                <a:ext cx="1212191" cy="215444"/>
+              </a:xfrm>
+              <a:prstGeom prst="rect">
+                <a:avLst/>
+              </a:prstGeom>
+              <a:noFill/>
+            </p:spPr>
+            <p:txBody>
+              <a:bodyPr wrap="none" lIns="91440" tIns="18288" rIns="91440" bIns="27432" rtlCol="0" anchor="ctr" anchorCtr="0">
+                <a:spAutoFit/>
+              </a:bodyPr>
+              <a:lstStyle/>
+              <a:p>
+                <a:r>
+                  <a:rPr lang="en-US" sz="1100" b="1" dirty="0">
+                    <a:solidFill>
+                      <a:schemeClr val="bg2">
+                        <a:lumMod val="50000"/>
+                      </a:schemeClr>
+                    </a:solidFill>
+                    <a:latin typeface="Arial" panose="020B0604020202020204" pitchFamily="34" charset="0"/>
+                    <a:ea typeface="Segoe UI" pitchFamily="34" charset="0"/>
+                    <a:cs typeface="Arial" panose="020B0604020202020204" pitchFamily="34" charset="0"/>
+                  </a:rPr>
+                  <a:t>Data do Pedido</a:t>
+                </a:r>
+              </a:p>
+            </p:txBody>
+          </p:sp>
+        </p:grpSp>
+        <p:pic>
+          <p:nvPicPr>
+            <p:cNvPr id="25" name="Icon" descr="C:\Users\t-dantay\Documents\First24\calendar1.png">
+              <a:extLst>
+                <a:ext uri="{FF2B5EF4-FFF2-40B4-BE49-F238E27FC236}">
+                  <a16:creationId xmlns:a16="http://schemas.microsoft.com/office/drawing/2014/main" id="{A0DA1D96-6D4C-472E-9D25-FE317086C4E0}"/>
+                </a:ext>
+              </a:extLst>
+            </p:cNvPr>
+            <p:cNvPicPr>
+              <a:picLocks noChangeAspect="1" noChangeArrowheads="1"/>
+            </p:cNvPicPr>
+            <p:nvPr/>
+          </p:nvPicPr>
+          <p:blipFill>
+            <a:blip r:embed="rId15" cstate="print">
+              <a:extLst>
+                <a:ext uri="{28A0092B-C50C-407E-A947-70E740481C1C}">
+                  <a14:useLocalDpi xmlns:a14="http://schemas.microsoft.com/office/drawing/2010/main" val="0"/>
+                </a:ext>
+              </a:extLst>
+            </a:blip>
+            <a:srcRect/>
+            <a:stretch>
+              <a:fillRect/>
+            </a:stretch>
+          </p:blipFill>
+          <p:spPr bwMode="auto">
+            <a:xfrm>
+              <a:off x="5570893" y="2884179"/>
+              <a:ext cx="225084" cy="228600"/>
+            </a:xfrm>
+            <a:prstGeom prst="rect">
+              <a:avLst/>
+            </a:prstGeom>
+            <a:noFill/>
+            <a:extLst>
+              <a:ext uri="{909E8E84-426E-40DD-AFC4-6F175D3DCCD1}">
+                <a14:hiddenFill xmlns:a14="http://schemas.microsoft.com/office/drawing/2010/main">
+                  <a:solidFill>
+                    <a:srgbClr val="FFFFFF"/>
+                  </a:solidFill>
+                </a14:hiddenFill>
+              </a:ext>
+            </a:extLst>
+          </p:spPr>
+        </p:pic>
+      </p:grpSp>
     </p:spTree>
     <p:extLst>
       <p:ext uri="{BB962C8B-B14F-4D97-AF65-F5344CB8AC3E}">
@@ -7787,295 +9298,295 @@
 
 <file path=customXml/item1.xml><?xml version="1.0" encoding="utf-8"?>
 <Control xmlns="http://schemas.microsoft.com/VisualStudio/2011/storyboarding/control">
-  <Id Name="System.Storyboarding.WindowsApps.WindowsAppsTileMediumText" Revision="1" Stencil="System.Storyboarding.WindowsApps" StencilVersion="0.1"/>
+  <Id Name="94a64934-5db3-47cf-96df-f3eb1ee28c2b" Revision="1" Stencil="System.MyShapes" StencilVersion="1.0"/>
 </Control>
 </file>
 
 <file path=customXml/item10.xml><?xml version="1.0" encoding="utf-8"?>
+<Control xmlns="http://schemas.microsoft.com/VisualStudio/2011/storyboarding/control">
+  <Id Name="32035d07-bc66-4a79-8001-2507012193e3" RevisionId="7f6cc906-8fab-4878-8f41-90bcdc4e860e" Stencil="172d6d98-e5c9-42e9-a209-79f7a94bbd38" StencilRevisionId="00000000-0000-0000-0000-000000000000" StencilVersion="0.0"/>
+</Control>
+</file>
+
+<file path=customXml/item11.xml><?xml version="1.0" encoding="utf-8"?>
+<Control xmlns="http://schemas.microsoft.com/VisualStudio/2011/storyboarding/control">
+  <Id Name="3af3c69d-e93c-4e90-95f5-13afa1a89449" Revision="1" Stencil="85a07843-b809-41ee-b566-325b1850150a" StencilVersion="1.0"/>
+</Control>
+</file>
+
+<file path=customXml/item12.xml><?xml version="1.0" encoding="utf-8"?>
+<Control xmlns="http://schemas.microsoft.com/VisualStudio/2011/storyboarding/control">
+  <Id Name="4837c2c1-9271-4636-b45d-293fac782f46" Revision="1" Stencil="System.MyShapes" StencilVersion="1.0"/>
+</Control>
+</file>
+
+<file path=customXml/item13.xml><?xml version="1.0" encoding="utf-8"?>
+<Control xmlns="http://schemas.microsoft.com/VisualStudio/2011/storyboarding/control">
+  <Id Name="555e62f6-1a9c-4a1c-b658-df5e97a4e85c" Revision="1" Stencil="System.MyShapes" StencilVersion="1.0"/>
+</Control>
+</file>
+
+<file path=customXml/item14.xml><?xml version="1.0" encoding="utf-8"?>
+<Control xmlns="http://schemas.microsoft.com/VisualStudio/2011/storyboarding/control">
+  <Id Name="b498fdc2-67f2-4de5-899f-26683373e8ad" Revision="1" Stencil="System.MyShapes" StencilVersion="1.0"/>
+</Control>
+</file>
+
+<file path=customXml/item15.xml><?xml version="1.0" encoding="utf-8"?>
+<Control xmlns="http://schemas.microsoft.com/VisualStudio/2011/storyboarding/control">
+  <Id Name="ee84670b-81f4-4bf6-a9a4-a5d58c3f8a95" Revision="1" Stencil="85a07843-b809-41ee-b566-325b1850150a" StencilVersion="1.0"/>
+</Control>
+</file>
+
+<file path=customXml/item16.xml><?xml version="1.0" encoding="utf-8"?>
+<Control xmlns="http://schemas.microsoft.com/VisualStudio/2011/storyboarding/control">
+  <Id Name="06847451-0bea-4bb1-ad11-52311f8931c4" Revision="1" Stencil="System.MyShapes" StencilVersion="1.0"/>
+</Control>
+</file>
+
+<file path=customXml/item17.xml><?xml version="1.0" encoding="utf-8"?>
+<Control xmlns="http://schemas.microsoft.com/VisualStudio/2011/storyboarding/control">
+  <Id Name="51d6c810-a27b-4ddb-8dd6-2e1e1b3c5e44" Revision="1" Stencil="System.MyShapes" StencilVersion="1.0"/>
+</Control>
+</file>
+
+<file path=customXml/item18.xml><?xml version="1.0" encoding="utf-8"?>
+<Control xmlns="http://schemas.microsoft.com/VisualStudio/2011/storyboarding/control">
+  <Id Name="06847451-0bea-4bb1-ad11-52311f8931c4" Revision="1" Stencil="System.MyShapes" StencilVersion="1.0"/>
+</Control>
+</file>
+
+<file path=customXml/item19.xml><?xml version="1.0" encoding="utf-8"?>
+<Control xmlns="http://schemas.microsoft.com/VisualStudio/2011/storyboarding/control">
+  <Id Name="9558e425-a15a-4a2a-8c7d-369dc6767849" Revision="1" Stencil="09ee8e29-8a48-4e3d-a569-7c1ba11c2e3d" StencilVersion="1.0"/>
+</Control>
+</file>
+
+<file path=customXml/item2.xml><?xml version="1.0" encoding="utf-8"?>
+<Control xmlns="http://schemas.microsoft.com/VisualStudio/2011/storyboarding/control">
+  <Id Name="b498fdc2-67f2-4de5-899f-26683373e8ad" Revision="1" Stencil="System.MyShapes" StencilVersion="1.0"/>
+</Control>
+</file>
+
+<file path=customXml/item20.xml><?xml version="1.0" encoding="utf-8"?>
+<Control xmlns="http://schemas.microsoft.com/VisualStudio/2011/storyboarding/control">
+  <Id Name="605c907b-8b5e-4fc3-b9d8-4a5bfe8c9d4f" Revision="3" Stencil="System.MyShapes" StencilVersion="1.0"/>
+</Control>
+</file>
+
+<file path=customXml/item21.xml><?xml version="1.0" encoding="utf-8"?>
+<Control xmlns="http://schemas.microsoft.com/VisualStudio/2011/storyboarding/control">
+  <Id Name="4837c2c1-9271-4636-b45d-293fac782f46" Revision="1" Stencil="System.MyShapes" StencilVersion="1.0"/>
+</Control>
+</file>
+
+<file path=customXml/item22.xml><?xml version="1.0" encoding="utf-8"?>
+<Control xmlns="http://schemas.microsoft.com/VisualStudio/2011/storyboarding/control">
+  <Id Name="b498fdc2-67f2-4de5-899f-26683373e8ad" Revision="1" Stencil="System.MyShapes" StencilVersion="1.0"/>
+</Control>
+</file>
+
+<file path=customXml/item23.xml><?xml version="1.0" encoding="utf-8"?>
 <Control xmlns="http://schemas.microsoft.com/VisualStudio/2011/storyboarding/control">
   <Id Name="f685762a-9f2c-4532-bec3-d9959b980ef9" Revision="1" Stencil="85a07843-b809-41ee-b566-325b1850150a" StencilVersion="1.0"/>
 </Control>
 </file>
 
-<file path=customXml/item11.xml><?xml version="1.0" encoding="utf-8"?>
+<file path=customXml/item24.xml><?xml version="1.0" encoding="utf-8"?>
+<Control xmlns="http://schemas.microsoft.com/VisualStudio/2011/storyboarding/control">
+  <Id Name="45617f0c-a378-4d86-8073-87fd3c9eb064" Revision="1" Stencil="System.MyShapes" StencilVersion="1.0"/>
+</Control>
+</file>
+
+<file path=customXml/item25.xml><?xml version="1.0" encoding="utf-8"?>
+<Control xmlns="http://schemas.microsoft.com/VisualStudio/2011/storyboarding/control">
+  <Id Name="9d49edfc-cd80-4200-a8a3-34a19b2cba5d" Revision="1" Stencil="System.MyShapes" StencilVersion="1.0"/>
+</Control>
+</file>
+
+<file path=customXml/item26.xml><?xml version="1.0" encoding="utf-8"?>
+<Control xmlns="http://schemas.microsoft.com/VisualStudio/2011/storyboarding/control">
+  <Id Name="3af3c69d-e93c-4e90-95f5-13afa1a89449" Revision="1" Stencil="85a07843-b809-41ee-b566-325b1850150a" StencilVersion="1.0"/>
+</Control>
+</file>
+
+<file path=customXml/item27.xml><?xml version="1.0" encoding="utf-8"?>
+<Control xmlns="http://schemas.microsoft.com/VisualStudio/2011/storyboarding/control">
+  <Id Name="549462a7-f42c-41c4-9567-9f76c2862004" Revision="3" Stencil="System.MyShapes" StencilVersion="1.0"/>
+</Control>
+</file>
+
+<file path=customXml/item28.xml><?xml version="1.0" encoding="utf-8"?>
+<Control xmlns="http://schemas.microsoft.com/VisualStudio/2011/storyboarding/control">
+  <Id Name="4837c2c1-9271-4636-b45d-293fac782f46" Revision="1" Stencil="System.MyShapes" StencilVersion="1.0"/>
+</Control>
+</file>
+
+<file path=customXml/item29.xml><?xml version="1.0" encoding="utf-8"?>
+<Control xmlns="http://schemas.microsoft.com/VisualStudio/2011/storyboarding/control">
+  <Id Name="b498fdc2-67f2-4de5-899f-26683373e8ad" Revision="1" Stencil="System.MyShapes" StencilVersion="1.0"/>
+</Control>
+</file>
+
+<file path=customXml/item3.xml><?xml version="1.0" encoding="utf-8"?>
+<Control xmlns="http://schemas.microsoft.com/VisualStudio/2011/storyboarding/control">
+  <Id Name="4d1c8ce6-dc2b-440e-b588-61b5729cf52d" Revision="1" Stencil="85a07843-b809-41ee-b566-325b1850150a" StencilVersion="1.0"/>
+</Control>
+</file>
+
+<file path=customXml/item30.xml><?xml version="1.0" encoding="utf-8"?>
+<Control xmlns="http://schemas.microsoft.com/VisualStudio/2011/storyboarding/control">
+  <Id Name="System.Storyboarding.Icons.User" Revision="1" Stencil="System.Storyboarding.Icons" StencilVersion="0.1"/>
+</Control>
+</file>
+
+<file path=customXml/item31.xml><?xml version="1.0" encoding="utf-8"?>
 <Control xmlns="http://schemas.microsoft.com/VisualStudio/2011/storyboarding/control">
   <Id Name="System.Storyboarding.Common.Text" Revision="1" Stencil="System.Storyboarding.Common" StencilVersion="0.1"/>
 </Control>
 </file>
 
-<file path=customXml/item12.xml><?xml version="1.0" encoding="utf-8"?>
+<file path=customXml/item32.xml><?xml version="1.0" encoding="utf-8"?>
+<Control xmlns="http://schemas.microsoft.com/VisualStudio/2011/storyboarding/control">
+  <Id Name="8e7bc36a-eab6-47ca-abb8-86f7bf9f67c9" Revision="3" Stencil="System.MyShapes" StencilVersion="1.0"/>
+</Control>
+</file>
+
+<file path=customXml/item33.xml><?xml version="1.0" encoding="utf-8"?>
+<Control xmlns="http://schemas.microsoft.com/VisualStudio/2011/storyboarding/control">
+  <Id Name="ddd70b22-80c2-4e8f-8067-b8dcf2af7c0b" Revision="3" Stencil="System.MyShapes" StencilVersion="1.0"/>
+</Control>
+</file>
+
+<file path=customXml/item34.xml><?xml version="1.0" encoding="utf-8"?>
+<Control xmlns="http://schemas.microsoft.com/VisualStudio/2011/storyboarding/control">
+  <Id Name="6ddb99ab-d8e2-461f-b3a0-8c3903bf34a7" Revision="1" Stencil="System.MyShapes" StencilVersion="1.0"/>
+</Control>
+</file>
+
+<file path=customXml/item35.xml><?xml version="1.0" encoding="utf-8"?>
+<Control xmlns="http://schemas.microsoft.com/VisualStudio/2011/storyboarding/control">
+  <Id Name="add342ac-430c-4877-8f87-437e216caf6b" Revision="1" Stencil="System.MyShapes" StencilVersion="1.0"/>
+</Control>
+</file>
+
+<file path=customXml/item36.xml><?xml version="1.0" encoding="utf-8"?>
+<Control xmlns="http://schemas.microsoft.com/VisualStudio/2011/storyboarding/control">
+  <Id Name="94a64934-5db3-47cf-96df-f3eb1ee28c2b" Revision="1" Stencil="System.MyShapes" StencilVersion="1.0"/>
+</Control>
+</file>
+
+<file path=customXml/item37.xml><?xml version="1.0" encoding="utf-8"?>
+<Control xmlns="http://schemas.microsoft.com/VisualStudio/2011/storyboarding/control">
+  <Id Name="9558e425-a15a-4a2a-8c7d-369dc6767849" Revision="1" Stencil="09ee8e29-8a48-4e3d-a569-7c1ba11c2e3d" StencilVersion="1.0"/>
+</Control>
+</file>
+
+<file path=customXml/item38.xml><?xml version="1.0" encoding="utf-8"?>
+<Control xmlns="http://schemas.microsoft.com/VisualStudio/2011/storyboarding/control">
+  <Id Name="461b790a-5c61-4d93-8e5b-5f34a6182b85" Revision="3" Stencil="System.MyShapes" StencilVersion="1.0"/>
+</Control>
+</file>
+
+<file path=customXml/item39.xml><?xml version="1.0" encoding="utf-8"?>
+<Control xmlns="http://schemas.microsoft.com/VisualStudio/2011/storyboarding/control">
+  <Id Name="b498fdc2-67f2-4de5-899f-26683373e8ad" Revision="1" Stencil="System.MyShapes" StencilVersion="1.0"/>
+</Control>
+</file>
+
+<file path=customXml/item4.xml><?xml version="1.0" encoding="utf-8"?>
+<Control xmlns="http://schemas.microsoft.com/VisualStudio/2011/storyboarding/control">
+  <Id Name="System.Storyboarding.Common.Button" Revision="1" Stencil="System.Storyboarding.Common" StencilVersion="0.1"/>
+</Control>
+</file>
+
+<file path=customXml/item40.xml><?xml version="1.0" encoding="utf-8"?>
+<Control xmlns="http://schemas.microsoft.com/VisualStudio/2011/storyboarding/control">
+  <Id Name="e86b6df1-c5a7-46e8-b789-cae60d6c7d17" Revision="1" Stencil="System.MyShapes" StencilVersion="1.0"/>
+</Control>
+</file>
+
+<file path=customXml/item41.xml><?xml version="1.0" encoding="utf-8"?>
+<Control xmlns="http://schemas.microsoft.com/VisualStudio/2011/storyboarding/control">
+  <Id Name="f685762a-9f2c-4532-bec3-d9959b980ef9" Revision="1" Stencil="85a07843-b809-41ee-b566-325b1850150a" StencilVersion="1.0"/>
+</Control>
+</file>
+
+<file path=customXml/item42.xml><?xml version="1.0" encoding="utf-8"?>
+<Control xmlns="http://schemas.microsoft.com/VisualStudio/2011/storyboarding/control">
+  <Id Name="ff64700b-c289-4a2d-96f8-d311265dd998" Revision="2" Stencil="System.MyShapes" StencilVersion="1.0"/>
+</Control>
+</file>
+
+<file path=customXml/item43.xml><?xml version="1.0" encoding="utf-8"?>
+<Control xmlns="http://schemas.microsoft.com/VisualStudio/2011/storyboarding/control">
+  <Id Name="System.Storyboarding.Common.Text" Revision="1" Stencil="System.Storyboarding.Common" StencilVersion="0.1"/>
+</Control>
+</file>
+
+<file path=customXml/item44.xml><?xml version="1.0" encoding="utf-8"?>
 <Control xmlns="http://schemas.microsoft.com/VisualStudio/2011/storyboarding/control">
   <Id Name="38644b22-1525-488b-b218-0f27ea6cb84d" Revision="1" Stencil="System.MyShapes" StencilVersion="1.0"/>
 </Control>
 </file>
 
-<file path=customXml/item13.xml><?xml version="1.0" encoding="utf-8"?>
+<file path=customXml/item45.xml><?xml version="1.0" encoding="utf-8"?>
 <Control xmlns="http://schemas.microsoft.com/VisualStudio/2011/storyboarding/control">
-  <Id Name="6ddb99ab-d8e2-461f-b3a0-8c3903bf34a7" Revision="1" Stencil="System.MyShapes" StencilVersion="1.0"/>
+  <Id Name="add342ac-430c-4877-8f87-437e216caf6b" Revision="1" Stencil="System.MyShapes" StencilVersion="1.0"/>
 </Control>
 </file>
 
-<file path=customXml/item14.xml><?xml version="1.0" encoding="utf-8"?>
+<file path=customXml/item46.xml><?xml version="1.0" encoding="utf-8"?>
 <Control xmlns="http://schemas.microsoft.com/VisualStudio/2011/storyboarding/control">
-  <Id Name="8e7bc36a-eab6-47ca-abb8-86f7bf9f67c9" Revision="3" Stencil="System.MyShapes" StencilVersion="1.0"/>
+  <Id Name="f685762a-9f2c-4532-bec3-d9959b980ef9" Revision="1" Stencil="85a07843-b809-41ee-b566-325b1850150a" StencilVersion="1.0"/>
 </Control>
 </file>
 
-<file path=customXml/item15.xml><?xml version="1.0" encoding="utf-8"?>
+<file path=customXml/item47.xml><?xml version="1.0" encoding="utf-8"?>
 <Control xmlns="http://schemas.microsoft.com/VisualStudio/2011/storyboarding/control">
-  <Id Name="06847451-0bea-4bb1-ad11-52311f8931c4" Revision="1" Stencil="System.MyShapes" StencilVersion="1.0"/>
+  <Id Name="94a64934-5db3-47cf-96df-f3eb1ee28c2b" Revision="1" Stencil="System.MyShapes" StencilVersion="1.0"/>
 </Control>
 </file>
 
-<file path=customXml/item16.xml><?xml version="1.0" encoding="utf-8"?>
+<file path=customXml/item48.xml><?xml version="1.0" encoding="utf-8"?>
+<Control xmlns="http://schemas.microsoft.com/VisualStudio/2011/storyboarding/control">
+  <Id Name="System.Storyboarding.WindowsAppIcons.Plus" Revision="1" Stencil="System.Storyboarding.WindowsAppIcons" StencilVersion="0.1"/>
+</Control>
+</file>
+
+<file path=customXml/item49.xml><?xml version="1.0" encoding="utf-8"?>
+<Control xmlns="http://schemas.microsoft.com/VisualStudio/2011/storyboarding/control">
+  <Id Name="aa7caf86-934b-4e25-b308-65b6ffb256da" Revision="4" Stencil="System.MyShapes" StencilVersion="1.0"/>
+</Control>
+</file>
+
+<file path=customXml/item5.xml><?xml version="1.0" encoding="utf-8"?>
 <Control xmlns="http://schemas.microsoft.com/VisualStudio/2011/storyboarding/control">
   <Id Name="1f092a44-b74f-4007-bdae-1c8fc6646a9d" Revision="1" Stencil="System.MyShapes" StencilVersion="1.0"/>
 </Control>
 </file>
 
-<file path=customXml/item17.xml><?xml version="1.0" encoding="utf-8"?>
+<file path=customXml/item50.xml><?xml version="1.0" encoding="utf-8"?>
 <Control xmlns="http://schemas.microsoft.com/VisualStudio/2011/storyboarding/control">
-  <Id Name="add342ac-430c-4877-8f87-437e216caf6b" Revision="1" Stencil="System.MyShapes" StencilVersion="1.0"/>
+  <Id Name="e86b6df1-c5a7-46e8-b789-cae60d6c7d17" Revision="1" Stencil="System.MyShapes" StencilVersion="1.0"/>
 </Control>
 </file>
 
-<file path=customXml/item18.xml><?xml version="1.0" encoding="utf-8"?>
-<Control xmlns="http://schemas.microsoft.com/VisualStudio/2011/storyboarding/control">
-  <Id Name="8e7bc36a-eab6-47ca-abb8-86f7bf9f67c9" Revision="3" Stencil="System.MyShapes" StencilVersion="1.0"/>
-</Control>
-</file>
-
-<file path=customXml/item19.xml><?xml version="1.0" encoding="utf-8"?>
+<file path=customXml/item51.xml><?xml version="1.0" encoding="utf-8"?>
 <Control xmlns="http://schemas.microsoft.com/VisualStudio/2011/storyboarding/control">
   <Id Name="45617f0c-a378-4d86-8073-87fd3c9eb064" Revision="1" Stencil="System.MyShapes" StencilVersion="1.0"/>
 </Control>
 </file>
 
-<file path=customXml/item2.xml><?xml version="1.0" encoding="utf-8"?>
-<Control xmlns="http://schemas.microsoft.com/VisualStudio/2011/storyboarding/control">
-  <Id Name="System.Storyboarding.Common.Button" Revision="1" Stencil="System.Storyboarding.Common" StencilVersion="0.1"/>
-</Control>
-</file>
-
-<file path=customXml/item20.xml><?xml version="1.0" encoding="utf-8"?>
-<Control xmlns="http://schemas.microsoft.com/VisualStudio/2011/storyboarding/control">
-  <Id Name="45617f0c-a378-4d86-8073-87fd3c9eb064" Revision="1" Stencil="System.MyShapes" StencilVersion="1.0"/>
-</Control>
-</file>
-
-<file path=customXml/item21.xml><?xml version="1.0" encoding="utf-8"?>
-<Control xmlns="http://schemas.microsoft.com/VisualStudio/2011/storyboarding/control">
-  <Id Name="9d49edfc-cd80-4200-a8a3-34a19b2cba5d" Revision="1" Stencil="System.MyShapes" StencilVersion="1.0"/>
-</Control>
-</file>
-
-<file path=customXml/item22.xml><?xml version="1.0" encoding="utf-8"?>
-<Control xmlns="http://schemas.microsoft.com/VisualStudio/2011/storyboarding/control">
-  <Id Name="ddd70b22-80c2-4e8f-8067-b8dcf2af7c0b" Revision="3" Stencil="System.MyShapes" StencilVersion="1.0"/>
-</Control>
-</file>
-
-<file path=customXml/item23.xml><?xml version="1.0" encoding="utf-8"?>
-<Control xmlns="http://schemas.microsoft.com/VisualStudio/2011/storyboarding/control">
-  <Id Name="51d6c810-a27b-4ddb-8dd6-2e1e1b3c5e44" Revision="1" Stencil="System.MyShapes" StencilVersion="1.0"/>
-</Control>
-</file>
-
-<file path=customXml/item24.xml><?xml version="1.0" encoding="utf-8"?>
-<Control xmlns="http://schemas.microsoft.com/VisualStudio/2011/storyboarding/control">
-  <Id Name="153824eb-93cd-41fb-aad3-7d03f88f47af" Revision="1" Stencil="System.MyShapes" StencilVersion="1.0"/>
-</Control>
-</file>
-
-<file path=customXml/item25.xml><?xml version="1.0" encoding="utf-8"?>
-<Control xmlns="http://schemas.microsoft.com/VisualStudio/2011/storyboarding/control">
-  <Id Name="f685762a-9f2c-4532-bec3-d9959b980ef9" Revision="1" Stencil="85a07843-b809-41ee-b566-325b1850150a" StencilVersion="1.0"/>
-</Control>
-</file>
-
-<file path=customXml/item26.xml><?xml version="1.0" encoding="utf-8"?>
-<Control xmlns="http://schemas.microsoft.com/VisualStudio/2011/storyboarding/control">
-  <Id Name="System.Storyboarding.Common.Text" Revision="1" Stencil="System.Storyboarding.Common" StencilVersion="0.1"/>
-</Control>
-</file>
-
-<file path=customXml/item27.xml><?xml version="1.0" encoding="utf-8"?>
-<Control xmlns="http://schemas.microsoft.com/VisualStudio/2011/storyboarding/control">
-  <Id Name="6ddb99ab-d8e2-461f-b3a0-8c3903bf34a7" Revision="1" Stencil="System.MyShapes" StencilVersion="1.0"/>
-</Control>
-</file>
-
-<file path=customXml/item28.xml><?xml version="1.0" encoding="utf-8"?>
-<Control xmlns="http://schemas.microsoft.com/VisualStudio/2011/storyboarding/control">
-  <Id Name="06847451-0bea-4bb1-ad11-52311f8931c4" Revision="1" Stencil="System.MyShapes" StencilVersion="1.0"/>
-</Control>
-</file>
-
-<file path=customXml/item29.xml><?xml version="1.0" encoding="utf-8"?>
-<Control xmlns="http://schemas.microsoft.com/VisualStudio/2011/storyboarding/control">
-  <Id Name="1f092a44-b74f-4007-bdae-1c8fc6646a9d" Revision="1" Stencil="System.MyShapes" StencilVersion="1.0"/>
-</Control>
-</file>
-
-<file path=customXml/item3.xml><?xml version="1.0" encoding="utf-8"?>
-<Control xmlns="http://schemas.microsoft.com/VisualStudio/2011/storyboarding/control">
-  <Id Name="System.Storyboarding.Common.Text" Revision="1" Stencil="System.Storyboarding.Common" StencilVersion="0.1"/>
-</Control>
-</file>
-
-<file path=customXml/item30.xml><?xml version="1.0" encoding="utf-8"?>
-<Control xmlns="http://schemas.microsoft.com/VisualStudio/2011/storyboarding/control">
-  <Id Name="add342ac-430c-4877-8f87-437e216caf6b" Revision="1" Stencil="System.MyShapes" StencilVersion="1.0"/>
-</Control>
-</file>
-
-<file path=customXml/item31.xml><?xml version="1.0" encoding="utf-8"?>
-<Control xmlns="http://schemas.microsoft.com/VisualStudio/2011/storyboarding/control">
-  <Id Name="9d49edfc-cd80-4200-a8a3-34a19b2cba5d" Revision="1" Stencil="System.MyShapes" StencilVersion="1.0"/>
-</Control>
-</file>
-
-<file path=customXml/item32.xml><?xml version="1.0" encoding="utf-8"?>
-<Control xmlns="http://schemas.microsoft.com/VisualStudio/2011/storyboarding/control">
-  <Id Name="10b0aa5a-d420-45da-bed6-67d74a2c246d" Revision="1" Stencil="System.MyShapes" StencilVersion="1.0"/>
-</Control>
-</file>
-
-<file path=customXml/item33.xml><?xml version="1.0" encoding="utf-8"?>
-<Control xmlns="http://schemas.microsoft.com/VisualStudio/2011/storyboarding/control">
-  <Id Name="94a64934-5db3-47cf-96df-f3eb1ee28c2b" Revision="1" Stencil="System.MyShapes" StencilVersion="1.0"/>
-</Control>
-</file>
-
-<file path=customXml/item34.xml><?xml version="1.0" encoding="utf-8"?>
-<Control xmlns="http://schemas.microsoft.com/VisualStudio/2011/storyboarding/control">
-  <Id Name="94a64934-5db3-47cf-96df-f3eb1ee28c2b" Revision="1" Stencil="System.MyShapes" StencilVersion="1.0"/>
-</Control>
-</file>
-
-<file path=customXml/item35.xml><?xml version="1.0" encoding="utf-8"?>
-<Control xmlns="http://schemas.microsoft.com/VisualStudio/2011/storyboarding/control">
-  <Id Name="94a64934-5db3-47cf-96df-f3eb1ee28c2b" Revision="1" Stencil="System.MyShapes" StencilVersion="1.0"/>
-</Control>
-</file>
-
-<file path=customXml/item36.xml><?xml version="1.0" encoding="utf-8"?>
-<Control xmlns="http://schemas.microsoft.com/VisualStudio/2011/storyboarding/control">
-  <Id Name="9558e425-a15a-4a2a-8c7d-369dc6767849" Revision="1" Stencil="09ee8e29-8a48-4e3d-a569-7c1ba11c2e3d" StencilVersion="1.0"/>
-</Control>
-</file>
-
-<file path=customXml/item37.xml><?xml version="1.0" encoding="utf-8"?>
-<Control xmlns="http://schemas.microsoft.com/VisualStudio/2011/storyboarding/control">
-  <Id Name="32035d07-bc66-4a79-8001-2507012193e3" RevisionId="7f6cc906-8fab-4878-8f41-90bcdc4e860e" Stencil="172d6d98-e5c9-42e9-a209-79f7a94bbd38" StencilRevisionId="00000000-0000-0000-0000-000000000000" StencilVersion="0.0"/>
-</Control>
-</file>
-
-<file path=customXml/item38.xml><?xml version="1.0" encoding="utf-8"?>
-<Control xmlns="http://schemas.microsoft.com/VisualStudio/2011/storyboarding/control">
-  <Id Name="System.Storyboarding.WindowsAppIcons.Plus" Revision="1" Stencil="System.Storyboarding.WindowsAppIcons" StencilVersion="0.1"/>
-</Control>
-</file>
-
-<file path=customXml/item39.xml><?xml version="1.0" encoding="utf-8"?>
-<Control xmlns="http://schemas.microsoft.com/VisualStudio/2011/storyboarding/control">
-  <Id Name="System.Storyboarding.WindowsPhoneIcons.Add" Revision="1" Stencil="System.Storyboarding.WindowsPhoneIcons" StencilVersion="0.1"/>
-</Control>
-</file>
-
-<file path=customXml/item4.xml><?xml version="1.0" encoding="utf-8"?>
-<Control xmlns="http://schemas.microsoft.com/VisualStudio/2011/storyboarding/control">
-  <Id Name="System.Storyboarding.Icons.User" Revision="1" Stencil="System.Storyboarding.Icons" StencilVersion="0.1"/>
-</Control>
-</file>
-
-<file path=customXml/item40.xml><?xml version="1.0" encoding="utf-8"?>
-<Control xmlns="http://schemas.microsoft.com/VisualStudio/2011/storyboarding/control">
-  <Id Name="3af3c69d-e93c-4e90-95f5-13afa1a89449" Revision="1" Stencil="85a07843-b809-41ee-b566-325b1850150a" StencilVersion="1.0"/>
-</Control>
-</file>
-
-<file path=customXml/item41.xml><?xml version="1.0" encoding="utf-8"?>
+<file path=customXml/item52.xml><?xml version="1.0" encoding="utf-8"?>
 <Control xmlns="http://schemas.microsoft.com/VisualStudio/2011/storyboarding/control">
   <Id Name="ddd70b22-80c2-4e8f-8067-b8dcf2af7c0b" Revision="4" Stencil="System.MyShapes" StencilVersion="1.0"/>
 </Control>
 </file>
 
-<file path=customXml/item42.xml><?xml version="1.0" encoding="utf-8"?>
-<Control xmlns="http://schemas.microsoft.com/VisualStudio/2011/storyboarding/control">
-  <Id Name="a81ff87b-4b1c-4e99-a585-96ecfb9f65b8" Revision="1" Stencil="System.MyShapes" StencilVersion="1.0"/>
-</Control>
-</file>
-
-<file path=customXml/item43.xml><?xml version="1.0" encoding="utf-8"?>
-<Control xmlns="http://schemas.microsoft.com/VisualStudio/2011/storyboarding/control">
-  <Id Name="9558e425-a15a-4a2a-8c7d-369dc6767849" Revision="1" Stencil="09ee8e29-8a48-4e3d-a569-7c1ba11c2e3d" StencilVersion="1.0"/>
-</Control>
-</file>
-
-<file path=customXml/item44.xml><?xml version="1.0" encoding="utf-8"?>
-<Control xmlns="http://schemas.microsoft.com/VisualStudio/2011/storyboarding/control">
-  <Id Name="3af3c69d-e93c-4e90-95f5-13afa1a89449" Revision="1" Stencil="85a07843-b809-41ee-b566-325b1850150a" StencilVersion="1.0"/>
-</Control>
-</file>
-
-<file path=customXml/item45.xml><?xml version="1.0" encoding="utf-8"?>
+<file path=customXml/item53.xml><?xml version="1.0" encoding="utf-8"?>
 <Control xmlns="http://schemas.microsoft.com/VisualStudio/2011/storyboarding/control">
   <Id Name="4837c2c1-9271-4636-b45d-293fac782f46" Revision="1" Stencil="System.MyShapes" StencilVersion="1.0"/>
-</Control>
-</file>
-
-<file path=customXml/item46.xml><?xml version="1.0" encoding="utf-8"?>
-<Control xmlns="http://schemas.microsoft.com/VisualStudio/2011/storyboarding/control">
-  <Id Name="aa7caf86-934b-4e25-b308-65b6ffb256da" Revision="4" Stencil="System.MyShapes" StencilVersion="1.0"/>
-</Control>
-</file>
-
-<file path=customXml/item47.xml><?xml version="1.0" encoding="utf-8"?>
-<Control xmlns="http://schemas.microsoft.com/VisualStudio/2011/storyboarding/control">
-  <Id Name="8b305ae9-bdb0-4402-94ff-04df21bd0964" Revision="1" Stencil="System.MyShapes" StencilVersion="1.0"/>
-</Control>
-</file>
-
-<file path=customXml/item48.xml><?xml version="1.0" encoding="utf-8"?>
-<Control xmlns="http://schemas.microsoft.com/VisualStudio/2011/storyboarding/control">
-  <Id Name="461b790a-5c61-4d93-8e5b-5f34a6182b85" Revision="3" Stencil="System.MyShapes" StencilVersion="1.0"/>
-</Control>
-</file>
-
-<file path=customXml/item49.xml><?xml version="1.0" encoding="utf-8"?>
-<Control xmlns="http://schemas.microsoft.com/VisualStudio/2011/storyboarding/control">
-  <Id Name="605c907b-8b5e-4fc3-b9d8-4a5bfe8c9d4f" Revision="3" Stencil="System.MyShapes" StencilVersion="1.0"/>
-</Control>
-</file>
-
-<file path=customXml/item5.xml><?xml version="1.0" encoding="utf-8"?>
-<Control xmlns="http://schemas.microsoft.com/VisualStudio/2011/storyboarding/control">
-  <Id Name="ee84670b-81f4-4bf6-a9a4-a5d58c3f8a95" Revision="1" Stencil="85a07843-b809-41ee-b566-325b1850150a" StencilVersion="1.0"/>
-</Control>
-</file>
-
-<file path=customXml/item50.xml><?xml version="1.0" encoding="utf-8"?>
-<Control xmlns="http://schemas.microsoft.com/VisualStudio/2011/storyboarding/control">
-  <Id Name="ff64700b-c289-4a2d-96f8-d311265dd998" Revision="1" Stencil="System.MyShapes" StencilVersion="1.0"/>
-</Control>
-</file>
-
-<file path=customXml/item51.xml><?xml version="1.0" encoding="utf-8"?>
-<Control xmlns="http://schemas.microsoft.com/VisualStudio/2011/storyboarding/control">
-  <Id Name="ff64700b-c289-4a2d-96f8-d311265dd998" Revision="2" Stencil="System.MyShapes" StencilVersion="1.0"/>
-</Control>
-</file>
-
-<file path=customXml/item52.xml><?xml version="1.0" encoding="utf-8"?>
-<Control xmlns="http://schemas.microsoft.com/VisualStudio/2011/storyboarding/control">
-  <Id Name="549462a7-f42c-41c4-9567-9f76c2862004" Revision="3" Stencil="System.MyShapes" StencilVersion="1.0"/>
-</Control>
-</file>
-
-<file path=customXml/item53.xml><?xml version="1.0" encoding="utf-8"?>
-<Control xmlns="http://schemas.microsoft.com/VisualStudio/2011/storyboarding/control">
-  <Id Name="555e62f6-1a9c-4a1c-b658-df5e97a4e85c" Revision="1" Stencil="System.MyShapes" StencilVersion="1.0"/>
 </Control>
 </file>
 
@@ -8087,95 +9598,639 @@
 
 <file path=customXml/item55.xml><?xml version="1.0" encoding="utf-8"?>
 <Control xmlns="http://schemas.microsoft.com/VisualStudio/2011/storyboarding/control">
+  <Id Name="System.Storyboarding.WindowsApps.WindowsAppsTileMediumText" Revision="1" Stencil="System.Storyboarding.WindowsApps" StencilVersion="0.1"/>
+</Control>
+</file>
+
+<file path=customXml/item56.xml><?xml version="1.0" encoding="utf-8"?>
+<Control xmlns="http://schemas.microsoft.com/VisualStudio/2011/storyboarding/control">
+  <Id Name="e80f86ae-996a-42c4-b08b-54613c6824e2" Revision="1" Stencil="85a07843-b809-41ee-b566-325b1850150a" StencilVersion="1.0"/>
+</Control>
+</file>
+
+<file path=customXml/item57.xml><?xml version="1.0" encoding="utf-8"?>
+<Control xmlns="http://schemas.microsoft.com/VisualStudio/2011/storyboarding/control">
+  <Id Name="6ddb99ab-d8e2-461f-b3a0-8c3903bf34a7" Revision="1" Stencil="System.MyShapes" StencilVersion="1.0"/>
+</Control>
+</file>
+
+<file path=customXml/item58.xml><?xml version="1.0" encoding="utf-8"?>
+<Control xmlns="http://schemas.microsoft.com/VisualStudio/2011/storyboarding/control">
+  <Id Name="8e7bc36a-eab6-47ca-abb8-86f7bf9f67c9" Revision="3" Stencil="System.MyShapes" StencilVersion="1.0"/>
+</Control>
+</file>
+
+<file path=customXml/item59.xml><?xml version="1.0" encoding="utf-8"?>
+<Control xmlns="http://schemas.microsoft.com/VisualStudio/2011/storyboarding/control">
+  <Id Name="System.Storyboarding.Common.Text" Revision="1" Stencil="System.Storyboarding.Common" StencilVersion="0.1"/>
+</Control>
+</file>
+
+<file path=customXml/item6.xml><?xml version="1.0" encoding="utf-8"?>
+<Control xmlns="http://schemas.microsoft.com/VisualStudio/2011/storyboarding/control">
+  <Id Name="1f092a44-b74f-4007-bdae-1c8fc6646a9d" Revision="1" Stencil="System.MyShapes" StencilVersion="1.0"/>
+</Control>
+</file>
+
+<file path=customXml/item60.xml><?xml version="1.0" encoding="utf-8"?>
+<Control xmlns="http://schemas.microsoft.com/VisualStudio/2011/storyboarding/control">
+  <Id Name="System.Storyboarding.WindowsPhoneIcons.Add" Revision="1" Stencil="System.Storyboarding.WindowsPhoneIcons" StencilVersion="0.1"/>
+</Control>
+</file>
+
+<file path=customXml/item61.xml><?xml version="1.0" encoding="utf-8"?>
+<Control xmlns="http://schemas.microsoft.com/VisualStudio/2011/storyboarding/control">
+  <Id Name="9d49edfc-cd80-4200-a8a3-34a19b2cba5d" Revision="1" Stencil="System.MyShapes" StencilVersion="1.0"/>
+</Control>
+</file>
+
+<file path=customXml/item62.xml><?xml version="1.0" encoding="utf-8"?>
+<Control xmlns="http://schemas.microsoft.com/VisualStudio/2011/storyboarding/control">
   <Id Name="94a64934-5db3-47cf-96df-f3eb1ee28c2b" Revision="1" Stencil="System.MyShapes" StencilVersion="1.0"/>
 </Control>
 </file>
 
-<file path=customXml/item56.xml><?xml version="1.0" encoding="utf-8"?>
+<file path=customXml/item63.xml><?xml version="1.0" encoding="utf-8"?>
+<Control xmlns="http://schemas.microsoft.com/VisualStudio/2011/storyboarding/control">
+  <Id Name="a81ff87b-4b1c-4e99-a585-96ecfb9f65b8" Revision="1" Stencil="System.MyShapes" StencilVersion="1.0"/>
+</Control>
+</file>
+
+<file path=customXml/item64.xml><?xml version="1.0" encoding="utf-8"?>
+<Control xmlns="http://schemas.microsoft.com/VisualStudio/2011/storyboarding/control">
+  <Id Name="8b305ae9-bdb0-4402-94ff-04df21bd0964" Revision="1" Stencil="System.MyShapes" StencilVersion="1.0"/>
+</Control>
+</file>
+
+<file path=customXml/item65.xml><?xml version="1.0" encoding="utf-8"?>
+<Control xmlns="http://schemas.microsoft.com/VisualStudio/2011/storyboarding/control">
+  <Id Name="ff64700b-c289-4a2d-96f8-d311265dd998" Revision="1" Stencil="System.MyShapes" StencilVersion="1.0"/>
+</Control>
+</file>
+
+<file path=customXml/item66.xml><?xml version="1.0" encoding="utf-8"?>
+<Control xmlns="http://schemas.microsoft.com/VisualStudio/2011/storyboarding/control">
+  <Id Name="4837c2c1-9271-4636-b45d-293fac782f46" Revision="1" Stencil="System.MyShapes" StencilVersion="1.0"/>
+</Control>
+</file>
+
+<file path=customXml/item67.xml><?xml version="1.0" encoding="utf-8"?>
 <Control xmlns="http://schemas.microsoft.com/VisualStudio/2011/storyboarding/control">
   <Id Name="b498fdc2-67f2-4de5-899f-26683373e8ad" Revision="1" Stencil="System.MyShapes" StencilVersion="1.0"/>
 </Control>
 </file>
 
-<file path=customXml/item57.xml><?xml version="1.0" encoding="utf-8"?>
+<file path=customXml/item68.xml><?xml version="1.0" encoding="utf-8"?>
+<Control xmlns="http://schemas.microsoft.com/VisualStudio/2011/storyboarding/control">
+  <Id Name="System.Storyboarding.Common.DropdownBox" Revision="1" Stencil="System.Storyboarding.Common" StencilVersion="0.1"/>
+</Control>
+</file>
+
+<file path=customXml/item69.xml><?xml version="1.0" encoding="utf-8"?>
+<Control xmlns="http://schemas.microsoft.com/VisualStudio/2011/storyboarding/control">
+  <Id Name="System.Storyboarding.Common.DropdownBox" Revision="1" Stencil="System.Storyboarding.Common" StencilVersion="0.1"/>
+</Control>
+</file>
+
+<file path=customXml/item7.xml><?xml version="1.0" encoding="utf-8"?>
+<Control xmlns="http://schemas.microsoft.com/VisualStudio/2011/storyboarding/control">
+  <Id Name="System.Storyboarding.Common.Text" Revision="1" Stencil="System.Storyboarding.Common" StencilVersion="0.1"/>
+</Control>
+</file>
+
+<file path=customXml/item70.xml><?xml version="1.0" encoding="utf-8"?>
+<Control xmlns="http://schemas.microsoft.com/VisualStudio/2011/storyboarding/control">
+  <Id Name="c2eea951-2796-40b7-81ae-47cd14fa6407" Revision="1" Stencil="System.MyShapes" StencilVersion="1.0"/>
+</Control>
+</file>
+
+<file path=customXml/item71.xml><?xml version="1.0" encoding="utf-8"?>
+<Control xmlns="http://schemas.microsoft.com/VisualStudio/2011/storyboarding/control">
+  <Id Name="System.Storyboarding.Common.MouseClick" Revision="1" Stencil="System.Storyboarding.Common" StencilVersion="0.1"/>
+</Control>
+</file>
+
+<file path=customXml/item72.xml><?xml version="1.0" encoding="utf-8"?>
+<Control xmlns="http://schemas.microsoft.com/VisualStudio/2011/storyboarding/control">
+  <Id Name="System.Storyboarding.Common.MouseClick" Revision="1" Stencil="System.Storyboarding.Common" StencilVersion="0.1"/>
+</Control>
+</file>
+
+<file path=customXml/item73.xml><?xml version="1.0" encoding="utf-8"?>
+<Control xmlns="http://schemas.microsoft.com/VisualStudio/2011/storyboarding/control">
+  <Id Name="a81ff87b-4b1c-4e99-a585-96ecfb9f65b8" Revision="1" Stencil="System.MyShapes" StencilVersion="1.0"/>
+</Control>
+</file>
+
+<file path=customXml/item74.xml><?xml version="1.0" encoding="utf-8"?>
+<Control xmlns="http://schemas.microsoft.com/VisualStudio/2011/storyboarding/control">
+  <Id Name="10b0aa5a-d420-45da-bed6-67d74a2c246d" Revision="1" Stencil="System.MyShapes" StencilVersion="1.0"/>
+</Control>
+</file>
+
+<file path=customXml/item75.xml><?xml version="1.0" encoding="utf-8"?>
+<Control xmlns="http://schemas.microsoft.com/VisualStudio/2011/storyboarding/control">
+  <Id Name="94a64934-5db3-47cf-96df-f3eb1ee28c2b" Revision="1" Stencil="System.MyShapes" StencilVersion="1.0"/>
+</Control>
+</file>
+
+<file path=customXml/item76.xml><?xml version="1.0" encoding="utf-8"?>
+<Control xmlns="http://schemas.microsoft.com/VisualStudio/2011/storyboarding/control">
+  <Id Name="b498fdc2-67f2-4de5-899f-26683373e8ad" Revision="1" Stencil="System.MyShapes" StencilVersion="1.0"/>
+</Control>
+</file>
+
+<file path=customXml/item77.xml><?xml version="1.0" encoding="utf-8"?>
+<Control xmlns="http://schemas.microsoft.com/VisualStudio/2011/storyboarding/control">
+  <Id Name="10b0aa5a-d420-45da-bed6-67d74a2c246d" Revision="1" Stencil="System.MyShapes" StencilVersion="1.0"/>
+</Control>
+</file>
+
+<file path=customXml/item78.xml><?xml version="1.0" encoding="utf-8"?>
+<Control xmlns="http://schemas.microsoft.com/VisualStudio/2011/storyboarding/control">
+  <Id Name="94a64934-5db3-47cf-96df-f3eb1ee28c2b" Revision="1" Stencil="System.MyShapes" StencilVersion="1.0"/>
+</Control>
+</file>
+
+<file path=customXml/item79.xml><?xml version="1.0" encoding="utf-8"?>
 <Control xmlns="http://schemas.microsoft.com/VisualStudio/2011/storyboarding/control">
   <Id Name="4837c2c1-9271-4636-b45d-293fac782f46" Revision="1" Stencil="System.MyShapes" StencilVersion="1.0"/>
 </Control>
 </file>
 
-<file path=customXml/item58.xml><?xml version="1.0" encoding="utf-8"?>
+<file path=customXml/item8.xml><?xml version="1.0" encoding="utf-8"?>
+<Control xmlns="http://schemas.microsoft.com/VisualStudio/2011/storyboarding/control">
+  <Id Name="153824eb-93cd-41fb-aad3-7d03f88f47af" Revision="1" Stencil="System.MyShapes" StencilVersion="1.0"/>
+</Control>
+</file>
+
+<file path=customXml/item80.xml><?xml version="1.0" encoding="utf-8"?>
+<Control xmlns="http://schemas.microsoft.com/VisualStudio/2011/storyboarding/control">
+  <Id Name="4837c2c1-9271-4636-b45d-293fac782f46" Revision="1" Stencil="System.MyShapes" StencilVersion="1.0"/>
+</Control>
+</file>
+
+<file path=customXml/item81.xml><?xml version="1.0" encoding="utf-8"?>
+<Control xmlns="http://schemas.microsoft.com/VisualStudio/2011/storyboarding/control">
+  <Id Name="4837c2c1-9271-4636-b45d-293fac782f46" Revision="1" Stencil="System.MyShapes" StencilVersion="1.0"/>
+</Control>
+</file>
+
+<file path=customXml/item82.xml><?xml version="1.0" encoding="utf-8"?>
 <Control xmlns="http://schemas.microsoft.com/VisualStudio/2011/storyboarding/control">
   <Id Name="b498fdc2-67f2-4de5-899f-26683373e8ad" Revision="1" Stencil="System.MyShapes" StencilVersion="1.0"/>
 </Control>
 </file>
 
-<file path=customXml/item59.xml><?xml version="1.0" encoding="utf-8"?>
+<file path=customXml/item83.xml><?xml version="1.0" encoding="utf-8"?>
 <Control xmlns="http://schemas.microsoft.com/VisualStudio/2011/storyboarding/control">
-  <Id Name="e86b6df1-c5a7-46e8-b789-cae60d6c7d17" Revision="1" Stencil="System.MyShapes" StencilVersion="1.0"/>
+  <Id Name="9f80fa0c-f36e-418c-a39b-dc57c3a44c08" Revision="2" Stencil="System.MyShapes" StencilVersion="1.0"/>
 </Control>
 </file>
 
-<file path=customXml/item6.xml><?xml version="1.0" encoding="utf-8"?>
-<Control xmlns="http://schemas.microsoft.com/VisualStudio/2011/storyboarding/control">
-  <Id Name="e80f86ae-996a-42c4-b08b-54613c6824e2" Revision="1" Stencil="85a07843-b809-41ee-b566-325b1850150a" StencilVersion="1.0"/>
-</Control>
-</file>
-
-<file path=customXml/item60.xml><?xml version="1.0" encoding="utf-8"?>
+<file path=customXml/item84.xml><?xml version="1.0" encoding="utf-8"?>
 <Control xmlns="http://schemas.microsoft.com/VisualStudio/2011/storyboarding/control">
   <Id Name="4837c2c1-9271-4636-b45d-293fac782f46" Revision="1" Stencil="System.MyShapes" StencilVersion="1.0"/>
 </Control>
 </file>
 
-<file path=customXml/item61.xml><?xml version="1.0" encoding="utf-8"?>
+<file path=customXml/item85.xml><?xml version="1.0" encoding="utf-8"?>
 <Control xmlns="http://schemas.microsoft.com/VisualStudio/2011/storyboarding/control">
   <Id Name="b498fdc2-67f2-4de5-899f-26683373e8ad" Revision="1" Stencil="System.MyShapes" StencilVersion="1.0"/>
 </Control>
 </file>
 
-<file path=customXml/item62.xml><?xml version="1.0" encoding="utf-8"?>
+<file path=customXml/item86.xml><?xml version="1.0" encoding="utf-8"?>
 <Control xmlns="http://schemas.microsoft.com/VisualStudio/2011/storyboarding/control">
-  <Id Name="4837c2c1-9271-4636-b45d-293fac782f46" Revision="1" Stencil="System.MyShapes" StencilVersion="1.0"/>
+  <Id Name="9f80fa0c-f36e-418c-a39b-dc57c3a44c08" Revision="2" Stencil="System.MyShapes" StencilVersion="1.0"/>
 </Control>
 </file>
 
-<file path=customXml/item63.xml><?xml version="1.0" encoding="utf-8"?>
+<file path=customXml/item87.xml><?xml version="1.0" encoding="utf-8"?>
 <Control xmlns="http://schemas.microsoft.com/VisualStudio/2011/storyboarding/control">
-  <Id Name="b498fdc2-67f2-4de5-899f-26683373e8ad" Revision="1" Stencil="System.MyShapes" StencilVersion="1.0"/>
+  <Id Name="System.Storyboarding.Common.DatePicker" Revision="1" Stencil="System.Storyboarding.Common" StencilVersion="0.1"/>
 </Control>
 </file>
 
-<file path=customXml/item64.xml><?xml version="1.0" encoding="utf-8"?>
+<file path=customXml/item88.xml><?xml version="1.0" encoding="utf-8"?>
 <Control xmlns="http://schemas.microsoft.com/VisualStudio/2011/storyboarding/control">
-  <Id Name="e86b6df1-c5a7-46e8-b789-cae60d6c7d17" Revision="1" Stencil="System.MyShapes" StencilVersion="1.0"/>
+  <Id Name="System.Storyboarding.Common.DatePicker" Revision="1" Stencil="System.Storyboarding.Common" StencilVersion="0.1"/>
 </Control>
 </file>
 
-<file path=customXml/item65.xml><?xml version="1.0" encoding="utf-8"?>
+<file path=customXml/item89.xml><?xml version="1.0" encoding="utf-8"?>
 <Control xmlns="http://schemas.microsoft.com/VisualStudio/2011/storyboarding/control">
-  <Id Name="b498fdc2-67f2-4de5-899f-26683373e8ad" Revision="1" Stencil="System.MyShapes" StencilVersion="1.0"/>
-</Control>
-</file>
-
-<file path=customXml/item7.xml><?xml version="1.0" encoding="utf-8"?>
-<Control xmlns="http://schemas.microsoft.com/VisualStudio/2011/storyboarding/control">
-  <Id Name="4d1c8ce6-dc2b-440e-b588-61b5729cf52d" Revision="1" Stencil="85a07843-b809-41ee-b566-325b1850150a" StencilVersion="1.0"/>
-</Control>
-</file>
-
-<file path=customXml/item8.xml><?xml version="1.0" encoding="utf-8"?>
-<Control xmlns="http://schemas.microsoft.com/VisualStudio/2011/storyboarding/control">
-  <Id Name="f685762a-9f2c-4532-bec3-d9959b980ef9" Revision="1" Stencil="85a07843-b809-41ee-b566-325b1850150a" StencilVersion="1.0"/>
+  <Id Name="44831f5f-40f2-4def-a193-92e5a2072f0a" Revision="1" Stencil="System.MyShapes" StencilVersion="1.0"/>
 </Control>
 </file>
 
 <file path=customXml/item9.xml><?xml version="1.0" encoding="utf-8"?>
 <Control xmlns="http://schemas.microsoft.com/VisualStudio/2011/storyboarding/control">
-  <Id Name="System.Storyboarding.Common.Text" Revision="1" Stencil="System.Storyboarding.Common" StencilVersion="0.1"/>
+  <Id Name="10b0aa5a-d420-45da-bed6-67d74a2c246d" Revision="1" Stencil="System.MyShapes" StencilVersion="1.0"/>
 </Control>
 </file>
 
 <file path=customXml/itemProps1.xml><?xml version="1.0" encoding="utf-8"?>
+<ds:datastoreItem xmlns:ds="http://schemas.openxmlformats.org/officeDocument/2006/customXml" ds:itemID="{EB537FFA-BDFE-4B5C-A7BF-B70BEBF50B70}">
+  <ds:schemaRefs>
+    <ds:schemaRef ds:uri="http://schemas.microsoft.com/VisualStudio/2011/storyboarding/control"/>
+  </ds:schemaRefs>
+</ds:datastoreItem>
+</file>
+
+<file path=customXml/itemProps10.xml><?xml version="1.0" encoding="utf-8"?>
+<ds:datastoreItem xmlns:ds="http://schemas.openxmlformats.org/officeDocument/2006/customXml" ds:itemID="{A4C33EEA-7075-4651-97E3-4829E38E21EA}">
+  <ds:schemaRefs>
+    <ds:schemaRef ds:uri="http://schemas.microsoft.com/VisualStudio/2011/storyboarding/control"/>
+  </ds:schemaRefs>
+</ds:datastoreItem>
+</file>
+
+<file path=customXml/itemProps11.xml><?xml version="1.0" encoding="utf-8"?>
+<ds:datastoreItem xmlns:ds="http://schemas.openxmlformats.org/officeDocument/2006/customXml" ds:itemID="{76F1EE43-31A0-4919-A618-DFAA86460D6E}">
+  <ds:schemaRefs>
+    <ds:schemaRef ds:uri="http://schemas.microsoft.com/VisualStudio/2011/storyboarding/control"/>
+  </ds:schemaRefs>
+</ds:datastoreItem>
+</file>
+
+<file path=customXml/itemProps12.xml><?xml version="1.0" encoding="utf-8"?>
+<ds:datastoreItem xmlns:ds="http://schemas.openxmlformats.org/officeDocument/2006/customXml" ds:itemID="{E838889A-C741-48DA-8FAC-50ADAD37F748}">
+  <ds:schemaRefs>
+    <ds:schemaRef ds:uri="http://schemas.microsoft.com/VisualStudio/2011/storyboarding/control"/>
+  </ds:schemaRefs>
+</ds:datastoreItem>
+</file>
+
+<file path=customXml/itemProps13.xml><?xml version="1.0" encoding="utf-8"?>
+<ds:datastoreItem xmlns:ds="http://schemas.openxmlformats.org/officeDocument/2006/customXml" ds:itemID="{7FC1ACFC-5903-4315-BB83-531181E20214}">
+  <ds:schemaRefs>
+    <ds:schemaRef ds:uri="http://schemas.microsoft.com/VisualStudio/2011/storyboarding/control"/>
+  </ds:schemaRefs>
+</ds:datastoreItem>
+</file>
+
+<file path=customXml/itemProps14.xml><?xml version="1.0" encoding="utf-8"?>
+<ds:datastoreItem xmlns:ds="http://schemas.openxmlformats.org/officeDocument/2006/customXml" ds:itemID="{C4E818A4-7FE2-4B84-AEA0-A9F6FB50C5C3}">
+  <ds:schemaRefs>
+    <ds:schemaRef ds:uri="http://schemas.microsoft.com/VisualStudio/2011/storyboarding/control"/>
+  </ds:schemaRefs>
+</ds:datastoreItem>
+</file>
+
+<file path=customXml/itemProps15.xml><?xml version="1.0" encoding="utf-8"?>
+<ds:datastoreItem xmlns:ds="http://schemas.openxmlformats.org/officeDocument/2006/customXml" ds:itemID="{9E6F7571-4EBE-4180-B628-CCE77B77DF89}">
+  <ds:schemaRefs>
+    <ds:schemaRef ds:uri="http://schemas.microsoft.com/VisualStudio/2011/storyboarding/control"/>
+  </ds:schemaRefs>
+</ds:datastoreItem>
+</file>
+
+<file path=customXml/itemProps16.xml><?xml version="1.0" encoding="utf-8"?>
+<ds:datastoreItem xmlns:ds="http://schemas.openxmlformats.org/officeDocument/2006/customXml" ds:itemID="{0ECA24E0-E199-4F3E-B649-D315A016E4DD}">
+  <ds:schemaRefs>
+    <ds:schemaRef ds:uri="http://schemas.microsoft.com/VisualStudio/2011/storyboarding/control"/>
+  </ds:schemaRefs>
+</ds:datastoreItem>
+</file>
+
+<file path=customXml/itemProps17.xml><?xml version="1.0" encoding="utf-8"?>
+<ds:datastoreItem xmlns:ds="http://schemas.openxmlformats.org/officeDocument/2006/customXml" ds:itemID="{48ED4C6D-191C-453A-AEFA-D85B1870C59D}">
+  <ds:schemaRefs>
+    <ds:schemaRef ds:uri="http://schemas.microsoft.com/VisualStudio/2011/storyboarding/control"/>
+  </ds:schemaRefs>
+</ds:datastoreItem>
+</file>
+
+<file path=customXml/itemProps18.xml><?xml version="1.0" encoding="utf-8"?>
+<ds:datastoreItem xmlns:ds="http://schemas.openxmlformats.org/officeDocument/2006/customXml" ds:itemID="{A649D7B9-F715-40AB-A71C-B9B3842724BC}">
+  <ds:schemaRefs>
+    <ds:schemaRef ds:uri="http://schemas.microsoft.com/VisualStudio/2011/storyboarding/control"/>
+  </ds:schemaRefs>
+</ds:datastoreItem>
+</file>
+
+<file path=customXml/itemProps19.xml><?xml version="1.0" encoding="utf-8"?>
+<ds:datastoreItem xmlns:ds="http://schemas.openxmlformats.org/officeDocument/2006/customXml" ds:itemID="{1DD2346F-B9C4-4399-ABD4-BA9740D9BD88}">
+  <ds:schemaRefs>
+    <ds:schemaRef ds:uri="http://schemas.microsoft.com/VisualStudio/2011/storyboarding/control"/>
+  </ds:schemaRefs>
+</ds:datastoreItem>
+</file>
+
+<file path=customXml/itemProps2.xml><?xml version="1.0" encoding="utf-8"?>
+<ds:datastoreItem xmlns:ds="http://schemas.openxmlformats.org/officeDocument/2006/customXml" ds:itemID="{26C443F0-80A1-49EA-8A5C-61D529987C65}">
+  <ds:schemaRefs>
+    <ds:schemaRef ds:uri="http://schemas.microsoft.com/VisualStudio/2011/storyboarding/control"/>
+  </ds:schemaRefs>
+</ds:datastoreItem>
+</file>
+
+<file path=customXml/itemProps20.xml><?xml version="1.0" encoding="utf-8"?>
+<ds:datastoreItem xmlns:ds="http://schemas.openxmlformats.org/officeDocument/2006/customXml" ds:itemID="{B5097B66-9493-4961-9240-EE55C193BEC8}">
+  <ds:schemaRefs>
+    <ds:schemaRef ds:uri="http://schemas.microsoft.com/VisualStudio/2011/storyboarding/control"/>
+  </ds:schemaRefs>
+</ds:datastoreItem>
+</file>
+
+<file path=customXml/itemProps21.xml><?xml version="1.0" encoding="utf-8"?>
+<ds:datastoreItem xmlns:ds="http://schemas.openxmlformats.org/officeDocument/2006/customXml" ds:itemID="{B6CACD45-209B-4AE5-9003-E06B8E889661}">
+  <ds:schemaRefs>
+    <ds:schemaRef ds:uri="http://schemas.microsoft.com/VisualStudio/2011/storyboarding/control"/>
+  </ds:schemaRefs>
+</ds:datastoreItem>
+</file>
+
+<file path=customXml/itemProps22.xml><?xml version="1.0" encoding="utf-8"?>
+<ds:datastoreItem xmlns:ds="http://schemas.openxmlformats.org/officeDocument/2006/customXml" ds:itemID="{87FB099B-3A5F-41E5-BC8E-F3D2EF159FCA}">
+  <ds:schemaRefs>
+    <ds:schemaRef ds:uri="http://schemas.microsoft.com/VisualStudio/2011/storyboarding/control"/>
+  </ds:schemaRefs>
+</ds:datastoreItem>
+</file>
+
+<file path=customXml/itemProps23.xml><?xml version="1.0" encoding="utf-8"?>
+<ds:datastoreItem xmlns:ds="http://schemas.openxmlformats.org/officeDocument/2006/customXml" ds:itemID="{0BF0DCCE-4795-4C92-AEFA-7B103386F702}">
+  <ds:schemaRefs>
+    <ds:schemaRef ds:uri="http://schemas.microsoft.com/VisualStudio/2011/storyboarding/control"/>
+  </ds:schemaRefs>
+</ds:datastoreItem>
+</file>
+
+<file path=customXml/itemProps24.xml><?xml version="1.0" encoding="utf-8"?>
+<ds:datastoreItem xmlns:ds="http://schemas.openxmlformats.org/officeDocument/2006/customXml" ds:itemID="{2518A20E-034B-4E42-B0C9-3D8089CEF578}">
+  <ds:schemaRefs>
+    <ds:schemaRef ds:uri="http://schemas.microsoft.com/VisualStudio/2011/storyboarding/control"/>
+  </ds:schemaRefs>
+</ds:datastoreItem>
+</file>
+
+<file path=customXml/itemProps25.xml><?xml version="1.0" encoding="utf-8"?>
+<ds:datastoreItem xmlns:ds="http://schemas.openxmlformats.org/officeDocument/2006/customXml" ds:itemID="{72BCF8D5-9CEC-40C5-8D88-80AB6FC9E9F8}">
+  <ds:schemaRefs>
+    <ds:schemaRef ds:uri="http://schemas.microsoft.com/VisualStudio/2011/storyboarding/control"/>
+  </ds:schemaRefs>
+</ds:datastoreItem>
+</file>
+
+<file path=customXml/itemProps26.xml><?xml version="1.0" encoding="utf-8"?>
+<ds:datastoreItem xmlns:ds="http://schemas.openxmlformats.org/officeDocument/2006/customXml" ds:itemID="{7D7CB359-8F7B-4D8A-808E-1C6B29A64ED6}">
+  <ds:schemaRefs>
+    <ds:schemaRef ds:uri="http://schemas.microsoft.com/VisualStudio/2011/storyboarding/control"/>
+  </ds:schemaRefs>
+</ds:datastoreItem>
+</file>
+
+<file path=customXml/itemProps27.xml><?xml version="1.0" encoding="utf-8"?>
+<ds:datastoreItem xmlns:ds="http://schemas.openxmlformats.org/officeDocument/2006/customXml" ds:itemID="{1AA1CC44-DF68-44CD-A528-E419F7CFA1D9}">
+  <ds:schemaRefs>
+    <ds:schemaRef ds:uri="http://schemas.microsoft.com/VisualStudio/2011/storyboarding/control"/>
+  </ds:schemaRefs>
+</ds:datastoreItem>
+</file>
+
+<file path=customXml/itemProps28.xml><?xml version="1.0" encoding="utf-8"?>
+<ds:datastoreItem xmlns:ds="http://schemas.openxmlformats.org/officeDocument/2006/customXml" ds:itemID="{832B116A-63C5-420F-9558-05BBB3EA9C8F}">
+  <ds:schemaRefs>
+    <ds:schemaRef ds:uri="http://schemas.microsoft.com/VisualStudio/2011/storyboarding/control"/>
+  </ds:schemaRefs>
+</ds:datastoreItem>
+</file>
+
+<file path=customXml/itemProps29.xml><?xml version="1.0" encoding="utf-8"?>
+<ds:datastoreItem xmlns:ds="http://schemas.openxmlformats.org/officeDocument/2006/customXml" ds:itemID="{0CEB70F9-7616-444A-9041-F0769F94E65B}">
+  <ds:schemaRefs>
+    <ds:schemaRef ds:uri="http://schemas.microsoft.com/VisualStudio/2011/storyboarding/control"/>
+  </ds:schemaRefs>
+</ds:datastoreItem>
+</file>
+
+<file path=customXml/itemProps3.xml><?xml version="1.0" encoding="utf-8"?>
+<ds:datastoreItem xmlns:ds="http://schemas.openxmlformats.org/officeDocument/2006/customXml" ds:itemID="{BA1D1506-1E64-4120-88FA-59E429E224FA}">
+  <ds:schemaRefs>
+    <ds:schemaRef ds:uri="http://schemas.microsoft.com/VisualStudio/2011/storyboarding/control"/>
+  </ds:schemaRefs>
+</ds:datastoreItem>
+</file>
+
+<file path=customXml/itemProps30.xml><?xml version="1.0" encoding="utf-8"?>
+<ds:datastoreItem xmlns:ds="http://schemas.openxmlformats.org/officeDocument/2006/customXml" ds:itemID="{A8F37163-25F8-4E84-8279-D4574B49C22C}">
+  <ds:schemaRefs>
+    <ds:schemaRef ds:uri="http://schemas.microsoft.com/VisualStudio/2011/storyboarding/control"/>
+  </ds:schemaRefs>
+</ds:datastoreItem>
+</file>
+
+<file path=customXml/itemProps31.xml><?xml version="1.0" encoding="utf-8"?>
+<ds:datastoreItem xmlns:ds="http://schemas.openxmlformats.org/officeDocument/2006/customXml" ds:itemID="{EF9DB188-6753-4B9A-AF3E-8E01D022A2D0}">
+  <ds:schemaRefs>
+    <ds:schemaRef ds:uri="http://schemas.microsoft.com/VisualStudio/2011/storyboarding/control"/>
+  </ds:schemaRefs>
+</ds:datastoreItem>
+</file>
+
+<file path=customXml/itemProps32.xml><?xml version="1.0" encoding="utf-8"?>
+<ds:datastoreItem xmlns:ds="http://schemas.openxmlformats.org/officeDocument/2006/customXml" ds:itemID="{C88BAED0-EFF4-4013-BA7C-6AA8222DBFDF}">
+  <ds:schemaRefs>
+    <ds:schemaRef ds:uri="http://schemas.microsoft.com/VisualStudio/2011/storyboarding/control"/>
+  </ds:schemaRefs>
+</ds:datastoreItem>
+</file>
+
+<file path=customXml/itemProps33.xml><?xml version="1.0" encoding="utf-8"?>
+<ds:datastoreItem xmlns:ds="http://schemas.openxmlformats.org/officeDocument/2006/customXml" ds:itemID="{3C705390-41B2-4E4B-9A77-9CFC82A2CBE4}">
+  <ds:schemaRefs>
+    <ds:schemaRef ds:uri="http://schemas.microsoft.com/VisualStudio/2011/storyboarding/control"/>
+  </ds:schemaRefs>
+</ds:datastoreItem>
+</file>
+
+<file path=customXml/itemProps34.xml><?xml version="1.0" encoding="utf-8"?>
+<ds:datastoreItem xmlns:ds="http://schemas.openxmlformats.org/officeDocument/2006/customXml" ds:itemID="{CE5F796C-1B15-4955-82E0-926F6326F48E}">
+  <ds:schemaRefs>
+    <ds:schemaRef ds:uri="http://schemas.microsoft.com/VisualStudio/2011/storyboarding/control"/>
+  </ds:schemaRefs>
+</ds:datastoreItem>
+</file>
+
+<file path=customXml/itemProps35.xml><?xml version="1.0" encoding="utf-8"?>
+<ds:datastoreItem xmlns:ds="http://schemas.openxmlformats.org/officeDocument/2006/customXml" ds:itemID="{E1B41B76-6F78-44DC-99A8-DFD2C2A83E34}">
+  <ds:schemaRefs>
+    <ds:schemaRef ds:uri="http://schemas.microsoft.com/VisualStudio/2011/storyboarding/control"/>
+  </ds:schemaRefs>
+</ds:datastoreItem>
+</file>
+
+<file path=customXml/itemProps36.xml><?xml version="1.0" encoding="utf-8"?>
+<ds:datastoreItem xmlns:ds="http://schemas.openxmlformats.org/officeDocument/2006/customXml" ds:itemID="{066B72A9-6778-44B8-9F8D-925F93B5D2D7}">
+  <ds:schemaRefs>
+    <ds:schemaRef ds:uri="http://schemas.microsoft.com/VisualStudio/2011/storyboarding/control"/>
+  </ds:schemaRefs>
+</ds:datastoreItem>
+</file>
+
+<file path=customXml/itemProps37.xml><?xml version="1.0" encoding="utf-8"?>
+<ds:datastoreItem xmlns:ds="http://schemas.openxmlformats.org/officeDocument/2006/customXml" ds:itemID="{CCBA0FAD-D47F-4053-BB7A-FCDAF4A83483}">
+  <ds:schemaRefs>
+    <ds:schemaRef ds:uri="http://schemas.microsoft.com/VisualStudio/2011/storyboarding/control"/>
+  </ds:schemaRefs>
+</ds:datastoreItem>
+</file>
+
+<file path=customXml/itemProps38.xml><?xml version="1.0" encoding="utf-8"?>
+<ds:datastoreItem xmlns:ds="http://schemas.openxmlformats.org/officeDocument/2006/customXml" ds:itemID="{767C30FE-3B3A-4F21-844A-AB59F94E4161}">
+  <ds:schemaRefs>
+    <ds:schemaRef ds:uri="http://schemas.microsoft.com/VisualStudio/2011/storyboarding/control"/>
+  </ds:schemaRefs>
+</ds:datastoreItem>
+</file>
+
+<file path=customXml/itemProps39.xml><?xml version="1.0" encoding="utf-8"?>
+<ds:datastoreItem xmlns:ds="http://schemas.openxmlformats.org/officeDocument/2006/customXml" ds:itemID="{A4268BD8-7853-4881-9E53-4FE1E08A411E}">
+  <ds:schemaRefs>
+    <ds:schemaRef ds:uri="http://schemas.microsoft.com/VisualStudio/2011/storyboarding/control"/>
+  </ds:schemaRefs>
+</ds:datastoreItem>
+</file>
+
+<file path=customXml/itemProps4.xml><?xml version="1.0" encoding="utf-8"?>
+<ds:datastoreItem xmlns:ds="http://schemas.openxmlformats.org/officeDocument/2006/customXml" ds:itemID="{BA7FA624-CB09-44D6-8994-2F6E015D448E}">
+  <ds:schemaRefs>
+    <ds:schemaRef ds:uri="http://schemas.microsoft.com/VisualStudio/2011/storyboarding/control"/>
+  </ds:schemaRefs>
+</ds:datastoreItem>
+</file>
+
+<file path=customXml/itemProps40.xml><?xml version="1.0" encoding="utf-8"?>
+<ds:datastoreItem xmlns:ds="http://schemas.openxmlformats.org/officeDocument/2006/customXml" ds:itemID="{17887D8F-4CC8-4617-868E-91CB574B7BF1}">
+  <ds:schemaRefs>
+    <ds:schemaRef ds:uri="http://schemas.microsoft.com/VisualStudio/2011/storyboarding/control"/>
+  </ds:schemaRefs>
+</ds:datastoreItem>
+</file>
+
+<file path=customXml/itemProps41.xml><?xml version="1.0" encoding="utf-8"?>
+<ds:datastoreItem xmlns:ds="http://schemas.openxmlformats.org/officeDocument/2006/customXml" ds:itemID="{6D917542-4CB5-4F33-83FB-7158BE7AA367}">
+  <ds:schemaRefs>
+    <ds:schemaRef ds:uri="http://schemas.microsoft.com/VisualStudio/2011/storyboarding/control"/>
+  </ds:schemaRefs>
+</ds:datastoreItem>
+</file>
+
+<file path=customXml/itemProps42.xml><?xml version="1.0" encoding="utf-8"?>
+<ds:datastoreItem xmlns:ds="http://schemas.openxmlformats.org/officeDocument/2006/customXml" ds:itemID="{07647DA0-E684-4907-8046-3DFC43ED9042}">
+  <ds:schemaRefs>
+    <ds:schemaRef ds:uri="http://schemas.microsoft.com/VisualStudio/2011/storyboarding/control"/>
+  </ds:schemaRefs>
+</ds:datastoreItem>
+</file>
+
+<file path=customXml/itemProps43.xml><?xml version="1.0" encoding="utf-8"?>
+<ds:datastoreItem xmlns:ds="http://schemas.openxmlformats.org/officeDocument/2006/customXml" ds:itemID="{7BED5AAF-A887-4928-BFF1-AA6F41EAC01E}">
+  <ds:schemaRefs>
+    <ds:schemaRef ds:uri="http://schemas.microsoft.com/VisualStudio/2011/storyboarding/control"/>
+  </ds:schemaRefs>
+</ds:datastoreItem>
+</file>
+
+<file path=customXml/itemProps44.xml><?xml version="1.0" encoding="utf-8"?>
+<ds:datastoreItem xmlns:ds="http://schemas.openxmlformats.org/officeDocument/2006/customXml" ds:itemID="{DCF09C28-3B24-44E3-BF7A-CA6BC9D292C3}">
+  <ds:schemaRefs>
+    <ds:schemaRef ds:uri="http://schemas.microsoft.com/VisualStudio/2011/storyboarding/control"/>
+  </ds:schemaRefs>
+</ds:datastoreItem>
+</file>
+
+<file path=customXml/itemProps45.xml><?xml version="1.0" encoding="utf-8"?>
+<ds:datastoreItem xmlns:ds="http://schemas.openxmlformats.org/officeDocument/2006/customXml" ds:itemID="{79342CAB-26BD-42C7-97B2-7342A28343AE}">
+  <ds:schemaRefs>
+    <ds:schemaRef ds:uri="http://schemas.microsoft.com/VisualStudio/2011/storyboarding/control"/>
+  </ds:schemaRefs>
+</ds:datastoreItem>
+</file>
+
+<file path=customXml/itemProps46.xml><?xml version="1.0" encoding="utf-8"?>
+<ds:datastoreItem xmlns:ds="http://schemas.openxmlformats.org/officeDocument/2006/customXml" ds:itemID="{4C05EC8C-ACA8-4019-9C83-70D84CC6A97D}">
+  <ds:schemaRefs>
+    <ds:schemaRef ds:uri="http://schemas.microsoft.com/VisualStudio/2011/storyboarding/control"/>
+  </ds:schemaRefs>
+</ds:datastoreItem>
+</file>
+
+<file path=customXml/itemProps47.xml><?xml version="1.0" encoding="utf-8"?>
+<ds:datastoreItem xmlns:ds="http://schemas.openxmlformats.org/officeDocument/2006/customXml" ds:itemID="{FDA6DE73-A91D-4E02-94C3-C6DB0DC6D010}">
+  <ds:schemaRefs>
+    <ds:schemaRef ds:uri="http://schemas.microsoft.com/VisualStudio/2011/storyboarding/control"/>
+  </ds:schemaRefs>
+</ds:datastoreItem>
+</file>
+
+<file path=customXml/itemProps48.xml><?xml version="1.0" encoding="utf-8"?>
+<ds:datastoreItem xmlns:ds="http://schemas.openxmlformats.org/officeDocument/2006/customXml" ds:itemID="{6ED5C25D-E4FB-497F-A571-D33B7D1E81C6}">
+  <ds:schemaRefs>
+    <ds:schemaRef ds:uri="http://schemas.microsoft.com/VisualStudio/2011/storyboarding/control"/>
+  </ds:schemaRefs>
+</ds:datastoreItem>
+</file>
+
+<file path=customXml/itemProps49.xml><?xml version="1.0" encoding="utf-8"?>
+<ds:datastoreItem xmlns:ds="http://schemas.openxmlformats.org/officeDocument/2006/customXml" ds:itemID="{581C7DE6-5844-4025-8BA4-BE4D62ED991F}">
+  <ds:schemaRefs>
+    <ds:schemaRef ds:uri="http://schemas.microsoft.com/VisualStudio/2011/storyboarding/control"/>
+  </ds:schemaRefs>
+</ds:datastoreItem>
+</file>
+
+<file path=customXml/itemProps5.xml><?xml version="1.0" encoding="utf-8"?>
+<ds:datastoreItem xmlns:ds="http://schemas.openxmlformats.org/officeDocument/2006/customXml" ds:itemID="{328B6E1D-0753-426C-BAEA-4AAB939DA580}">
+  <ds:schemaRefs>
+    <ds:schemaRef ds:uri="http://schemas.microsoft.com/VisualStudio/2011/storyboarding/control"/>
+  </ds:schemaRefs>
+</ds:datastoreItem>
+</file>
+
+<file path=customXml/itemProps50.xml><?xml version="1.0" encoding="utf-8"?>
+<ds:datastoreItem xmlns:ds="http://schemas.openxmlformats.org/officeDocument/2006/customXml" ds:itemID="{5B4794DC-66F7-4498-B3C3-DCD5F74D5FD8}">
+  <ds:schemaRefs>
+    <ds:schemaRef ds:uri="http://schemas.microsoft.com/VisualStudio/2011/storyboarding/control"/>
+  </ds:schemaRefs>
+</ds:datastoreItem>
+</file>
+
+<file path=customXml/itemProps51.xml><?xml version="1.0" encoding="utf-8"?>
+<ds:datastoreItem xmlns:ds="http://schemas.openxmlformats.org/officeDocument/2006/customXml" ds:itemID="{F1193E09-28D8-4D6A-BD76-F3CA7F0134F6}">
+  <ds:schemaRefs>
+    <ds:schemaRef ds:uri="http://schemas.microsoft.com/VisualStudio/2011/storyboarding/control"/>
+  </ds:schemaRefs>
+</ds:datastoreItem>
+</file>
+
+<file path=customXml/itemProps52.xml><?xml version="1.0" encoding="utf-8"?>
+<ds:datastoreItem xmlns:ds="http://schemas.openxmlformats.org/officeDocument/2006/customXml" ds:itemID="{9C6A7914-511A-42E6-908E-AEFBA51CB63F}">
+  <ds:schemaRefs>
+    <ds:schemaRef ds:uri="http://schemas.microsoft.com/VisualStudio/2011/storyboarding/control"/>
+  </ds:schemaRefs>
+</ds:datastoreItem>
+</file>
+
+<file path=customXml/itemProps53.xml><?xml version="1.0" encoding="utf-8"?>
+<ds:datastoreItem xmlns:ds="http://schemas.openxmlformats.org/officeDocument/2006/customXml" ds:itemID="{ECD73F77-92DD-4C21-92E5-429F75002F17}">
+  <ds:schemaRefs>
+    <ds:schemaRef ds:uri="http://schemas.microsoft.com/VisualStudio/2011/storyboarding/control"/>
+  </ds:schemaRefs>
+</ds:datastoreItem>
+</file>
+
+<file path=customXml/itemProps54.xml><?xml version="1.0" encoding="utf-8"?>
+<ds:datastoreItem xmlns:ds="http://schemas.openxmlformats.org/officeDocument/2006/customXml" ds:itemID="{B6D3FCD1-1D67-4BCA-8C64-D3FAB60D9726}">
+  <ds:schemaRefs>
+    <ds:schemaRef ds:uri="http://schemas.microsoft.com/VisualStudio/2011/storyboarding/control"/>
+  </ds:schemaRefs>
+</ds:datastoreItem>
+</file>
+
+<file path=customXml/itemProps55.xml><?xml version="1.0" encoding="utf-8"?>
 <ds:datastoreItem xmlns:ds="http://schemas.openxmlformats.org/officeDocument/2006/customXml" ds:itemID="{1572FC1B-ECED-45E5-A387-4981CB104905}">
   <ds:schemaRefs>
     <ds:schemaRef ds:uri="http://schemas.microsoft.com/VisualStudio/2011/storyboarding/control"/>
@@ -8183,15 +10238,127 @@
 </ds:datastoreItem>
 </file>
 
-<file path=customXml/itemProps10.xml><?xml version="1.0" encoding="utf-8"?>
-<ds:datastoreItem xmlns:ds="http://schemas.openxmlformats.org/officeDocument/2006/customXml" ds:itemID="{0BF0DCCE-4795-4C92-AEFA-7B103386F702}">
+<file path=customXml/itemProps56.xml><?xml version="1.0" encoding="utf-8"?>
+<ds:datastoreItem xmlns:ds="http://schemas.openxmlformats.org/officeDocument/2006/customXml" ds:itemID="{5DABBEE4-57BD-45BC-A909-91BEE00F4D9D}">
   <ds:schemaRefs>
     <ds:schemaRef ds:uri="http://schemas.microsoft.com/VisualStudio/2011/storyboarding/control"/>
   </ds:schemaRefs>
 </ds:datastoreItem>
 </file>
 
-<file path=customXml/itemProps11.xml><?xml version="1.0" encoding="utf-8"?>
+<file path=customXml/itemProps57.xml><?xml version="1.0" encoding="utf-8"?>
+<ds:datastoreItem xmlns:ds="http://schemas.openxmlformats.org/officeDocument/2006/customXml" ds:itemID="{C64738E3-6587-4CA4-848D-91D0AFDA1A6D}">
+  <ds:schemaRefs>
+    <ds:schemaRef ds:uri="http://schemas.microsoft.com/VisualStudio/2011/storyboarding/control"/>
+  </ds:schemaRefs>
+</ds:datastoreItem>
+</file>
+
+<file path=customXml/itemProps58.xml><?xml version="1.0" encoding="utf-8"?>
+<ds:datastoreItem xmlns:ds="http://schemas.openxmlformats.org/officeDocument/2006/customXml" ds:itemID="{33F9240B-A1F1-4890-B5C1-DCFF5A6318AE}">
+  <ds:schemaRefs>
+    <ds:schemaRef ds:uri="http://schemas.microsoft.com/VisualStudio/2011/storyboarding/control"/>
+  </ds:schemaRefs>
+</ds:datastoreItem>
+</file>
+
+<file path=customXml/itemProps59.xml><?xml version="1.0" encoding="utf-8"?>
+<ds:datastoreItem xmlns:ds="http://schemas.openxmlformats.org/officeDocument/2006/customXml" ds:itemID="{AD83DFF5-57DB-43D9-8557-02521D85CE79}">
+  <ds:schemaRefs>
+    <ds:schemaRef ds:uri="http://schemas.microsoft.com/VisualStudio/2011/storyboarding/control"/>
+  </ds:schemaRefs>
+</ds:datastoreItem>
+</file>
+
+<file path=customXml/itemProps6.xml><?xml version="1.0" encoding="utf-8"?>
+<ds:datastoreItem xmlns:ds="http://schemas.openxmlformats.org/officeDocument/2006/customXml" ds:itemID="{ADFC0E54-32DF-4EF6-AA10-65C2084BA5CF}">
+  <ds:schemaRefs>
+    <ds:schemaRef ds:uri="http://schemas.microsoft.com/VisualStudio/2011/storyboarding/control"/>
+  </ds:schemaRefs>
+</ds:datastoreItem>
+</file>
+
+<file path=customXml/itemProps60.xml><?xml version="1.0" encoding="utf-8"?>
+<ds:datastoreItem xmlns:ds="http://schemas.openxmlformats.org/officeDocument/2006/customXml" ds:itemID="{69B6F2B9-DC41-419F-BF45-B4C3B79D72C8}">
+  <ds:schemaRefs>
+    <ds:schemaRef ds:uri="http://schemas.microsoft.com/VisualStudio/2011/storyboarding/control"/>
+  </ds:schemaRefs>
+</ds:datastoreItem>
+</file>
+
+<file path=customXml/itemProps61.xml><?xml version="1.0" encoding="utf-8"?>
+<ds:datastoreItem xmlns:ds="http://schemas.openxmlformats.org/officeDocument/2006/customXml" ds:itemID="{19BFF073-C4AE-48BB-B931-137F09A448CB}">
+  <ds:schemaRefs>
+    <ds:schemaRef ds:uri="http://schemas.microsoft.com/VisualStudio/2011/storyboarding/control"/>
+  </ds:schemaRefs>
+</ds:datastoreItem>
+</file>
+
+<file path=customXml/itemProps62.xml><?xml version="1.0" encoding="utf-8"?>
+<ds:datastoreItem xmlns:ds="http://schemas.openxmlformats.org/officeDocument/2006/customXml" ds:itemID="{DC354CCD-34CB-4038-9E97-5D641FC3188E}">
+  <ds:schemaRefs>
+    <ds:schemaRef ds:uri="http://schemas.microsoft.com/VisualStudio/2011/storyboarding/control"/>
+  </ds:schemaRefs>
+</ds:datastoreItem>
+</file>
+
+<file path=customXml/itemProps63.xml><?xml version="1.0" encoding="utf-8"?>
+<ds:datastoreItem xmlns:ds="http://schemas.openxmlformats.org/officeDocument/2006/customXml" ds:itemID="{BEA4C740-500C-473C-84AE-9914EC453753}">
+  <ds:schemaRefs>
+    <ds:schemaRef ds:uri="http://schemas.microsoft.com/VisualStudio/2011/storyboarding/control"/>
+  </ds:schemaRefs>
+</ds:datastoreItem>
+</file>
+
+<file path=customXml/itemProps64.xml><?xml version="1.0" encoding="utf-8"?>
+<ds:datastoreItem xmlns:ds="http://schemas.openxmlformats.org/officeDocument/2006/customXml" ds:itemID="{E45C5231-5AD7-483C-88AF-E2C3D79A2934}">
+  <ds:schemaRefs>
+    <ds:schemaRef ds:uri="http://schemas.microsoft.com/VisualStudio/2011/storyboarding/control"/>
+  </ds:schemaRefs>
+</ds:datastoreItem>
+</file>
+
+<file path=customXml/itemProps65.xml><?xml version="1.0" encoding="utf-8"?>
+<ds:datastoreItem xmlns:ds="http://schemas.openxmlformats.org/officeDocument/2006/customXml" ds:itemID="{DCA7DBC9-E7E7-45F7-96F6-0FE75525CEC3}">
+  <ds:schemaRefs>
+    <ds:schemaRef ds:uri="http://schemas.microsoft.com/VisualStudio/2011/storyboarding/control"/>
+  </ds:schemaRefs>
+</ds:datastoreItem>
+</file>
+
+<file path=customXml/itemProps66.xml><?xml version="1.0" encoding="utf-8"?>
+<ds:datastoreItem xmlns:ds="http://schemas.openxmlformats.org/officeDocument/2006/customXml" ds:itemID="{4A64E2AC-D62A-494C-B40F-614637EDA4BC}">
+  <ds:schemaRefs>
+    <ds:schemaRef ds:uri="http://schemas.microsoft.com/VisualStudio/2011/storyboarding/control"/>
+  </ds:schemaRefs>
+</ds:datastoreItem>
+</file>
+
+<file path=customXml/itemProps67.xml><?xml version="1.0" encoding="utf-8"?>
+<ds:datastoreItem xmlns:ds="http://schemas.openxmlformats.org/officeDocument/2006/customXml" ds:itemID="{DCBF3B82-B87A-477C-A0E2-FAE47BAE2AFE}">
+  <ds:schemaRefs>
+    <ds:schemaRef ds:uri="http://schemas.microsoft.com/VisualStudio/2011/storyboarding/control"/>
+  </ds:schemaRefs>
+</ds:datastoreItem>
+</file>
+
+<file path=customXml/itemProps68.xml><?xml version="1.0" encoding="utf-8"?>
+<ds:datastoreItem xmlns:ds="http://schemas.openxmlformats.org/officeDocument/2006/customXml" ds:itemID="{4F13B1CD-3D80-4353-A955-9FAE5724071A}">
+  <ds:schemaRefs>
+    <ds:schemaRef ds:uri="http://schemas.microsoft.com/VisualStudio/2011/storyboarding/control"/>
+  </ds:schemaRefs>
+</ds:datastoreItem>
+</file>
+
+<file path=customXml/itemProps69.xml><?xml version="1.0" encoding="utf-8"?>
+<ds:datastoreItem xmlns:ds="http://schemas.openxmlformats.org/officeDocument/2006/customXml" ds:itemID="{D9902FB6-2525-4994-B39F-C5A28D8845BE}">
+  <ds:schemaRefs>
+    <ds:schemaRef ds:uri="http://schemas.microsoft.com/VisualStudio/2011/storyboarding/control"/>
+  </ds:schemaRefs>
+</ds:datastoreItem>
+</file>
+
+<file path=customXml/itemProps7.xml><?xml version="1.0" encoding="utf-8"?>
 <ds:datastoreItem xmlns:ds="http://schemas.openxmlformats.org/officeDocument/2006/customXml" ds:itemID="{D1ACB713-CD12-472D-9AC5-BEBD9BEDA96D}">
   <ds:schemaRefs>
     <ds:schemaRef ds:uri="http://schemas.microsoft.com/VisualStudio/2011/storyboarding/control"/>
@@ -8199,111 +10366,87 @@
 </ds:datastoreItem>
 </file>
 
-<file path=customXml/itemProps12.xml><?xml version="1.0" encoding="utf-8"?>
-<ds:datastoreItem xmlns:ds="http://schemas.openxmlformats.org/officeDocument/2006/customXml" ds:itemID="{DCF09C28-3B24-44E3-BF7A-CA6BC9D292C3}">
+<file path=customXml/itemProps70.xml><?xml version="1.0" encoding="utf-8"?>
+<ds:datastoreItem xmlns:ds="http://schemas.openxmlformats.org/officeDocument/2006/customXml" ds:itemID="{74FA862F-2270-42C7-94BA-05FAE460400B}">
   <ds:schemaRefs>
     <ds:schemaRef ds:uri="http://schemas.microsoft.com/VisualStudio/2011/storyboarding/control"/>
   </ds:schemaRefs>
 </ds:datastoreItem>
 </file>
 
-<file path=customXml/itemProps13.xml><?xml version="1.0" encoding="utf-8"?>
-<ds:datastoreItem xmlns:ds="http://schemas.openxmlformats.org/officeDocument/2006/customXml" ds:itemID="{C64738E3-6587-4CA4-848D-91D0AFDA1A6D}">
+<file path=customXml/itemProps71.xml><?xml version="1.0" encoding="utf-8"?>
+<ds:datastoreItem xmlns:ds="http://schemas.openxmlformats.org/officeDocument/2006/customXml" ds:itemID="{1FC499BC-B9AC-4176-8DBF-CE3270ED72C9}">
   <ds:schemaRefs>
     <ds:schemaRef ds:uri="http://schemas.microsoft.com/VisualStudio/2011/storyboarding/control"/>
   </ds:schemaRefs>
 </ds:datastoreItem>
 </file>
 
-<file path=customXml/itemProps14.xml><?xml version="1.0" encoding="utf-8"?>
-<ds:datastoreItem xmlns:ds="http://schemas.openxmlformats.org/officeDocument/2006/customXml" ds:itemID="{C88BAED0-EFF4-4013-BA7C-6AA8222DBFDF}">
+<file path=customXml/itemProps72.xml><?xml version="1.0" encoding="utf-8"?>
+<ds:datastoreItem xmlns:ds="http://schemas.openxmlformats.org/officeDocument/2006/customXml" ds:itemID="{5C77B942-C8F3-4BD4-8F58-308320A4A91D}">
   <ds:schemaRefs>
     <ds:schemaRef ds:uri="http://schemas.microsoft.com/VisualStudio/2011/storyboarding/control"/>
   </ds:schemaRefs>
 </ds:datastoreItem>
 </file>
 
-<file path=customXml/itemProps15.xml><?xml version="1.0" encoding="utf-8"?>
-<ds:datastoreItem xmlns:ds="http://schemas.openxmlformats.org/officeDocument/2006/customXml" ds:itemID="{0ECA24E0-E199-4F3E-B649-D315A016E4DD}">
+<file path=customXml/itemProps73.xml><?xml version="1.0" encoding="utf-8"?>
+<ds:datastoreItem xmlns:ds="http://schemas.openxmlformats.org/officeDocument/2006/customXml" ds:itemID="{612C3170-3E5D-4B6F-AB08-FAAC8693224E}">
   <ds:schemaRefs>
     <ds:schemaRef ds:uri="http://schemas.microsoft.com/VisualStudio/2011/storyboarding/control"/>
   </ds:schemaRefs>
 </ds:datastoreItem>
 </file>
 
-<file path=customXml/itemProps16.xml><?xml version="1.0" encoding="utf-8"?>
-<ds:datastoreItem xmlns:ds="http://schemas.openxmlformats.org/officeDocument/2006/customXml" ds:itemID="{328B6E1D-0753-426C-BAEA-4AAB939DA580}">
+<file path=customXml/itemProps74.xml><?xml version="1.0" encoding="utf-8"?>
+<ds:datastoreItem xmlns:ds="http://schemas.openxmlformats.org/officeDocument/2006/customXml" ds:itemID="{0A823B61-779C-4D48-8EA7-4CF7BA23E8BD}">
   <ds:schemaRefs>
     <ds:schemaRef ds:uri="http://schemas.microsoft.com/VisualStudio/2011/storyboarding/control"/>
   </ds:schemaRefs>
 </ds:datastoreItem>
 </file>
 
-<file path=customXml/itemProps17.xml><?xml version="1.0" encoding="utf-8"?>
-<ds:datastoreItem xmlns:ds="http://schemas.openxmlformats.org/officeDocument/2006/customXml" ds:itemID="{79342CAB-26BD-42C7-97B2-7342A28343AE}">
+<file path=customXml/itemProps75.xml><?xml version="1.0" encoding="utf-8"?>
+<ds:datastoreItem xmlns:ds="http://schemas.openxmlformats.org/officeDocument/2006/customXml" ds:itemID="{EAEA75B6-A05A-46AD-8999-E1144746839A}">
   <ds:schemaRefs>
     <ds:schemaRef ds:uri="http://schemas.microsoft.com/VisualStudio/2011/storyboarding/control"/>
   </ds:schemaRefs>
 </ds:datastoreItem>
 </file>
 
-<file path=customXml/itemProps18.xml><?xml version="1.0" encoding="utf-8"?>
-<ds:datastoreItem xmlns:ds="http://schemas.openxmlformats.org/officeDocument/2006/customXml" ds:itemID="{33F9240B-A1F1-4890-B5C1-DCFF5A6318AE}">
+<file path=customXml/itemProps76.xml><?xml version="1.0" encoding="utf-8"?>
+<ds:datastoreItem xmlns:ds="http://schemas.openxmlformats.org/officeDocument/2006/customXml" ds:itemID="{5E15C4C1-7DC4-400D-83E2-CC75065C5F26}">
   <ds:schemaRefs>
     <ds:schemaRef ds:uri="http://schemas.microsoft.com/VisualStudio/2011/storyboarding/control"/>
   </ds:schemaRefs>
 </ds:datastoreItem>
 </file>
 
-<file path=customXml/itemProps19.xml><?xml version="1.0" encoding="utf-8"?>
-<ds:datastoreItem xmlns:ds="http://schemas.openxmlformats.org/officeDocument/2006/customXml" ds:itemID="{2518A20E-034B-4E42-B0C9-3D8089CEF578}">
+<file path=customXml/itemProps77.xml><?xml version="1.0" encoding="utf-8"?>
+<ds:datastoreItem xmlns:ds="http://schemas.openxmlformats.org/officeDocument/2006/customXml" ds:itemID="{562ACCBE-45D0-481A-9D8E-F557CFF8F221}">
   <ds:schemaRefs>
     <ds:schemaRef ds:uri="http://schemas.microsoft.com/VisualStudio/2011/storyboarding/control"/>
   </ds:schemaRefs>
 </ds:datastoreItem>
 </file>
 
-<file path=customXml/itemProps2.xml><?xml version="1.0" encoding="utf-8"?>
-<ds:datastoreItem xmlns:ds="http://schemas.openxmlformats.org/officeDocument/2006/customXml" ds:itemID="{BA7FA624-CB09-44D6-8994-2F6E015D448E}">
+<file path=customXml/itemProps78.xml><?xml version="1.0" encoding="utf-8"?>
+<ds:datastoreItem xmlns:ds="http://schemas.openxmlformats.org/officeDocument/2006/customXml" ds:itemID="{3105808A-F8E4-4B7C-BA46-C221EDA3D356}">
   <ds:schemaRefs>
     <ds:schemaRef ds:uri="http://schemas.microsoft.com/VisualStudio/2011/storyboarding/control"/>
   </ds:schemaRefs>
 </ds:datastoreItem>
 </file>
 
-<file path=customXml/itemProps20.xml><?xml version="1.0" encoding="utf-8"?>
-<ds:datastoreItem xmlns:ds="http://schemas.openxmlformats.org/officeDocument/2006/customXml" ds:itemID="{F1193E09-28D8-4D6A-BD76-F3CA7F0134F6}">
+<file path=customXml/itemProps79.xml><?xml version="1.0" encoding="utf-8"?>
+<ds:datastoreItem xmlns:ds="http://schemas.openxmlformats.org/officeDocument/2006/customXml" ds:itemID="{2C0761D8-5FCB-4134-8B9E-19569EB02B32}">
   <ds:schemaRefs>
     <ds:schemaRef ds:uri="http://schemas.microsoft.com/VisualStudio/2011/storyboarding/control"/>
   </ds:schemaRefs>
 </ds:datastoreItem>
 </file>
 
-<file path=customXml/itemProps21.xml><?xml version="1.0" encoding="utf-8"?>
-<ds:datastoreItem xmlns:ds="http://schemas.openxmlformats.org/officeDocument/2006/customXml" ds:itemID="{19BFF073-C4AE-48BB-B931-137F09A448CB}">
-  <ds:schemaRefs>
-    <ds:schemaRef ds:uri="http://schemas.microsoft.com/VisualStudio/2011/storyboarding/control"/>
-  </ds:schemaRefs>
-</ds:datastoreItem>
-</file>
-
-<file path=customXml/itemProps22.xml><?xml version="1.0" encoding="utf-8"?>
-<ds:datastoreItem xmlns:ds="http://schemas.openxmlformats.org/officeDocument/2006/customXml" ds:itemID="{3C705390-41B2-4E4B-9A77-9CFC82A2CBE4}">
-  <ds:schemaRefs>
-    <ds:schemaRef ds:uri="http://schemas.microsoft.com/VisualStudio/2011/storyboarding/control"/>
-  </ds:schemaRefs>
-</ds:datastoreItem>
-</file>
-
-<file path=customXml/itemProps23.xml><?xml version="1.0" encoding="utf-8"?>
-<ds:datastoreItem xmlns:ds="http://schemas.openxmlformats.org/officeDocument/2006/customXml" ds:itemID="{48ED4C6D-191C-453A-AEFA-D85B1870C59D}">
-  <ds:schemaRefs>
-    <ds:schemaRef ds:uri="http://schemas.microsoft.com/VisualStudio/2011/storyboarding/control"/>
-  </ds:schemaRefs>
-</ds:datastoreItem>
-</file>
-
-<file path=customXml/itemProps24.xml><?xml version="1.0" encoding="utf-8"?>
+<file path=customXml/itemProps8.xml><?xml version="1.0" encoding="utf-8"?>
 <ds:datastoreItem xmlns:ds="http://schemas.openxmlformats.org/officeDocument/2006/customXml" ds:itemID="{3A4B9090-FA2C-4120-907D-9A914A5A1DCD}">
   <ds:schemaRefs>
     <ds:schemaRef ds:uri="http://schemas.microsoft.com/VisualStudio/2011/storyboarding/control"/>
@@ -8311,386 +10454,90 @@
 </ds:datastoreItem>
 </file>
 
-<file path=customXml/itemProps25.xml><?xml version="1.0" encoding="utf-8"?>
-<ds:datastoreItem xmlns:ds="http://schemas.openxmlformats.org/officeDocument/2006/customXml" ds:itemID="{4C05EC8C-ACA8-4019-9C83-70D84CC6A97D}">
+<file path=customXml/itemProps80.xml><?xml version="1.0" encoding="utf-8"?>
+<ds:datastoreItem xmlns:ds="http://schemas.openxmlformats.org/officeDocument/2006/customXml" ds:itemID="{2A81C5BB-30D6-4F7B-8126-E973D833C10A}">
   <ds:schemaRefs>
     <ds:schemaRef ds:uri="http://schemas.microsoft.com/VisualStudio/2011/storyboarding/control"/>
   </ds:schemaRefs>
 </ds:datastoreItem>
 </file>
 
-<file path=customXml/itemProps26.xml><?xml version="1.0" encoding="utf-8"?>
-<ds:datastoreItem xmlns:ds="http://schemas.openxmlformats.org/officeDocument/2006/customXml" ds:itemID="{AD83DFF5-57DB-43D9-8557-02521D85CE79}">
+<file path=customXml/itemProps81.xml><?xml version="1.0" encoding="utf-8"?>
+<ds:datastoreItem xmlns:ds="http://schemas.openxmlformats.org/officeDocument/2006/customXml" ds:itemID="{CA0BFCDC-CA14-4412-ACD5-B19572428A30}">
   <ds:schemaRefs>
     <ds:schemaRef ds:uri="http://schemas.microsoft.com/VisualStudio/2011/storyboarding/control"/>
   </ds:schemaRefs>
 </ds:datastoreItem>
 </file>
 
-<file path=customXml/itemProps27.xml><?xml version="1.0" encoding="utf-8"?>
-<ds:datastoreItem xmlns:ds="http://schemas.openxmlformats.org/officeDocument/2006/customXml" ds:itemID="{CE5F796C-1B15-4955-82E0-926F6326F48E}">
+<file path=customXml/itemProps82.xml><?xml version="1.0" encoding="utf-8"?>
+<ds:datastoreItem xmlns:ds="http://schemas.openxmlformats.org/officeDocument/2006/customXml" ds:itemID="{C319B4A2-3D63-4983-B472-838D460D4499}">
   <ds:schemaRefs>
     <ds:schemaRef ds:uri="http://schemas.microsoft.com/VisualStudio/2011/storyboarding/control"/>
   </ds:schemaRefs>
 </ds:datastoreItem>
 </file>
 
-<file path=customXml/itemProps28.xml><?xml version="1.0" encoding="utf-8"?>
-<ds:datastoreItem xmlns:ds="http://schemas.openxmlformats.org/officeDocument/2006/customXml" ds:itemID="{A649D7B9-F715-40AB-A71C-B9B3842724BC}">
+<file path=customXml/itemProps83.xml><?xml version="1.0" encoding="utf-8"?>
+<ds:datastoreItem xmlns:ds="http://schemas.openxmlformats.org/officeDocument/2006/customXml" ds:itemID="{91ED9130-D964-4E58-94E1-100812A62FA4}">
   <ds:schemaRefs>
     <ds:schemaRef ds:uri="http://schemas.microsoft.com/VisualStudio/2011/storyboarding/control"/>
   </ds:schemaRefs>
 </ds:datastoreItem>
 </file>
 
-<file path=customXml/itemProps29.xml><?xml version="1.0" encoding="utf-8"?>
-<ds:datastoreItem xmlns:ds="http://schemas.openxmlformats.org/officeDocument/2006/customXml" ds:itemID="{ADFC0E54-32DF-4EF6-AA10-65C2084BA5CF}">
+<file path=customXml/itemProps84.xml><?xml version="1.0" encoding="utf-8"?>
+<ds:datastoreItem xmlns:ds="http://schemas.openxmlformats.org/officeDocument/2006/customXml" ds:itemID="{59D0772F-AC15-494E-909A-5BCC245ABAE9}">
   <ds:schemaRefs>
     <ds:schemaRef ds:uri="http://schemas.microsoft.com/VisualStudio/2011/storyboarding/control"/>
   </ds:schemaRefs>
 </ds:datastoreItem>
 </file>
 
-<file path=customXml/itemProps3.xml><?xml version="1.0" encoding="utf-8"?>
-<ds:datastoreItem xmlns:ds="http://schemas.openxmlformats.org/officeDocument/2006/customXml" ds:itemID="{7BED5AAF-A887-4928-BFF1-AA6F41EAC01E}">
+<file path=customXml/itemProps85.xml><?xml version="1.0" encoding="utf-8"?>
+<ds:datastoreItem xmlns:ds="http://schemas.openxmlformats.org/officeDocument/2006/customXml" ds:itemID="{DB44F08D-A554-4DAE-AB92-9F19A0AF0E0F}">
   <ds:schemaRefs>
     <ds:schemaRef ds:uri="http://schemas.microsoft.com/VisualStudio/2011/storyboarding/control"/>
   </ds:schemaRefs>
 </ds:datastoreItem>
 </file>
 
-<file path=customXml/itemProps30.xml><?xml version="1.0" encoding="utf-8"?>
-<ds:datastoreItem xmlns:ds="http://schemas.openxmlformats.org/officeDocument/2006/customXml" ds:itemID="{E1B41B76-6F78-44DC-99A8-DFD2C2A83E34}">
+<file path=customXml/itemProps86.xml><?xml version="1.0" encoding="utf-8"?>
+<ds:datastoreItem xmlns:ds="http://schemas.openxmlformats.org/officeDocument/2006/customXml" ds:itemID="{D9BEE98F-34AD-4470-830C-0712E5B34DAB}">
   <ds:schemaRefs>
     <ds:schemaRef ds:uri="http://schemas.microsoft.com/VisualStudio/2011/storyboarding/control"/>
   </ds:schemaRefs>
 </ds:datastoreItem>
 </file>
 
-<file path=customXml/itemProps31.xml><?xml version="1.0" encoding="utf-8"?>
-<ds:datastoreItem xmlns:ds="http://schemas.openxmlformats.org/officeDocument/2006/customXml" ds:itemID="{72BCF8D5-9CEC-40C5-8D88-80AB6FC9E9F8}">
+<file path=customXml/itemProps87.xml><?xml version="1.0" encoding="utf-8"?>
+<ds:datastoreItem xmlns:ds="http://schemas.openxmlformats.org/officeDocument/2006/customXml" ds:itemID="{61A4FFB8-8D16-40C7-B4D8-66678F0EE78F}">
   <ds:schemaRefs>
     <ds:schemaRef ds:uri="http://schemas.microsoft.com/VisualStudio/2011/storyboarding/control"/>
   </ds:schemaRefs>
 </ds:datastoreItem>
 </file>
 
-<file path=customXml/itemProps32.xml><?xml version="1.0" encoding="utf-8"?>
+<file path=customXml/itemProps88.xml><?xml version="1.0" encoding="utf-8"?>
+<ds:datastoreItem xmlns:ds="http://schemas.openxmlformats.org/officeDocument/2006/customXml" ds:itemID="{501253E0-06C6-4CEC-8FFC-EEC832BFF7AD}">
+  <ds:schemaRefs>
+    <ds:schemaRef ds:uri="http://schemas.microsoft.com/VisualStudio/2011/storyboarding/control"/>
+  </ds:schemaRefs>
+</ds:datastoreItem>
+</file>
+
+<file path=customXml/itemProps89.xml><?xml version="1.0" encoding="utf-8"?>
+<ds:datastoreItem xmlns:ds="http://schemas.openxmlformats.org/officeDocument/2006/customXml" ds:itemID="{D32E724C-A4FF-4612-9996-DD4AED58BA62}">
+  <ds:schemaRefs>
+    <ds:schemaRef ds:uri="http://schemas.microsoft.com/VisualStudio/2011/storyboarding/control"/>
+  </ds:schemaRefs>
+</ds:datastoreItem>
+</file>
+
+<file path=customXml/itemProps9.xml><?xml version="1.0" encoding="utf-8"?>
 <ds:datastoreItem xmlns:ds="http://schemas.openxmlformats.org/officeDocument/2006/customXml" ds:itemID="{AAAD0EC6-A22B-48B1-82D8-79572FE29363}">
   <ds:schemaRefs>
     <ds:schemaRef ds:uri="http://schemas.microsoft.com/VisualStudio/2011/storyboarding/control"/>
   </ds:schemaRefs>
 </ds:datastoreItem>
-</file>
-
-<file path=customXml/itemProps33.xml><?xml version="1.0" encoding="utf-8"?>
-<ds:datastoreItem xmlns:ds="http://schemas.openxmlformats.org/officeDocument/2006/customXml" ds:itemID="{FDA6DE73-A91D-4E02-94C3-C6DB0DC6D010}">
-  <ds:schemaRefs>
-    <ds:schemaRef ds:uri="http://schemas.microsoft.com/VisualStudio/2011/storyboarding/control"/>
-  </ds:schemaRefs>
-</ds:datastoreItem>
-</file>
-
-<file path=customXml/itemProps34.xml><?xml version="1.0" encoding="utf-8"?>
-<ds:datastoreItem xmlns:ds="http://schemas.openxmlformats.org/officeDocument/2006/customXml" ds:itemID="{DC354CCD-34CB-4038-9E97-5D641FC3188E}">
-  <ds:schemaRefs>
-    <ds:schemaRef ds:uri="http://schemas.microsoft.com/VisualStudio/2011/storyboarding/control"/>
-  </ds:schemaRefs>
-</ds:datastoreItem>
-</file>
-
-<file path=customXml/itemProps35.xml><?xml version="1.0" encoding="utf-8"?>
-<ds:datastoreItem xmlns:ds="http://schemas.openxmlformats.org/officeDocument/2006/customXml" ds:itemID="{066B72A9-6778-44B8-9F8D-925F93B5D2D7}">
-  <ds:schemaRefs>
-    <ds:schemaRef ds:uri="http://schemas.microsoft.com/VisualStudio/2011/storyboarding/control"/>
-  </ds:schemaRefs>
-</ds:datastoreItem>
-</file>
-
-<file path=customXml/itemProps36.xml><?xml version="1.0" encoding="utf-8"?>
-<ds:datastoreItem xmlns:ds="http://schemas.openxmlformats.org/officeDocument/2006/customXml" ds:itemID="{1DD2346F-B9C4-4399-ABD4-BA9740D9BD88}">
-  <ds:schemaRefs>
-    <ds:schemaRef ds:uri="http://schemas.microsoft.com/VisualStudio/2011/storyboarding/control"/>
-  </ds:schemaRefs>
-</ds:datastoreItem>
-</file>
-
-<file path=customXml/itemProps37.xml><?xml version="1.0" encoding="utf-8"?>
-<ds:datastoreItem xmlns:ds="http://schemas.openxmlformats.org/officeDocument/2006/customXml" ds:itemID="{A4C33EEA-7075-4651-97E3-4829E38E21EA}">
-  <ds:schemaRefs>
-    <ds:schemaRef ds:uri="http://schemas.microsoft.com/VisualStudio/2011/storyboarding/control"/>
-  </ds:schemaRefs>
-</ds:datastoreItem>
-</file>
-
-<file path=customXml/itemProps38.xml><?xml version="1.0" encoding="utf-8"?>
-<ds:datastoreItem xmlns:ds="http://schemas.openxmlformats.org/officeDocument/2006/customXml" ds:itemID="{6ED5C25D-E4FB-497F-A571-D33B7D1E81C6}">
-  <ds:schemaRefs>
-    <ds:schemaRef ds:uri="http://schemas.microsoft.com/VisualStudio/2011/storyboarding/control"/>
-  </ds:schemaRefs>
-</ds:datastoreItem>
-</file>
-
-<file path=customXml/itemProps39.xml><?xml version="1.0" encoding="utf-8"?>
-<ds:datastoreItem xmlns:ds="http://schemas.openxmlformats.org/officeDocument/2006/customXml" ds:itemID="{69B6F2B9-DC41-419F-BF45-B4C3B79D72C8}">
-  <ds:schemaRefs>
-    <ds:schemaRef ds:uri="http://schemas.microsoft.com/VisualStudio/2011/storyboarding/control"/>
-  </ds:schemaRefs>
-</ds:datastoreItem>
-</file>
-
-<file path=customXml/itemProps4.xml><?xml version="1.0" encoding="utf-8"?>
-<ds:datastoreItem xmlns:ds="http://schemas.openxmlformats.org/officeDocument/2006/customXml" ds:itemID="{A8F37163-25F8-4E84-8279-D4574B49C22C}">
-  <ds:schemaRefs>
-    <ds:schemaRef ds:uri="http://schemas.microsoft.com/VisualStudio/2011/storyboarding/control"/>
-  </ds:schemaRefs>
-</ds:datastoreItem>
-</file>
-
-<file path=customXml/itemProps40.xml><?xml version="1.0" encoding="utf-8"?>
-<ds:datastoreItem xmlns:ds="http://schemas.openxmlformats.org/officeDocument/2006/customXml" ds:itemID="{76F1EE43-31A0-4919-A618-DFAA86460D6E}">
-  <ds:schemaRefs>
-    <ds:schemaRef ds:uri="http://schemas.microsoft.com/VisualStudio/2011/storyboarding/control"/>
-  </ds:schemaRefs>
-</ds:datastoreItem>
-</file>
-
-<file path=customXml/itemProps41.xml><?xml version="1.0" encoding="utf-8"?>
-<ds:datastoreItem xmlns:ds="http://schemas.openxmlformats.org/officeDocument/2006/customXml" ds:itemID="{9C6A7914-511A-42E6-908E-AEFBA51CB63F}">
-  <ds:schemaRefs>
-    <ds:schemaRef ds:uri="http://schemas.microsoft.com/VisualStudio/2011/storyboarding/control"/>
-  </ds:schemaRefs>
-</ds:datastoreItem>
-</file>
-
-<file path=customXml/itemProps42.xml><?xml version="1.0" encoding="utf-8"?>
-<ds:datastoreItem xmlns:ds="http://schemas.openxmlformats.org/officeDocument/2006/customXml" ds:itemID="{BEA4C740-500C-473C-84AE-9914EC453753}">
-  <ds:schemaRefs>
-    <ds:schemaRef ds:uri="http://schemas.microsoft.com/VisualStudio/2011/storyboarding/control"/>
-  </ds:schemaRefs>
-</ds:datastoreItem>
-</file>
-
-<file path=customXml/itemProps43.xml><?xml version="1.0" encoding="utf-8"?>
-<ds:datastoreItem xmlns:ds="http://schemas.openxmlformats.org/officeDocument/2006/customXml" ds:itemID="{CCBA0FAD-D47F-4053-BB7A-FCDAF4A83483}">
-  <ds:schemaRefs>
-    <ds:schemaRef ds:uri="http://schemas.microsoft.com/VisualStudio/2011/storyboarding/control"/>
-  </ds:schemaRefs>
-</ds:datastoreItem>
-</file>
-
-<file path=customXml/itemProps44.xml><?xml version="1.0" encoding="utf-8"?>
-<ds:datastoreItem xmlns:ds="http://schemas.openxmlformats.org/officeDocument/2006/customXml" ds:itemID="{7D7CB359-8F7B-4D8A-808E-1C6B29A64ED6}">
-  <ds:schemaRefs>
-    <ds:schemaRef ds:uri="http://schemas.microsoft.com/VisualStudio/2011/storyboarding/control"/>
-  </ds:schemaRefs>
-</ds:datastoreItem>
-</file>
-
-<file path=customXml/itemProps45.xml><?xml version="1.0" encoding="utf-8"?>
-<ds:datastoreItem xmlns:ds="http://schemas.openxmlformats.org/officeDocument/2006/customXml" ds:itemID="{E838889A-C741-48DA-8FAC-50ADAD37F748}">
-  <ds:schemaRefs>
-    <ds:schemaRef ds:uri="http://schemas.microsoft.com/VisualStudio/2011/storyboarding/control"/>
-  </ds:schemaRefs>
-</ds:datastoreItem>
-</file>
-
-<file path=customXml/itemProps46.xml><?xml version="1.0" encoding="utf-8"?>
-<ds:datastoreItem xmlns:ds="http://schemas.openxmlformats.org/officeDocument/2006/customXml" ds:itemID="{581C7DE6-5844-4025-8BA4-BE4D62ED991F}">
-  <ds:schemaRefs>
-    <ds:schemaRef ds:uri="http://schemas.microsoft.com/VisualStudio/2011/storyboarding/control"/>
-  </ds:schemaRefs>
-</ds:datastoreItem>
-</file>
-
-<file path=customXml/itemProps47.xml><?xml version="1.0" encoding="utf-8"?>
-<ds:datastoreItem xmlns:ds="http://schemas.openxmlformats.org/officeDocument/2006/customXml" ds:itemID="{E45C5231-5AD7-483C-88AF-E2C3D79A2934}">
-  <ds:schemaRefs>
-    <ds:schemaRef ds:uri="http://schemas.microsoft.com/VisualStudio/2011/storyboarding/control"/>
-  </ds:schemaRefs>
-</ds:datastoreItem>
-</file>
-
-<file path=customXml/itemProps48.xml><?xml version="1.0" encoding="utf-8"?>
-<ds:datastoreItem xmlns:ds="http://schemas.openxmlformats.org/officeDocument/2006/customXml" ds:itemID="{767C30FE-3B3A-4F21-844A-AB59F94E4161}">
-  <ds:schemaRefs>
-    <ds:schemaRef ds:uri="http://schemas.microsoft.com/VisualStudio/2011/storyboarding/control"/>
-  </ds:schemaRefs>
-</ds:datastoreItem>
-</file>
-
-<file path=customXml/itemProps49.xml><?xml version="1.0" encoding="utf-8"?>
-<ds:datastoreItem xmlns:ds="http://schemas.openxmlformats.org/officeDocument/2006/customXml" ds:itemID="{B5097B66-9493-4961-9240-EE55C193BEC8}">
-  <ds:schemaRefs>
-    <ds:schemaRef ds:uri="http://schemas.microsoft.com/VisualStudio/2011/storyboarding/control"/>
-  </ds:schemaRefs>
-</ds:datastoreItem>
-</file>
-
-<file path=customXml/itemProps5.xml><?xml version="1.0" encoding="utf-8"?>
-<ds:datastoreItem xmlns:ds="http://schemas.openxmlformats.org/officeDocument/2006/customXml" ds:itemID="{9E6F7571-4EBE-4180-B628-CCE77B77DF89}">
-  <ds:schemaRefs>
-    <ds:schemaRef ds:uri="http://schemas.microsoft.com/VisualStudio/2011/storyboarding/control"/>
-  </ds:schemaRefs>
-</ds:datastoreItem>
-</file>
-
-<file path=customXml/itemProps50.xml><?xml version="1.0" encoding="utf-8"?>
-<ds:datastoreItem xmlns:ds="http://schemas.openxmlformats.org/officeDocument/2006/customXml" ds:itemID="{DCA7DBC9-E7E7-45F7-96F6-0FE75525CEC3}">
-  <ds:schemaRefs>
-    <ds:schemaRef ds:uri="http://schemas.microsoft.com/VisualStudio/2011/storyboarding/control"/>
-  </ds:schemaRefs>
-</ds:datastoreItem>
-</file>
-
-<file path=customXml/itemProps51.xml><?xml version="1.0" encoding="utf-8"?>
-<ds:datastoreItem xmlns:ds="http://schemas.openxmlformats.org/officeDocument/2006/customXml" ds:itemID="{07647DA0-E684-4907-8046-3DFC43ED9042}">
-  <ds:schemaRefs>
-    <ds:schemaRef ds:uri="http://schemas.microsoft.com/VisualStudio/2011/storyboarding/control"/>
-  </ds:schemaRefs>
-</ds:datastoreItem>
-</file>
-
-<file path=customXml/itemProps52.xml><?xml version="1.0" encoding="utf-8"?>
-<ds:datastoreItem xmlns:ds="http://schemas.openxmlformats.org/officeDocument/2006/customXml" ds:itemID="{1AA1CC44-DF68-44CD-A528-E419F7CFA1D9}">
-  <ds:schemaRefs>
-    <ds:schemaRef ds:uri="http://schemas.microsoft.com/VisualStudio/2011/storyboarding/control"/>
-  </ds:schemaRefs>
-</ds:datastoreItem>
-</file>
-
-<file path=customXml/itemProps53.xml><?xml version="1.0" encoding="utf-8"?>
-<ds:datastoreItem xmlns:ds="http://schemas.openxmlformats.org/officeDocument/2006/customXml" ds:itemID="{7FC1ACFC-5903-4315-BB83-531181E20214}">
-  <ds:schemaRefs>
-    <ds:schemaRef ds:uri="http://schemas.microsoft.com/VisualStudio/2011/storyboarding/control"/>
-  </ds:schemaRefs>
-</ds:datastoreItem>
-</file>
-
-<file path=customXml/itemProps54.xml><?xml version="1.0" encoding="utf-8"?>
-<ds:datastoreItem xmlns:ds="http://schemas.openxmlformats.org/officeDocument/2006/customXml" ds:itemID="{ECD73F77-92DD-4C21-92E5-429F75002F17}">
-  <ds:schemaRefs>
-    <ds:schemaRef ds:uri="http://schemas.microsoft.com/VisualStudio/2011/storyboarding/control"/>
-  </ds:schemaRefs>
-</ds:datastoreItem>
-</file>
-
-<file path=customXml/itemProps55.xml><?xml version="1.0" encoding="utf-8"?>
-<ds:datastoreItem xmlns:ds="http://schemas.openxmlformats.org/officeDocument/2006/customXml" ds:itemID="{EB537FFA-BDFE-4B5C-A7BF-B70BEBF50B70}">
-  <ds:schemaRefs>
-    <ds:schemaRef ds:uri="http://schemas.microsoft.com/VisualStudio/2011/storyboarding/control"/>
-  </ds:schemaRefs>
-</ds:datastoreItem>
-</file>
-
-<file path=customXml/itemProps56.xml><?xml version="1.0" encoding="utf-8"?>
-<ds:datastoreItem xmlns:ds="http://schemas.openxmlformats.org/officeDocument/2006/customXml" ds:itemID="{A4268BD8-7853-4881-9E53-4FE1E08A411E}">
-  <ds:schemaRefs>
-    <ds:schemaRef ds:uri="http://schemas.microsoft.com/VisualStudio/2011/storyboarding/control"/>
-  </ds:schemaRefs>
-</ds:datastoreItem>
-</file>
-
-<file path=customXml/itemProps57.xml><?xml version="1.0" encoding="utf-8"?>
-<ds:datastoreItem xmlns:ds="http://schemas.openxmlformats.org/officeDocument/2006/customXml" ds:itemID="{B6CACD45-209B-4AE5-9003-E06B8E889661}">
-  <ds:schemaRefs>
-    <ds:schemaRef ds:uri="http://schemas.microsoft.com/VisualStudio/2011/storyboarding/control"/>
-  </ds:schemaRefs>
-</ds:datastoreItem>
-</file>
-
-<file path=customXml/itemProps58.xml><?xml version="1.0" encoding="utf-8"?>
-<ds:datastoreItem xmlns:ds="http://schemas.openxmlformats.org/officeDocument/2006/customXml" ds:itemID="{C4E818A4-7FE2-4B84-AEA0-A9F6FB50C5C3}">
-  <ds:schemaRefs>
-    <ds:schemaRef ds:uri="http://schemas.microsoft.com/VisualStudio/2011/storyboarding/control"/>
-  </ds:schemaRefs>
-</ds:datastoreItem>
-</file>
-
-<file path=customXml/itemProps59.xml><?xml version="1.0" encoding="utf-8"?>
-<ds:datastoreItem xmlns:ds="http://schemas.openxmlformats.org/officeDocument/2006/customXml" ds:itemID="{5B4794DC-66F7-4498-B3C3-DCD5F74D5FD8}">
-  <ds:schemaRefs>
-    <ds:schemaRef ds:uri="http://schemas.microsoft.com/VisualStudio/2011/storyboarding/control"/>
-  </ds:schemaRefs>
-</ds:datastoreItem>
-</file>
-
-<file path=customXml/itemProps6.xml><?xml version="1.0" encoding="utf-8"?>
-<ds:datastoreItem xmlns:ds="http://schemas.openxmlformats.org/officeDocument/2006/customXml" ds:itemID="{5DABBEE4-57BD-45BC-A909-91BEE00F4D9D}">
-  <ds:schemaRefs>
-    <ds:schemaRef ds:uri="http://schemas.microsoft.com/VisualStudio/2011/storyboarding/control"/>
-  </ds:schemaRefs>
-</ds:datastoreItem>
-</file>
-
-<file path=customXml/itemProps60.xml><?xml version="1.0" encoding="utf-8"?>
-<ds:datastoreItem xmlns:ds="http://schemas.openxmlformats.org/officeDocument/2006/customXml" ds:itemID="{832B116A-63C5-420F-9558-05BBB3EA9C8F}">
-  <ds:schemaRefs>
-    <ds:schemaRef ds:uri="http://schemas.microsoft.com/VisualStudio/2011/storyboarding/control"/>
-  </ds:schemaRefs>
-</ds:datastoreItem>
-</file>
-
-<file path=customXml/itemProps61.xml><?xml version="1.0" encoding="utf-8"?>
-<ds:datastoreItem xmlns:ds="http://schemas.openxmlformats.org/officeDocument/2006/customXml" ds:itemID="{87FB099B-3A5F-41E5-BC8E-F3D2EF159FCA}">
-  <ds:schemaRefs>
-    <ds:schemaRef ds:uri="http://schemas.microsoft.com/VisualStudio/2011/storyboarding/control"/>
-  </ds:schemaRefs>
-</ds:datastoreItem>
-</file>
-
-<file path=customXml/itemProps62.xml><?xml version="1.0" encoding="utf-8"?>
-<ds:datastoreItem xmlns:ds="http://schemas.openxmlformats.org/officeDocument/2006/customXml" ds:itemID="{B6D3FCD1-1D67-4BCA-8C64-D3FAB60D9726}">
-  <ds:schemaRefs>
-    <ds:schemaRef ds:uri="http://schemas.microsoft.com/VisualStudio/2011/storyboarding/control"/>
-  </ds:schemaRefs>
-</ds:datastoreItem>
-</file>
-
-<file path=customXml/itemProps63.xml><?xml version="1.0" encoding="utf-8"?>
-<ds:datastoreItem xmlns:ds="http://schemas.openxmlformats.org/officeDocument/2006/customXml" ds:itemID="{26C443F0-80A1-49EA-8A5C-61D529987C65}">
-  <ds:schemaRefs>
-    <ds:schemaRef ds:uri="http://schemas.microsoft.com/VisualStudio/2011/storyboarding/control"/>
-  </ds:schemaRefs>
-</ds:datastoreItem>
-</file>
-
-<file path=customXml/itemProps64.xml><?xml version="1.0" encoding="utf-8"?>
-<ds:datastoreItem xmlns:ds="http://schemas.openxmlformats.org/officeDocument/2006/customXml" ds:itemID="{17887D8F-4CC8-4617-868E-91CB574B7BF1}">
-  <ds:schemaRefs>
-    <ds:schemaRef ds:uri="http://schemas.microsoft.com/VisualStudio/2011/storyboarding/control"/>
-  </ds:schemaRefs>
-</ds:datastoreItem>
-</file>
-
-<file path=customXml/itemProps65.xml><?xml version="1.0" encoding="utf-8"?>
-<ds:datastoreItem xmlns:ds="http://schemas.openxmlformats.org/officeDocument/2006/customXml" ds:itemID="{0CEB70F9-7616-444A-9041-F0769F94E65B}">
-  <ds:schemaRefs>
-    <ds:schemaRef ds:uri="http://schemas.microsoft.com/VisualStudio/2011/storyboarding/control"/>
-  </ds:schemaRefs>
-</ds:datastoreItem>
-</file>
-
-<file path=customXml/itemProps7.xml><?xml version="1.0" encoding="utf-8"?>
-<ds:datastoreItem xmlns:ds="http://schemas.openxmlformats.org/officeDocument/2006/customXml" ds:itemID="{BA1D1506-1E64-4120-88FA-59E429E224FA}">
-  <ds:schemaRefs>
-    <ds:schemaRef ds:uri="http://schemas.microsoft.com/VisualStudio/2011/storyboarding/control"/>
-  </ds:schemaRefs>
-</ds:datastoreItem>
-</file>
-
-<file path=customXml/itemProps8.xml><?xml version="1.0" encoding="utf-8"?>
-<ds:datastoreItem xmlns:ds="http://schemas.openxmlformats.org/officeDocument/2006/customXml" ds:itemID="{6D917542-4CB5-4F33-83FB-7158BE7AA367}">
-  <ds:schemaRefs>
-    <ds:schemaRef ds:uri="http://schemas.microsoft.com/VisualStudio/2011/storyboarding/control"/>
-  </ds:schemaRefs>
-</ds:datastoreItem>
-</file>
-
-<file path=customXml/itemProps9.xml><?xml version="1.0" encoding="utf-8"?>
-<ds:datastoreItem xmlns:ds="http://schemas.openxmlformats.org/officeDocument/2006/customXml" ds:itemID="{EF9DB188-6753-4B9A-AF3E-8E01D022A2D0}">
-  <ds:schemaRefs>
-    <ds:schemaRef ds:uri="http://schemas.microsoft.com/VisualStudio/2011/storyboarding/control"/>
-  </ds:schemaRefs>
-</ds:datastoreItem>
 </file>
</xml_diff>

<commit_message>
Atualização pós levantamento até contrato.
</commit_message>
<xml_diff>
--- a/prototipo/PedidoDeCompra.pptx
+++ b/prototipo/PedidoDeCompra.pptx
@@ -159,7 +159,7 @@
     <p:pos x="1051" y="3206"/>
     <p:text>O contador deve ser atualizado de acordo com os filtros aplicados na tela, por padrão será exibido no formato "Exibindo &lt;total da página&gt; de &lt;total de registros&gt;"
 Exibir máximo  de 5 registros por página, quando existirem mais registros, paginar.</p:text>
-    <p:extLst>
+    <p:extLst mod="1">
       <p:ext uri="{C676402C-5697-4E1C-873F-D02D1690AC5C}">
         <p15:threadingInfo xmlns:p15="http://schemas.microsoft.com/office/powerpoint/2012/main" timeZoneBias="180"/>
       </p:ext>
@@ -377,7 +377,7 @@
           <a:p>
             <a:fld id="{8F9EAF97-829A-4C4C-B030-0EFD85FDA843}" type="datetimeFigureOut">
               <a:rPr lang="pt-BR" smtClean="0"/>
-              <a:t>30/09/2018</a:t>
+              <a:t>01/10/2018</a:t>
             </a:fld>
             <a:endParaRPr lang="pt-BR"/>
           </a:p>
@@ -575,7 +575,7 @@
           <a:p>
             <a:fld id="{8F9EAF97-829A-4C4C-B030-0EFD85FDA843}" type="datetimeFigureOut">
               <a:rPr lang="pt-BR" smtClean="0"/>
-              <a:t>30/09/2018</a:t>
+              <a:t>01/10/2018</a:t>
             </a:fld>
             <a:endParaRPr lang="pt-BR"/>
           </a:p>
@@ -783,7 +783,7 @@
           <a:p>
             <a:fld id="{8F9EAF97-829A-4C4C-B030-0EFD85FDA843}" type="datetimeFigureOut">
               <a:rPr lang="pt-BR" smtClean="0"/>
-              <a:t>30/09/2018</a:t>
+              <a:t>01/10/2018</a:t>
             </a:fld>
             <a:endParaRPr lang="pt-BR"/>
           </a:p>
@@ -1699,7 +1699,7 @@
           <a:p>
             <a:fld id="{8F9EAF97-829A-4C4C-B030-0EFD85FDA843}" type="datetimeFigureOut">
               <a:rPr lang="pt-BR" smtClean="0"/>
-              <a:t>30/09/2018</a:t>
+              <a:t>01/10/2018</a:t>
             </a:fld>
             <a:endParaRPr lang="pt-BR"/>
           </a:p>
@@ -1974,7 +1974,7 @@
           <a:p>
             <a:fld id="{8F9EAF97-829A-4C4C-B030-0EFD85FDA843}" type="datetimeFigureOut">
               <a:rPr lang="pt-BR" smtClean="0"/>
-              <a:t>30/09/2018</a:t>
+              <a:t>01/10/2018</a:t>
             </a:fld>
             <a:endParaRPr lang="pt-BR"/>
           </a:p>
@@ -2239,7 +2239,7 @@
           <a:p>
             <a:fld id="{8F9EAF97-829A-4C4C-B030-0EFD85FDA843}" type="datetimeFigureOut">
               <a:rPr lang="pt-BR" smtClean="0"/>
-              <a:t>30/09/2018</a:t>
+              <a:t>01/10/2018</a:t>
             </a:fld>
             <a:endParaRPr lang="pt-BR"/>
           </a:p>
@@ -2651,7 +2651,7 @@
           <a:p>
             <a:fld id="{8F9EAF97-829A-4C4C-B030-0EFD85FDA843}" type="datetimeFigureOut">
               <a:rPr lang="pt-BR" smtClean="0"/>
-              <a:t>30/09/2018</a:t>
+              <a:t>01/10/2018</a:t>
             </a:fld>
             <a:endParaRPr lang="pt-BR"/>
           </a:p>
@@ -2792,7 +2792,7 @@
           <a:p>
             <a:fld id="{8F9EAF97-829A-4C4C-B030-0EFD85FDA843}" type="datetimeFigureOut">
               <a:rPr lang="pt-BR" smtClean="0"/>
-              <a:t>30/09/2018</a:t>
+              <a:t>01/10/2018</a:t>
             </a:fld>
             <a:endParaRPr lang="pt-BR"/>
           </a:p>
@@ -2905,7 +2905,7 @@
           <a:p>
             <a:fld id="{8F9EAF97-829A-4C4C-B030-0EFD85FDA843}" type="datetimeFigureOut">
               <a:rPr lang="pt-BR" smtClean="0"/>
-              <a:t>30/09/2018</a:t>
+              <a:t>01/10/2018</a:t>
             </a:fld>
             <a:endParaRPr lang="pt-BR"/>
           </a:p>
@@ -3216,7 +3216,7 @@
           <a:p>
             <a:fld id="{8F9EAF97-829A-4C4C-B030-0EFD85FDA843}" type="datetimeFigureOut">
               <a:rPr lang="pt-BR" smtClean="0"/>
-              <a:t>30/09/2018</a:t>
+              <a:t>01/10/2018</a:t>
             </a:fld>
             <a:endParaRPr lang="pt-BR"/>
           </a:p>
@@ -3504,7 +3504,7 @@
           <a:p>
             <a:fld id="{8F9EAF97-829A-4C4C-B030-0EFD85FDA843}" type="datetimeFigureOut">
               <a:rPr lang="pt-BR" smtClean="0"/>
-              <a:t>30/09/2018</a:t>
+              <a:t>01/10/2018</a:t>
             </a:fld>
             <a:endParaRPr lang="pt-BR"/>
           </a:p>
@@ -3745,7 +3745,7 @@
           <a:p>
             <a:fld id="{8F9EAF97-829A-4C4C-B030-0EFD85FDA843}" type="datetimeFigureOut">
               <a:rPr lang="pt-BR" smtClean="0"/>
-              <a:t>30/09/2018</a:t>
+              <a:t>01/10/2018</a:t>
             </a:fld>
             <a:endParaRPr lang="pt-BR"/>
           </a:p>
@@ -9298,115 +9298,115 @@
 
 <file path=customXml/item1.xml><?xml version="1.0" encoding="utf-8"?>
 <Control xmlns="http://schemas.microsoft.com/VisualStudio/2011/storyboarding/control">
-  <Id Name="94a64934-5db3-47cf-96df-f3eb1ee28c2b" Revision="1" Stencil="System.MyShapes" StencilVersion="1.0"/>
+  <Id Name="b498fdc2-67f2-4de5-899f-26683373e8ad" Revision="1" Stencil="System.MyShapes" StencilVersion="1.0"/>
 </Control>
 </file>
 
 <file path=customXml/item10.xml><?xml version="1.0" encoding="utf-8"?>
 <Control xmlns="http://schemas.microsoft.com/VisualStudio/2011/storyboarding/control">
-  <Id Name="32035d07-bc66-4a79-8001-2507012193e3" RevisionId="7f6cc906-8fab-4878-8f41-90bcdc4e860e" Stencil="172d6d98-e5c9-42e9-a209-79f7a94bbd38" StencilRevisionId="00000000-0000-0000-0000-000000000000" StencilVersion="0.0"/>
+  <Id Name="45617f0c-a378-4d86-8073-87fd3c9eb064" Revision="1" Stencil="System.MyShapes" StencilVersion="1.0"/>
 </Control>
 </file>
 
 <file path=customXml/item11.xml><?xml version="1.0" encoding="utf-8"?>
 <Control xmlns="http://schemas.microsoft.com/VisualStudio/2011/storyboarding/control">
-  <Id Name="3af3c69d-e93c-4e90-95f5-13afa1a89449" Revision="1" Stencil="85a07843-b809-41ee-b566-325b1850150a" StencilVersion="1.0"/>
+  <Id Name="8e7bc36a-eab6-47ca-abb8-86f7bf9f67c9" Revision="3" Stencil="System.MyShapes" StencilVersion="1.0"/>
 </Control>
 </file>
 
 <file path=customXml/item12.xml><?xml version="1.0" encoding="utf-8"?>
+<Control xmlns="http://schemas.microsoft.com/VisualStudio/2011/storyboarding/control">
+  <Id Name="9558e425-a15a-4a2a-8c7d-369dc6767849" Revision="1" Stencil="09ee8e29-8a48-4e3d-a569-7c1ba11c2e3d" StencilVersion="1.0"/>
+</Control>
+</file>
+
+<file path=customXml/item13.xml><?xml version="1.0" encoding="utf-8"?>
+<Control xmlns="http://schemas.microsoft.com/VisualStudio/2011/storyboarding/control">
+  <Id Name="e86b6df1-c5a7-46e8-b789-cae60d6c7d17" Revision="1" Stencil="System.MyShapes" StencilVersion="1.0"/>
+</Control>
+</file>
+
+<file path=customXml/item14.xml><?xml version="1.0" encoding="utf-8"?>
+<Control xmlns="http://schemas.microsoft.com/VisualStudio/2011/storyboarding/control">
+  <Id Name="add342ac-430c-4877-8f87-437e216caf6b" Revision="1" Stencil="System.MyShapes" StencilVersion="1.0"/>
+</Control>
+</file>
+
+<file path=customXml/item15.xml><?xml version="1.0" encoding="utf-8"?>
 <Control xmlns="http://schemas.microsoft.com/VisualStudio/2011/storyboarding/control">
   <Id Name="4837c2c1-9271-4636-b45d-293fac782f46" Revision="1" Stencil="System.MyShapes" StencilVersion="1.0"/>
 </Control>
 </file>
 
-<file path=customXml/item13.xml><?xml version="1.0" encoding="utf-8"?>
+<file path=customXml/item16.xml><?xml version="1.0" encoding="utf-8"?>
 <Control xmlns="http://schemas.microsoft.com/VisualStudio/2011/storyboarding/control">
-  <Id Name="555e62f6-1a9c-4a1c-b658-df5e97a4e85c" Revision="1" Stencil="System.MyShapes" StencilVersion="1.0"/>
+  <Id Name="8e7bc36a-eab6-47ca-abb8-86f7bf9f67c9" Revision="3" Stencil="System.MyShapes" StencilVersion="1.0"/>
 </Control>
 </file>
 
-<file path=customXml/item14.xml><?xml version="1.0" encoding="utf-8"?>
+<file path=customXml/item17.xml><?xml version="1.0" encoding="utf-8"?>
+<Control xmlns="http://schemas.microsoft.com/VisualStudio/2011/storyboarding/control">
+  <Id Name="4837c2c1-9271-4636-b45d-293fac782f46" Revision="1" Stencil="System.MyShapes" StencilVersion="1.0"/>
+</Control>
+</file>
+
+<file path=customXml/item18.xml><?xml version="1.0" encoding="utf-8"?>
+<Control xmlns="http://schemas.microsoft.com/VisualStudio/2011/storyboarding/control">
+  <Id Name="10b0aa5a-d420-45da-bed6-67d74a2c246d" Revision="1" Stencil="System.MyShapes" StencilVersion="1.0"/>
+</Control>
+</file>
+
+<file path=customXml/item19.xml><?xml version="1.0" encoding="utf-8"?>
+<Control xmlns="http://schemas.microsoft.com/VisualStudio/2011/storyboarding/control">
+  <Id Name="4837c2c1-9271-4636-b45d-293fac782f46" Revision="1" Stencil="System.MyShapes" StencilVersion="1.0"/>
+</Control>
+</file>
+
+<file path=customXml/item2.xml><?xml version="1.0" encoding="utf-8"?>
+<Control xmlns="http://schemas.microsoft.com/VisualStudio/2011/storyboarding/control">
+  <Id Name="4837c2c1-9271-4636-b45d-293fac782f46" Revision="1" Stencil="System.MyShapes" StencilVersion="1.0"/>
+</Control>
+</file>
+
+<file path=customXml/item20.xml><?xml version="1.0" encoding="utf-8"?>
+<Control xmlns="http://schemas.microsoft.com/VisualStudio/2011/storyboarding/control">
+  <Id Name="System.Storyboarding.Common.DatePicker" Revision="1" Stencil="System.Storyboarding.Common" StencilVersion="0.1"/>
+</Control>
+</file>
+
+<file path=customXml/item21.xml><?xml version="1.0" encoding="utf-8"?>
+<Control xmlns="http://schemas.microsoft.com/VisualStudio/2011/storyboarding/control">
+  <Id Name="1f092a44-b74f-4007-bdae-1c8fc6646a9d" Revision="1" Stencil="System.MyShapes" StencilVersion="1.0"/>
+</Control>
+</file>
+
+<file path=customXml/item22.xml><?xml version="1.0" encoding="utf-8"?>
+<Control xmlns="http://schemas.microsoft.com/VisualStudio/2011/storyboarding/control">
+  <Id Name="9d49edfc-cd80-4200-a8a3-34a19b2cba5d" Revision="1" Stencil="System.MyShapes" StencilVersion="1.0"/>
+</Control>
+</file>
+
+<file path=customXml/item23.xml><?xml version="1.0" encoding="utf-8"?>
 <Control xmlns="http://schemas.microsoft.com/VisualStudio/2011/storyboarding/control">
   <Id Name="b498fdc2-67f2-4de5-899f-26683373e8ad" Revision="1" Stencil="System.MyShapes" StencilVersion="1.0"/>
 </Control>
 </file>
 
-<file path=customXml/item15.xml><?xml version="1.0" encoding="utf-8"?>
-<Control xmlns="http://schemas.microsoft.com/VisualStudio/2011/storyboarding/control">
-  <Id Name="ee84670b-81f4-4bf6-a9a4-a5d58c3f8a95" Revision="1" Stencil="85a07843-b809-41ee-b566-325b1850150a" StencilVersion="1.0"/>
-</Control>
-</file>
-
-<file path=customXml/item16.xml><?xml version="1.0" encoding="utf-8"?>
-<Control xmlns="http://schemas.microsoft.com/VisualStudio/2011/storyboarding/control">
-  <Id Name="06847451-0bea-4bb1-ad11-52311f8931c4" Revision="1" Stencil="System.MyShapes" StencilVersion="1.0"/>
-</Control>
-</file>
-
-<file path=customXml/item17.xml><?xml version="1.0" encoding="utf-8"?>
-<Control xmlns="http://schemas.microsoft.com/VisualStudio/2011/storyboarding/control">
-  <Id Name="51d6c810-a27b-4ddb-8dd6-2e1e1b3c5e44" Revision="1" Stencil="System.MyShapes" StencilVersion="1.0"/>
-</Control>
-</file>
-
-<file path=customXml/item18.xml><?xml version="1.0" encoding="utf-8"?>
-<Control xmlns="http://schemas.microsoft.com/VisualStudio/2011/storyboarding/control">
-  <Id Name="06847451-0bea-4bb1-ad11-52311f8931c4" Revision="1" Stencil="System.MyShapes" StencilVersion="1.0"/>
-</Control>
-</file>
-
-<file path=customXml/item19.xml><?xml version="1.0" encoding="utf-8"?>
+<file path=customXml/item24.xml><?xml version="1.0" encoding="utf-8"?>
 <Control xmlns="http://schemas.microsoft.com/VisualStudio/2011/storyboarding/control">
   <Id Name="9558e425-a15a-4a2a-8c7d-369dc6767849" Revision="1" Stencil="09ee8e29-8a48-4e3d-a569-7c1ba11c2e3d" StencilVersion="1.0"/>
 </Control>
 </file>
 
-<file path=customXml/item2.xml><?xml version="1.0" encoding="utf-8"?>
+<file path=customXml/item25.xml><?xml version="1.0" encoding="utf-8"?>
 <Control xmlns="http://schemas.microsoft.com/VisualStudio/2011/storyboarding/control">
   <Id Name="b498fdc2-67f2-4de5-899f-26683373e8ad" Revision="1" Stencil="System.MyShapes" StencilVersion="1.0"/>
 </Control>
 </file>
 
-<file path=customXml/item20.xml><?xml version="1.0" encoding="utf-8"?>
-<Control xmlns="http://schemas.microsoft.com/VisualStudio/2011/storyboarding/control">
-  <Id Name="605c907b-8b5e-4fc3-b9d8-4a5bfe8c9d4f" Revision="3" Stencil="System.MyShapes" StencilVersion="1.0"/>
-</Control>
-</file>
-
-<file path=customXml/item21.xml><?xml version="1.0" encoding="utf-8"?>
-<Control xmlns="http://schemas.microsoft.com/VisualStudio/2011/storyboarding/control">
-  <Id Name="4837c2c1-9271-4636-b45d-293fac782f46" Revision="1" Stencil="System.MyShapes" StencilVersion="1.0"/>
-</Control>
-</file>
-
-<file path=customXml/item22.xml><?xml version="1.0" encoding="utf-8"?>
+<file path=customXml/item26.xml><?xml version="1.0" encoding="utf-8"?>
 <Control xmlns="http://schemas.microsoft.com/VisualStudio/2011/storyboarding/control">
   <Id Name="b498fdc2-67f2-4de5-899f-26683373e8ad" Revision="1" Stencil="System.MyShapes" StencilVersion="1.0"/>
-</Control>
-</file>
-
-<file path=customXml/item23.xml><?xml version="1.0" encoding="utf-8"?>
-<Control xmlns="http://schemas.microsoft.com/VisualStudio/2011/storyboarding/control">
-  <Id Name="f685762a-9f2c-4532-bec3-d9959b980ef9" Revision="1" Stencil="85a07843-b809-41ee-b566-325b1850150a" StencilVersion="1.0"/>
-</Control>
-</file>
-
-<file path=customXml/item24.xml><?xml version="1.0" encoding="utf-8"?>
-<Control xmlns="http://schemas.microsoft.com/VisualStudio/2011/storyboarding/control">
-  <Id Name="45617f0c-a378-4d86-8073-87fd3c9eb064" Revision="1" Stencil="System.MyShapes" StencilVersion="1.0"/>
-</Control>
-</file>
-
-<file path=customXml/item25.xml><?xml version="1.0" encoding="utf-8"?>
-<Control xmlns="http://schemas.microsoft.com/VisualStudio/2011/storyboarding/control">
-  <Id Name="9d49edfc-cd80-4200-a8a3-34a19b2cba5d" Revision="1" Stencil="System.MyShapes" StencilVersion="1.0"/>
-</Control>
-</file>
-
-<file path=customXml/item26.xml><?xml version="1.0" encoding="utf-8"?>
-<Control xmlns="http://schemas.microsoft.com/VisualStudio/2011/storyboarding/control">
-  <Id Name="3af3c69d-e93c-4e90-95f5-13afa1a89449" Revision="1" Stencil="85a07843-b809-41ee-b566-325b1850150a" StencilVersion="1.0"/>
 </Control>
 </file>
 
@@ -9418,325 +9418,325 @@
 
 <file path=customXml/item28.xml><?xml version="1.0" encoding="utf-8"?>
 <Control xmlns="http://schemas.microsoft.com/VisualStudio/2011/storyboarding/control">
+  <Id Name="System.Storyboarding.Icons.User" Revision="1" Stencil="System.Storyboarding.Icons" StencilVersion="0.1"/>
+</Control>
+</file>
+
+<file path=customXml/item29.xml><?xml version="1.0" encoding="utf-8"?>
+<Control xmlns="http://schemas.microsoft.com/VisualStudio/2011/storyboarding/control">
+  <Id Name="add342ac-430c-4877-8f87-437e216caf6b" Revision="1" Stencil="System.MyShapes" StencilVersion="1.0"/>
+</Control>
+</file>
+
+<file path=customXml/item3.xml><?xml version="1.0" encoding="utf-8"?>
+<Control xmlns="http://schemas.microsoft.com/VisualStudio/2011/storyboarding/control">
+  <Id Name="44831f5f-40f2-4def-a193-92e5a2072f0a" Revision="1" Stencil="System.MyShapes" StencilVersion="1.0"/>
+</Control>
+</file>
+
+<file path=customXml/item30.xml><?xml version="1.0" encoding="utf-8"?>
+<Control xmlns="http://schemas.microsoft.com/VisualStudio/2011/storyboarding/control">
+  <Id Name="System.Storyboarding.Common.Text" Revision="1" Stencil="System.Storyboarding.Common" StencilVersion="0.1"/>
+</Control>
+</file>
+
+<file path=customXml/item31.xml><?xml version="1.0" encoding="utf-8"?>
+<Control xmlns="http://schemas.microsoft.com/VisualStudio/2011/storyboarding/control">
+  <Id Name="System.Storyboarding.WindowsAppIcons.Plus" Revision="1" Stencil="System.Storyboarding.WindowsAppIcons" StencilVersion="0.1"/>
+</Control>
+</file>
+
+<file path=customXml/item32.xml><?xml version="1.0" encoding="utf-8"?>
+<Control xmlns="http://schemas.microsoft.com/VisualStudio/2011/storyboarding/control">
+  <Id Name="e80f86ae-996a-42c4-b08b-54613c6824e2" Revision="1" Stencil="85a07843-b809-41ee-b566-325b1850150a" StencilVersion="1.0"/>
+</Control>
+</file>
+
+<file path=customXml/item33.xml><?xml version="1.0" encoding="utf-8"?>
+<Control xmlns="http://schemas.microsoft.com/VisualStudio/2011/storyboarding/control">
+  <Id Name="8b305ae9-bdb0-4402-94ff-04df21bd0964" Revision="1" Stencil="System.MyShapes" StencilVersion="1.0"/>
+</Control>
+</file>
+
+<file path=customXml/item34.xml><?xml version="1.0" encoding="utf-8"?>
+<Control xmlns="http://schemas.microsoft.com/VisualStudio/2011/storyboarding/control">
+  <Id Name="System.Storyboarding.Common.DropdownBox" Revision="1" Stencil="System.Storyboarding.Common" StencilVersion="0.1"/>
+</Control>
+</file>
+
+<file path=customXml/item35.xml><?xml version="1.0" encoding="utf-8"?>
+<Control xmlns="http://schemas.microsoft.com/VisualStudio/2011/storyboarding/control">
+  <Id Name="10b0aa5a-d420-45da-bed6-67d74a2c246d" Revision="1" Stencil="System.MyShapes" StencilVersion="1.0"/>
+</Control>
+</file>
+
+<file path=customXml/item36.xml><?xml version="1.0" encoding="utf-8"?>
+<Control xmlns="http://schemas.microsoft.com/VisualStudio/2011/storyboarding/control">
+  <Id Name="153824eb-93cd-41fb-aad3-7d03f88f47af" Revision="1" Stencil="System.MyShapes" StencilVersion="1.0"/>
+</Control>
+</file>
+
+<file path=customXml/item37.xml><?xml version="1.0" encoding="utf-8"?>
+<Control xmlns="http://schemas.microsoft.com/VisualStudio/2011/storyboarding/control">
+  <Id Name="45617f0c-a378-4d86-8073-87fd3c9eb064" Revision="1" Stencil="System.MyShapes" StencilVersion="1.0"/>
+</Control>
+</file>
+
+<file path=customXml/item38.xml><?xml version="1.0" encoding="utf-8"?>
+<Control xmlns="http://schemas.microsoft.com/VisualStudio/2011/storyboarding/control">
+  <Id Name="System.Storyboarding.Common.MouseClick" Revision="1" Stencil="System.Storyboarding.Common" StencilVersion="0.1"/>
+</Control>
+</file>
+
+<file path=customXml/item39.xml><?xml version="1.0" encoding="utf-8"?>
+<Control xmlns="http://schemas.microsoft.com/VisualStudio/2011/storyboarding/control">
   <Id Name="4837c2c1-9271-4636-b45d-293fac782f46" Revision="1" Stencil="System.MyShapes" StencilVersion="1.0"/>
 </Control>
 </file>
 
-<file path=customXml/item29.xml><?xml version="1.0" encoding="utf-8"?>
+<file path=customXml/item4.xml><?xml version="1.0" encoding="utf-8"?>
+<Control xmlns="http://schemas.microsoft.com/VisualStudio/2011/storyboarding/control">
+  <Id Name="System.Storyboarding.Common.Text" Revision="1" Stencil="System.Storyboarding.Common" StencilVersion="0.1"/>
+</Control>
+</file>
+
+<file path=customXml/item40.xml><?xml version="1.0" encoding="utf-8"?>
 <Control xmlns="http://schemas.microsoft.com/VisualStudio/2011/storyboarding/control">
   <Id Name="b498fdc2-67f2-4de5-899f-26683373e8ad" Revision="1" Stencil="System.MyShapes" StencilVersion="1.0"/>
 </Control>
 </file>
 
-<file path=customXml/item3.xml><?xml version="1.0" encoding="utf-8"?>
+<file path=customXml/item41.xml><?xml version="1.0" encoding="utf-8"?>
 <Control xmlns="http://schemas.microsoft.com/VisualStudio/2011/storyboarding/control">
   <Id Name="4d1c8ce6-dc2b-440e-b588-61b5729cf52d" Revision="1" Stencil="85a07843-b809-41ee-b566-325b1850150a" StencilVersion="1.0"/>
 </Control>
 </file>
 
-<file path=customXml/item30.xml><?xml version="1.0" encoding="utf-8"?>
+<file path=customXml/item42.xml><?xml version="1.0" encoding="utf-8"?>
 <Control xmlns="http://schemas.microsoft.com/VisualStudio/2011/storyboarding/control">
-  <Id Name="System.Storyboarding.Icons.User" Revision="1" Stencil="System.Storyboarding.Icons" StencilVersion="0.1"/>
+  <Id Name="4837c2c1-9271-4636-b45d-293fac782f46" Revision="1" Stencil="System.MyShapes" StencilVersion="1.0"/>
 </Control>
 </file>
 
-<file path=customXml/item31.xml><?xml version="1.0" encoding="utf-8"?>
+<file path=customXml/item43.xml><?xml version="1.0" encoding="utf-8"?>
+<Control xmlns="http://schemas.microsoft.com/VisualStudio/2011/storyboarding/control">
+  <Id Name="51d6c810-a27b-4ddb-8dd6-2e1e1b3c5e44" Revision="1" Stencil="System.MyShapes" StencilVersion="1.0"/>
+</Control>
+</file>
+
+<file path=customXml/item44.xml><?xml version="1.0" encoding="utf-8"?>
+<Control xmlns="http://schemas.microsoft.com/VisualStudio/2011/storyboarding/control">
+  <Id Name="9d49edfc-cd80-4200-a8a3-34a19b2cba5d" Revision="1" Stencil="System.MyShapes" StencilVersion="1.0"/>
+</Control>
+</file>
+
+<file path=customXml/item45.xml><?xml version="1.0" encoding="utf-8"?>
+<Control xmlns="http://schemas.microsoft.com/VisualStudio/2011/storyboarding/control">
+  <Id Name="ddd70b22-80c2-4e8f-8067-b8dcf2af7c0b" Revision="3" Stencil="System.MyShapes" StencilVersion="1.0"/>
+</Control>
+</file>
+
+<file path=customXml/item46.xml><?xml version="1.0" encoding="utf-8"?>
+<Control xmlns="http://schemas.microsoft.com/VisualStudio/2011/storyboarding/control">
+  <Id Name="461b790a-5c61-4d93-8e5b-5f34a6182b85" Revision="3" Stencil="System.MyShapes" StencilVersion="1.0"/>
+</Control>
+</file>
+
+<file path=customXml/item47.xml><?xml version="1.0" encoding="utf-8"?>
+<Control xmlns="http://schemas.microsoft.com/VisualStudio/2011/storyboarding/control">
+  <Id Name="f685762a-9f2c-4532-bec3-d9959b980ef9" Revision="1" Stencil="85a07843-b809-41ee-b566-325b1850150a" StencilVersion="1.0"/>
+</Control>
+</file>
+
+<file path=customXml/item48.xml><?xml version="1.0" encoding="utf-8"?>
 <Control xmlns="http://schemas.microsoft.com/VisualStudio/2011/storyboarding/control">
   <Id Name="System.Storyboarding.Common.Text" Revision="1" Stencil="System.Storyboarding.Common" StencilVersion="0.1"/>
 </Control>
 </file>
 
-<file path=customXml/item32.xml><?xml version="1.0" encoding="utf-8"?>
+<file path=customXml/item49.xml><?xml version="1.0" encoding="utf-8"?>
 <Control xmlns="http://schemas.microsoft.com/VisualStudio/2011/storyboarding/control">
-  <Id Name="8e7bc36a-eab6-47ca-abb8-86f7bf9f67c9" Revision="3" Stencil="System.MyShapes" StencilVersion="1.0"/>
+  <Id Name="b498fdc2-67f2-4de5-899f-26683373e8ad" Revision="1" Stencil="System.MyShapes" StencilVersion="1.0"/>
 </Control>
 </file>
 
-<file path=customXml/item33.xml><?xml version="1.0" encoding="utf-8"?>
+<file path=customXml/item5.xml><?xml version="1.0" encoding="utf-8"?>
 <Control xmlns="http://schemas.microsoft.com/VisualStudio/2011/storyboarding/control">
-  <Id Name="ddd70b22-80c2-4e8f-8067-b8dcf2af7c0b" Revision="3" Stencil="System.MyShapes" StencilVersion="1.0"/>
+  <Id Name="System.Storyboarding.Common.MouseClick" Revision="1" Stencil="System.Storyboarding.Common" StencilVersion="0.1"/>
 </Control>
 </file>
 
-<file path=customXml/item34.xml><?xml version="1.0" encoding="utf-8"?>
+<file path=customXml/item50.xml><?xml version="1.0" encoding="utf-8"?>
+<Control xmlns="http://schemas.microsoft.com/VisualStudio/2011/storyboarding/control">
+  <Id Name="605c907b-8b5e-4fc3-b9d8-4a5bfe8c9d4f" Revision="3" Stencil="System.MyShapes" StencilVersion="1.0"/>
+</Control>
+</file>
+
+<file path=customXml/item51.xml><?xml version="1.0" encoding="utf-8"?>
+<Control xmlns="http://schemas.microsoft.com/VisualStudio/2011/storyboarding/control">
+  <Id Name="f685762a-9f2c-4532-bec3-d9959b980ef9" Revision="1" Stencil="85a07843-b809-41ee-b566-325b1850150a" StencilVersion="1.0"/>
+</Control>
+</file>
+
+<file path=customXml/item52.xml><?xml version="1.0" encoding="utf-8"?>
+<Control xmlns="http://schemas.microsoft.com/VisualStudio/2011/storyboarding/control">
+  <Id Name="4837c2c1-9271-4636-b45d-293fac782f46" Revision="1" Stencil="System.MyShapes" StencilVersion="1.0"/>
+</Control>
+</file>
+
+<file path=customXml/item53.xml><?xml version="1.0" encoding="utf-8"?>
+<Control xmlns="http://schemas.microsoft.com/VisualStudio/2011/storyboarding/control">
+  <Id Name="94a64934-5db3-47cf-96df-f3eb1ee28c2b" Revision="1" Stencil="System.MyShapes" StencilVersion="1.0"/>
+</Control>
+</file>
+
+<file path=customXml/item54.xml><?xml version="1.0" encoding="utf-8"?>
+<Control xmlns="http://schemas.microsoft.com/VisualStudio/2011/storyboarding/control">
+  <Id Name="c2eea951-2796-40b7-81ae-47cd14fa6407" Revision="1" Stencil="System.MyShapes" StencilVersion="1.0"/>
+</Control>
+</file>
+
+<file path=customXml/item55.xml><?xml version="1.0" encoding="utf-8"?>
+<Control xmlns="http://schemas.microsoft.com/VisualStudio/2011/storyboarding/control">
+  <Id Name="94a64934-5db3-47cf-96df-f3eb1ee28c2b" Revision="1" Stencil="System.MyShapes" StencilVersion="1.0"/>
+</Control>
+</file>
+
+<file path=customXml/item56.xml><?xml version="1.0" encoding="utf-8"?>
+<Control xmlns="http://schemas.microsoft.com/VisualStudio/2011/storyboarding/control">
+  <Id Name="9f80fa0c-f36e-418c-a39b-dc57c3a44c08" Revision="2" Stencil="System.MyShapes" StencilVersion="1.0"/>
+</Control>
+</file>
+
+<file path=customXml/item57.xml><?xml version="1.0" encoding="utf-8"?>
+<Control xmlns="http://schemas.microsoft.com/VisualStudio/2011/storyboarding/control">
+  <Id Name="System.Storyboarding.Common.DatePicker" Revision="1" Stencil="System.Storyboarding.Common" StencilVersion="0.1"/>
+</Control>
+</file>
+
+<file path=customXml/item58.xml><?xml version="1.0" encoding="utf-8"?>
+<Control xmlns="http://schemas.microsoft.com/VisualStudio/2011/storyboarding/control">
+  <Id Name="94a64934-5db3-47cf-96df-f3eb1ee28c2b" Revision="1" Stencil="System.MyShapes" StencilVersion="1.0"/>
+</Control>
+</file>
+
+<file path=customXml/item59.xml><?xml version="1.0" encoding="utf-8"?>
+<Control xmlns="http://schemas.microsoft.com/VisualStudio/2011/storyboarding/control">
+  <Id Name="1f092a44-b74f-4007-bdae-1c8fc6646a9d" Revision="1" Stencil="System.MyShapes" StencilVersion="1.0"/>
+</Control>
+</file>
+
+<file path=customXml/item6.xml><?xml version="1.0" encoding="utf-8"?>
+<Control xmlns="http://schemas.microsoft.com/VisualStudio/2011/storyboarding/control">
+  <Id Name="b498fdc2-67f2-4de5-899f-26683373e8ad" Revision="1" Stencil="System.MyShapes" StencilVersion="1.0"/>
+</Control>
+</file>
+
+<file path=customXml/item60.xml><?xml version="1.0" encoding="utf-8"?>
+<Control xmlns="http://schemas.microsoft.com/VisualStudio/2011/storyboarding/control">
+  <Id Name="ee84670b-81f4-4bf6-a9a4-a5d58c3f8a95" Revision="1" Stencil="85a07843-b809-41ee-b566-325b1850150a" StencilVersion="1.0"/>
+</Control>
+</file>
+
+<file path=customXml/item61.xml><?xml version="1.0" encoding="utf-8"?>
+<Control xmlns="http://schemas.microsoft.com/VisualStudio/2011/storyboarding/control">
+  <Id Name="f685762a-9f2c-4532-bec3-d9959b980ef9" Revision="1" Stencil="85a07843-b809-41ee-b566-325b1850150a" StencilVersion="1.0"/>
+</Control>
+</file>
+
+<file path=customXml/item62.xml><?xml version="1.0" encoding="utf-8"?>
+<Control xmlns="http://schemas.microsoft.com/VisualStudio/2011/storyboarding/control">
+  <Id Name="4837c2c1-9271-4636-b45d-293fac782f46" Revision="1" Stencil="System.MyShapes" StencilVersion="1.0"/>
+</Control>
+</file>
+
+<file path=customXml/item63.xml><?xml version="1.0" encoding="utf-8"?>
+<Control xmlns="http://schemas.microsoft.com/VisualStudio/2011/storyboarding/control">
+  <Id Name="94a64934-5db3-47cf-96df-f3eb1ee28c2b" Revision="1" Stencil="System.MyShapes" StencilVersion="1.0"/>
+</Control>
+</file>
+
+<file path=customXml/item64.xml><?xml version="1.0" encoding="utf-8"?>
+<Control xmlns="http://schemas.microsoft.com/VisualStudio/2011/storyboarding/control">
+  <Id Name="aa7caf86-934b-4e25-b308-65b6ffb256da" Revision="4" Stencil="System.MyShapes" StencilVersion="1.0"/>
+</Control>
+</file>
+
+<file path=customXml/item65.xml><?xml version="1.0" encoding="utf-8"?>
 <Control xmlns="http://schemas.microsoft.com/VisualStudio/2011/storyboarding/control">
   <Id Name="6ddb99ab-d8e2-461f-b3a0-8c3903bf34a7" Revision="1" Stencil="System.MyShapes" StencilVersion="1.0"/>
 </Control>
 </file>
 
-<file path=customXml/item35.xml><?xml version="1.0" encoding="utf-8"?>
+<file path=customXml/item66.xml><?xml version="1.0" encoding="utf-8"?>
 <Control xmlns="http://schemas.microsoft.com/VisualStudio/2011/storyboarding/control">
-  <Id Name="add342ac-430c-4877-8f87-437e216caf6b" Revision="1" Stencil="System.MyShapes" StencilVersion="1.0"/>
+  <Id Name="32035d07-bc66-4a79-8001-2507012193e3" RevisionId="7f6cc906-8fab-4878-8f41-90bcdc4e860e" Stencil="172d6d98-e5c9-42e9-a209-79f7a94bbd38" StencilRevisionId="00000000-0000-0000-0000-000000000000" StencilVersion="0.0"/>
 </Control>
 </file>
 
-<file path=customXml/item36.xml><?xml version="1.0" encoding="utf-8"?>
+<file path=customXml/item67.xml><?xml version="1.0" encoding="utf-8"?>
+<Control xmlns="http://schemas.microsoft.com/VisualStudio/2011/storyboarding/control">
+  <Id Name="System.Storyboarding.Common.Text" Revision="1" Stencil="System.Storyboarding.Common" StencilVersion="0.1"/>
+</Control>
+</file>
+
+<file path=customXml/item68.xml><?xml version="1.0" encoding="utf-8"?>
+<Control xmlns="http://schemas.microsoft.com/VisualStudio/2011/storyboarding/control">
+  <Id Name="38644b22-1525-488b-b218-0f27ea6cb84d" Revision="1" Stencil="System.MyShapes" StencilVersion="1.0"/>
+</Control>
+</file>
+
+<file path=customXml/item69.xml><?xml version="1.0" encoding="utf-8"?>
+<Control xmlns="http://schemas.microsoft.com/VisualStudio/2011/storyboarding/control">
+  <Id Name="ddd70b22-80c2-4e8f-8067-b8dcf2af7c0b" Revision="4" Stencil="System.MyShapes" StencilVersion="1.0"/>
+</Control>
+</file>
+
+<file path=customXml/item7.xml><?xml version="1.0" encoding="utf-8"?>
+<Control xmlns="http://schemas.microsoft.com/VisualStudio/2011/storyboarding/control">
+  <Id Name="06847451-0bea-4bb1-ad11-52311f8931c4" Revision="1" Stencil="System.MyShapes" StencilVersion="1.0"/>
+</Control>
+</file>
+
+<file path=customXml/item70.xml><?xml version="1.0" encoding="utf-8"?>
+<Control xmlns="http://schemas.microsoft.com/VisualStudio/2011/storyboarding/control">
+  <Id Name="System.Storyboarding.WindowsPhoneIcons.Add" Revision="1" Stencil="System.Storyboarding.WindowsPhoneIcons" StencilVersion="0.1"/>
+</Control>
+</file>
+
+<file path=customXml/item71.xml><?xml version="1.0" encoding="utf-8"?>
+<Control xmlns="http://schemas.microsoft.com/VisualStudio/2011/storyboarding/control">
+  <Id Name="ff64700b-c289-4a2d-96f8-d311265dd998" Revision="1" Stencil="System.MyShapes" StencilVersion="1.0"/>
+</Control>
+</file>
+
+<file path=customXml/item72.xml><?xml version="1.0" encoding="utf-8"?>
+<Control xmlns="http://schemas.microsoft.com/VisualStudio/2011/storyboarding/control">
+  <Id Name="a81ff87b-4b1c-4e99-a585-96ecfb9f65b8" Revision="1" Stencil="System.MyShapes" StencilVersion="1.0"/>
+</Control>
+</file>
+
+<file path=customXml/item73.xml><?xml version="1.0" encoding="utf-8"?>
 <Control xmlns="http://schemas.microsoft.com/VisualStudio/2011/storyboarding/control">
   <Id Name="94a64934-5db3-47cf-96df-f3eb1ee28c2b" Revision="1" Stencil="System.MyShapes" StencilVersion="1.0"/>
 </Control>
 </file>
 
-<file path=customXml/item37.xml><?xml version="1.0" encoding="utf-8"?>
-<Control xmlns="http://schemas.microsoft.com/VisualStudio/2011/storyboarding/control">
-  <Id Name="9558e425-a15a-4a2a-8c7d-369dc6767849" Revision="1" Stencil="09ee8e29-8a48-4e3d-a569-7c1ba11c2e3d" StencilVersion="1.0"/>
-</Control>
-</file>
-
-<file path=customXml/item38.xml><?xml version="1.0" encoding="utf-8"?>
-<Control xmlns="http://schemas.microsoft.com/VisualStudio/2011/storyboarding/control">
-  <Id Name="461b790a-5c61-4d93-8e5b-5f34a6182b85" Revision="3" Stencil="System.MyShapes" StencilVersion="1.0"/>
-</Control>
-</file>
-
-<file path=customXml/item39.xml><?xml version="1.0" encoding="utf-8"?>
-<Control xmlns="http://schemas.microsoft.com/VisualStudio/2011/storyboarding/control">
-  <Id Name="b498fdc2-67f2-4de5-899f-26683373e8ad" Revision="1" Stencil="System.MyShapes" StencilVersion="1.0"/>
-</Control>
-</file>
-
-<file path=customXml/item4.xml><?xml version="1.0" encoding="utf-8"?>
-<Control xmlns="http://schemas.microsoft.com/VisualStudio/2011/storyboarding/control">
-  <Id Name="System.Storyboarding.Common.Button" Revision="1" Stencil="System.Storyboarding.Common" StencilVersion="0.1"/>
-</Control>
-</file>
-
-<file path=customXml/item40.xml><?xml version="1.0" encoding="utf-8"?>
-<Control xmlns="http://schemas.microsoft.com/VisualStudio/2011/storyboarding/control">
-  <Id Name="e86b6df1-c5a7-46e8-b789-cae60d6c7d17" Revision="1" Stencil="System.MyShapes" StencilVersion="1.0"/>
-</Control>
-</file>
-
-<file path=customXml/item41.xml><?xml version="1.0" encoding="utf-8"?>
-<Control xmlns="http://schemas.microsoft.com/VisualStudio/2011/storyboarding/control">
-  <Id Name="f685762a-9f2c-4532-bec3-d9959b980ef9" Revision="1" Stencil="85a07843-b809-41ee-b566-325b1850150a" StencilVersion="1.0"/>
-</Control>
-</file>
-
-<file path=customXml/item42.xml><?xml version="1.0" encoding="utf-8"?>
-<Control xmlns="http://schemas.microsoft.com/VisualStudio/2011/storyboarding/control">
-  <Id Name="ff64700b-c289-4a2d-96f8-d311265dd998" Revision="2" Stencil="System.MyShapes" StencilVersion="1.0"/>
-</Control>
-</file>
-
-<file path=customXml/item43.xml><?xml version="1.0" encoding="utf-8"?>
-<Control xmlns="http://schemas.microsoft.com/VisualStudio/2011/storyboarding/control">
-  <Id Name="System.Storyboarding.Common.Text" Revision="1" Stencil="System.Storyboarding.Common" StencilVersion="0.1"/>
-</Control>
-</file>
-
-<file path=customXml/item44.xml><?xml version="1.0" encoding="utf-8"?>
-<Control xmlns="http://schemas.microsoft.com/VisualStudio/2011/storyboarding/control">
-  <Id Name="38644b22-1525-488b-b218-0f27ea6cb84d" Revision="1" Stencil="System.MyShapes" StencilVersion="1.0"/>
-</Control>
-</file>
-
-<file path=customXml/item45.xml><?xml version="1.0" encoding="utf-8"?>
-<Control xmlns="http://schemas.microsoft.com/VisualStudio/2011/storyboarding/control">
-  <Id Name="add342ac-430c-4877-8f87-437e216caf6b" Revision="1" Stencil="System.MyShapes" StencilVersion="1.0"/>
-</Control>
-</file>
-
-<file path=customXml/item46.xml><?xml version="1.0" encoding="utf-8"?>
-<Control xmlns="http://schemas.microsoft.com/VisualStudio/2011/storyboarding/control">
-  <Id Name="f685762a-9f2c-4532-bec3-d9959b980ef9" Revision="1" Stencil="85a07843-b809-41ee-b566-325b1850150a" StencilVersion="1.0"/>
-</Control>
-</file>
-
-<file path=customXml/item47.xml><?xml version="1.0" encoding="utf-8"?>
-<Control xmlns="http://schemas.microsoft.com/VisualStudio/2011/storyboarding/control">
-  <Id Name="94a64934-5db3-47cf-96df-f3eb1ee28c2b" Revision="1" Stencil="System.MyShapes" StencilVersion="1.0"/>
-</Control>
-</file>
-
-<file path=customXml/item48.xml><?xml version="1.0" encoding="utf-8"?>
-<Control xmlns="http://schemas.microsoft.com/VisualStudio/2011/storyboarding/control">
-  <Id Name="System.Storyboarding.WindowsAppIcons.Plus" Revision="1" Stencil="System.Storyboarding.WindowsAppIcons" StencilVersion="0.1"/>
-</Control>
-</file>
-
-<file path=customXml/item49.xml><?xml version="1.0" encoding="utf-8"?>
-<Control xmlns="http://schemas.microsoft.com/VisualStudio/2011/storyboarding/control">
-  <Id Name="aa7caf86-934b-4e25-b308-65b6ffb256da" Revision="4" Stencil="System.MyShapes" StencilVersion="1.0"/>
-</Control>
-</file>
-
-<file path=customXml/item5.xml><?xml version="1.0" encoding="utf-8"?>
-<Control xmlns="http://schemas.microsoft.com/VisualStudio/2011/storyboarding/control">
-  <Id Name="1f092a44-b74f-4007-bdae-1c8fc6646a9d" Revision="1" Stencil="System.MyShapes" StencilVersion="1.0"/>
-</Control>
-</file>
-
-<file path=customXml/item50.xml><?xml version="1.0" encoding="utf-8"?>
-<Control xmlns="http://schemas.microsoft.com/VisualStudio/2011/storyboarding/control">
-  <Id Name="e86b6df1-c5a7-46e8-b789-cae60d6c7d17" Revision="1" Stencil="System.MyShapes" StencilVersion="1.0"/>
-</Control>
-</file>
-
-<file path=customXml/item51.xml><?xml version="1.0" encoding="utf-8"?>
-<Control xmlns="http://schemas.microsoft.com/VisualStudio/2011/storyboarding/control">
-  <Id Name="45617f0c-a378-4d86-8073-87fd3c9eb064" Revision="1" Stencil="System.MyShapes" StencilVersion="1.0"/>
-</Control>
-</file>
-
-<file path=customXml/item52.xml><?xml version="1.0" encoding="utf-8"?>
-<Control xmlns="http://schemas.microsoft.com/VisualStudio/2011/storyboarding/control">
-  <Id Name="ddd70b22-80c2-4e8f-8067-b8dcf2af7c0b" Revision="4" Stencil="System.MyShapes" StencilVersion="1.0"/>
-</Control>
-</file>
-
-<file path=customXml/item53.xml><?xml version="1.0" encoding="utf-8"?>
+<file path=customXml/item74.xml><?xml version="1.0" encoding="utf-8"?>
 <Control xmlns="http://schemas.microsoft.com/VisualStudio/2011/storyboarding/control">
   <Id Name="4837c2c1-9271-4636-b45d-293fac782f46" Revision="1" Stencil="System.MyShapes" StencilVersion="1.0"/>
 </Control>
 </file>
 
-<file path=customXml/item54.xml><?xml version="1.0" encoding="utf-8"?>
-<Control xmlns="http://schemas.microsoft.com/VisualStudio/2011/storyboarding/control">
-  <Id Name="4837c2c1-9271-4636-b45d-293fac782f46" Revision="1" Stencil="System.MyShapes" StencilVersion="1.0"/>
-</Control>
-</file>
-
-<file path=customXml/item55.xml><?xml version="1.0" encoding="utf-8"?>
-<Control xmlns="http://schemas.microsoft.com/VisualStudio/2011/storyboarding/control">
-  <Id Name="System.Storyboarding.WindowsApps.WindowsAppsTileMediumText" Revision="1" Stencil="System.Storyboarding.WindowsApps" StencilVersion="0.1"/>
-</Control>
-</file>
-
-<file path=customXml/item56.xml><?xml version="1.0" encoding="utf-8"?>
-<Control xmlns="http://schemas.microsoft.com/VisualStudio/2011/storyboarding/control">
-  <Id Name="e80f86ae-996a-42c4-b08b-54613c6824e2" Revision="1" Stencil="85a07843-b809-41ee-b566-325b1850150a" StencilVersion="1.0"/>
-</Control>
-</file>
-
-<file path=customXml/item57.xml><?xml version="1.0" encoding="utf-8"?>
-<Control xmlns="http://schemas.microsoft.com/VisualStudio/2011/storyboarding/control">
-  <Id Name="6ddb99ab-d8e2-461f-b3a0-8c3903bf34a7" Revision="1" Stencil="System.MyShapes" StencilVersion="1.0"/>
-</Control>
-</file>
-
-<file path=customXml/item58.xml><?xml version="1.0" encoding="utf-8"?>
-<Control xmlns="http://schemas.microsoft.com/VisualStudio/2011/storyboarding/control">
-  <Id Name="8e7bc36a-eab6-47ca-abb8-86f7bf9f67c9" Revision="3" Stencil="System.MyShapes" StencilVersion="1.0"/>
-</Control>
-</file>
-
-<file path=customXml/item59.xml><?xml version="1.0" encoding="utf-8"?>
-<Control xmlns="http://schemas.microsoft.com/VisualStudio/2011/storyboarding/control">
-  <Id Name="System.Storyboarding.Common.Text" Revision="1" Stencil="System.Storyboarding.Common" StencilVersion="0.1"/>
-</Control>
-</file>
-
-<file path=customXml/item6.xml><?xml version="1.0" encoding="utf-8"?>
-<Control xmlns="http://schemas.microsoft.com/VisualStudio/2011/storyboarding/control">
-  <Id Name="1f092a44-b74f-4007-bdae-1c8fc6646a9d" Revision="1" Stencil="System.MyShapes" StencilVersion="1.0"/>
-</Control>
-</file>
-
-<file path=customXml/item60.xml><?xml version="1.0" encoding="utf-8"?>
-<Control xmlns="http://schemas.microsoft.com/VisualStudio/2011/storyboarding/control">
-  <Id Name="System.Storyboarding.WindowsPhoneIcons.Add" Revision="1" Stencil="System.Storyboarding.WindowsPhoneIcons" StencilVersion="0.1"/>
-</Control>
-</file>
-
-<file path=customXml/item61.xml><?xml version="1.0" encoding="utf-8"?>
-<Control xmlns="http://schemas.microsoft.com/VisualStudio/2011/storyboarding/control">
-  <Id Name="9d49edfc-cd80-4200-a8a3-34a19b2cba5d" Revision="1" Stencil="System.MyShapes" StencilVersion="1.0"/>
-</Control>
-</file>
-
-<file path=customXml/item62.xml><?xml version="1.0" encoding="utf-8"?>
-<Control xmlns="http://schemas.microsoft.com/VisualStudio/2011/storyboarding/control">
-  <Id Name="94a64934-5db3-47cf-96df-f3eb1ee28c2b" Revision="1" Stencil="System.MyShapes" StencilVersion="1.0"/>
-</Control>
-</file>
-
-<file path=customXml/item63.xml><?xml version="1.0" encoding="utf-8"?>
-<Control xmlns="http://schemas.microsoft.com/VisualStudio/2011/storyboarding/control">
-  <Id Name="a81ff87b-4b1c-4e99-a585-96ecfb9f65b8" Revision="1" Stencil="System.MyShapes" StencilVersion="1.0"/>
-</Control>
-</file>
-
-<file path=customXml/item64.xml><?xml version="1.0" encoding="utf-8"?>
-<Control xmlns="http://schemas.microsoft.com/VisualStudio/2011/storyboarding/control">
-  <Id Name="8b305ae9-bdb0-4402-94ff-04df21bd0964" Revision="1" Stencil="System.MyShapes" StencilVersion="1.0"/>
-</Control>
-</file>
-
-<file path=customXml/item65.xml><?xml version="1.0" encoding="utf-8"?>
-<Control xmlns="http://schemas.microsoft.com/VisualStudio/2011/storyboarding/control">
-  <Id Name="ff64700b-c289-4a2d-96f8-d311265dd998" Revision="1" Stencil="System.MyShapes" StencilVersion="1.0"/>
-</Control>
-</file>
-
-<file path=customXml/item66.xml><?xml version="1.0" encoding="utf-8"?>
-<Control xmlns="http://schemas.microsoft.com/VisualStudio/2011/storyboarding/control">
-  <Id Name="4837c2c1-9271-4636-b45d-293fac782f46" Revision="1" Stencil="System.MyShapes" StencilVersion="1.0"/>
-</Control>
-</file>
-
-<file path=customXml/item67.xml><?xml version="1.0" encoding="utf-8"?>
-<Control xmlns="http://schemas.microsoft.com/VisualStudio/2011/storyboarding/control">
-  <Id Name="b498fdc2-67f2-4de5-899f-26683373e8ad" Revision="1" Stencil="System.MyShapes" StencilVersion="1.0"/>
-</Control>
-</file>
-
-<file path=customXml/item68.xml><?xml version="1.0" encoding="utf-8"?>
-<Control xmlns="http://schemas.microsoft.com/VisualStudio/2011/storyboarding/control">
-  <Id Name="System.Storyboarding.Common.DropdownBox" Revision="1" Stencil="System.Storyboarding.Common" StencilVersion="0.1"/>
-</Control>
-</file>
-
-<file path=customXml/item69.xml><?xml version="1.0" encoding="utf-8"?>
-<Control xmlns="http://schemas.microsoft.com/VisualStudio/2011/storyboarding/control">
-  <Id Name="System.Storyboarding.Common.DropdownBox" Revision="1" Stencil="System.Storyboarding.Common" StencilVersion="0.1"/>
-</Control>
-</file>
-
-<file path=customXml/item7.xml><?xml version="1.0" encoding="utf-8"?>
-<Control xmlns="http://schemas.microsoft.com/VisualStudio/2011/storyboarding/control">
-  <Id Name="System.Storyboarding.Common.Text" Revision="1" Stencil="System.Storyboarding.Common" StencilVersion="0.1"/>
-</Control>
-</file>
-
-<file path=customXml/item70.xml><?xml version="1.0" encoding="utf-8"?>
-<Control xmlns="http://schemas.microsoft.com/VisualStudio/2011/storyboarding/control">
-  <Id Name="c2eea951-2796-40b7-81ae-47cd14fa6407" Revision="1" Stencil="System.MyShapes" StencilVersion="1.0"/>
-</Control>
-</file>
-
-<file path=customXml/item71.xml><?xml version="1.0" encoding="utf-8"?>
-<Control xmlns="http://schemas.microsoft.com/VisualStudio/2011/storyboarding/control">
-  <Id Name="System.Storyboarding.Common.MouseClick" Revision="1" Stencil="System.Storyboarding.Common" StencilVersion="0.1"/>
-</Control>
-</file>
-
-<file path=customXml/item72.xml><?xml version="1.0" encoding="utf-8"?>
-<Control xmlns="http://schemas.microsoft.com/VisualStudio/2011/storyboarding/control">
-  <Id Name="System.Storyboarding.Common.MouseClick" Revision="1" Stencil="System.Storyboarding.Common" StencilVersion="0.1"/>
-</Control>
-</file>
-
-<file path=customXml/item73.xml><?xml version="1.0" encoding="utf-8"?>
-<Control xmlns="http://schemas.microsoft.com/VisualStudio/2011/storyboarding/control">
-  <Id Name="a81ff87b-4b1c-4e99-a585-96ecfb9f65b8" Revision="1" Stencil="System.MyShapes" StencilVersion="1.0"/>
-</Control>
-</file>
-
-<file path=customXml/item74.xml><?xml version="1.0" encoding="utf-8"?>
-<Control xmlns="http://schemas.microsoft.com/VisualStudio/2011/storyboarding/control">
-  <Id Name="10b0aa5a-d420-45da-bed6-67d74a2c246d" Revision="1" Stencil="System.MyShapes" StencilVersion="1.0"/>
-</Control>
-</file>
-
 <file path=customXml/item75.xml><?xml version="1.0" encoding="utf-8"?>
 <Control xmlns="http://schemas.microsoft.com/VisualStudio/2011/storyboarding/control">
-  <Id Name="94a64934-5db3-47cf-96df-f3eb1ee28c2b" Revision="1" Stencil="System.MyShapes" StencilVersion="1.0"/>
+  <Id Name="9f80fa0c-f36e-418c-a39b-dc57c3a44c08" Revision="2" Stencil="System.MyShapes" StencilVersion="1.0"/>
 </Control>
 </file>
 
 <file path=customXml/item76.xml><?xml version="1.0" encoding="utf-8"?>
 <Control xmlns="http://schemas.microsoft.com/VisualStudio/2011/storyboarding/control">
-  <Id Name="b498fdc2-67f2-4de5-899f-26683373e8ad" Revision="1" Stencil="System.MyShapes" StencilVersion="1.0"/>
+  <Id Name="System.Storyboarding.Common.Button" Revision="1" Stencil="System.Storyboarding.Common" StencilVersion="0.1"/>
 </Control>
 </file>
 
@@ -9748,90 +9748,90 @@
 
 <file path=customXml/item78.xml><?xml version="1.0" encoding="utf-8"?>
 <Control xmlns="http://schemas.microsoft.com/VisualStudio/2011/storyboarding/control">
-  <Id Name="94a64934-5db3-47cf-96df-f3eb1ee28c2b" Revision="1" Stencil="System.MyShapes" StencilVersion="1.0"/>
+  <Id Name="555e62f6-1a9c-4a1c-b658-df5e97a4e85c" Revision="1" Stencil="System.MyShapes" StencilVersion="1.0"/>
 </Control>
 </file>
 
 <file path=customXml/item79.xml><?xml version="1.0" encoding="utf-8"?>
+<Control xmlns="http://schemas.microsoft.com/VisualStudio/2011/storyboarding/control">
+  <Id Name="06847451-0bea-4bb1-ad11-52311f8931c4" Revision="1" Stencil="System.MyShapes" StencilVersion="1.0"/>
+</Control>
+</file>
+
+<file path=customXml/item8.xml><?xml version="1.0" encoding="utf-8"?>
+<Control xmlns="http://schemas.microsoft.com/VisualStudio/2011/storyboarding/control">
+  <Id Name="b498fdc2-67f2-4de5-899f-26683373e8ad" Revision="1" Stencil="System.MyShapes" StencilVersion="1.0"/>
+</Control>
+</file>
+
+<file path=customXml/item80.xml><?xml version="1.0" encoding="utf-8"?>
+<Control xmlns="http://schemas.microsoft.com/VisualStudio/2011/storyboarding/control">
+  <Id Name="b498fdc2-67f2-4de5-899f-26683373e8ad" Revision="1" Stencil="System.MyShapes" StencilVersion="1.0"/>
+</Control>
+</file>
+
+<file path=customXml/item81.xml><?xml version="1.0" encoding="utf-8"?>
+<Control xmlns="http://schemas.microsoft.com/VisualStudio/2011/storyboarding/control">
+  <Id Name="3af3c69d-e93c-4e90-95f5-13afa1a89449" Revision="1" Stencil="85a07843-b809-41ee-b566-325b1850150a" StencilVersion="1.0"/>
+</Control>
+</file>
+
+<file path=customXml/item82.xml><?xml version="1.0" encoding="utf-8"?>
 <Control xmlns="http://schemas.microsoft.com/VisualStudio/2011/storyboarding/control">
   <Id Name="4837c2c1-9271-4636-b45d-293fac782f46" Revision="1" Stencil="System.MyShapes" StencilVersion="1.0"/>
 </Control>
 </file>
 
-<file path=customXml/item8.xml><?xml version="1.0" encoding="utf-8"?>
-<Control xmlns="http://schemas.microsoft.com/VisualStudio/2011/storyboarding/control">
-  <Id Name="153824eb-93cd-41fb-aad3-7d03f88f47af" Revision="1" Stencil="System.MyShapes" StencilVersion="1.0"/>
-</Control>
-</file>
-
-<file path=customXml/item80.xml><?xml version="1.0" encoding="utf-8"?>
-<Control xmlns="http://schemas.microsoft.com/VisualStudio/2011/storyboarding/control">
-  <Id Name="4837c2c1-9271-4636-b45d-293fac782f46" Revision="1" Stencil="System.MyShapes" StencilVersion="1.0"/>
-</Control>
-</file>
-
-<file path=customXml/item81.xml><?xml version="1.0" encoding="utf-8"?>
-<Control xmlns="http://schemas.microsoft.com/VisualStudio/2011/storyboarding/control">
-  <Id Name="4837c2c1-9271-4636-b45d-293fac782f46" Revision="1" Stencil="System.MyShapes" StencilVersion="1.0"/>
-</Control>
-</file>
-
-<file path=customXml/item82.xml><?xml version="1.0" encoding="utf-8"?>
-<Control xmlns="http://schemas.microsoft.com/VisualStudio/2011/storyboarding/control">
-  <Id Name="b498fdc2-67f2-4de5-899f-26683373e8ad" Revision="1" Stencil="System.MyShapes" StencilVersion="1.0"/>
-</Control>
-</file>
-
 <file path=customXml/item83.xml><?xml version="1.0" encoding="utf-8"?>
 <Control xmlns="http://schemas.microsoft.com/VisualStudio/2011/storyboarding/control">
-  <Id Name="9f80fa0c-f36e-418c-a39b-dc57c3a44c08" Revision="2" Stencil="System.MyShapes" StencilVersion="1.0"/>
+  <Id Name="6ddb99ab-d8e2-461f-b3a0-8c3903bf34a7" Revision="1" Stencil="System.MyShapes" StencilVersion="1.0"/>
 </Control>
 </file>
 
 <file path=customXml/item84.xml><?xml version="1.0" encoding="utf-8"?>
 <Control xmlns="http://schemas.microsoft.com/VisualStudio/2011/storyboarding/control">
-  <Id Name="4837c2c1-9271-4636-b45d-293fac782f46" Revision="1" Stencil="System.MyShapes" StencilVersion="1.0"/>
+  <Id Name="ff64700b-c289-4a2d-96f8-d311265dd998" Revision="2" Stencil="System.MyShapes" StencilVersion="1.0"/>
 </Control>
 </file>
 
 <file path=customXml/item85.xml><?xml version="1.0" encoding="utf-8"?>
 <Control xmlns="http://schemas.microsoft.com/VisualStudio/2011/storyboarding/control">
-  <Id Name="b498fdc2-67f2-4de5-899f-26683373e8ad" Revision="1" Stencil="System.MyShapes" StencilVersion="1.0"/>
+  <Id Name="94a64934-5db3-47cf-96df-f3eb1ee28c2b" Revision="1" Stencil="System.MyShapes" StencilVersion="1.0"/>
 </Control>
 </file>
 
 <file path=customXml/item86.xml><?xml version="1.0" encoding="utf-8"?>
 <Control xmlns="http://schemas.microsoft.com/VisualStudio/2011/storyboarding/control">
-  <Id Name="9f80fa0c-f36e-418c-a39b-dc57c3a44c08" Revision="2" Stencil="System.MyShapes" StencilVersion="1.0"/>
+  <Id Name="e86b6df1-c5a7-46e8-b789-cae60d6c7d17" Revision="1" Stencil="System.MyShapes" StencilVersion="1.0"/>
 </Control>
 </file>
 
 <file path=customXml/item87.xml><?xml version="1.0" encoding="utf-8"?>
 <Control xmlns="http://schemas.microsoft.com/VisualStudio/2011/storyboarding/control">
-  <Id Name="System.Storyboarding.Common.DatePicker" Revision="1" Stencil="System.Storyboarding.Common" StencilVersion="0.1"/>
+  <Id Name="System.Storyboarding.WindowsApps.WindowsAppsTileMediumText" Revision="1" Stencil="System.Storyboarding.WindowsApps" StencilVersion="0.1"/>
 </Control>
 </file>
 
 <file path=customXml/item88.xml><?xml version="1.0" encoding="utf-8"?>
 <Control xmlns="http://schemas.microsoft.com/VisualStudio/2011/storyboarding/control">
-  <Id Name="System.Storyboarding.Common.DatePicker" Revision="1" Stencil="System.Storyboarding.Common" StencilVersion="0.1"/>
+  <Id Name="a81ff87b-4b1c-4e99-a585-96ecfb9f65b8" Revision="1" Stencil="System.MyShapes" StencilVersion="1.0"/>
 </Control>
 </file>
 
 <file path=customXml/item89.xml><?xml version="1.0" encoding="utf-8"?>
 <Control xmlns="http://schemas.microsoft.com/VisualStudio/2011/storyboarding/control">
-  <Id Name="44831f5f-40f2-4def-a193-92e5a2072f0a" Revision="1" Stencil="System.MyShapes" StencilVersion="1.0"/>
+  <Id Name="System.Storyboarding.Common.DropdownBox" Revision="1" Stencil="System.Storyboarding.Common" StencilVersion="0.1"/>
 </Control>
 </file>
 
 <file path=customXml/item9.xml><?xml version="1.0" encoding="utf-8"?>
 <Control xmlns="http://schemas.microsoft.com/VisualStudio/2011/storyboarding/control">
-  <Id Name="10b0aa5a-d420-45da-bed6-67d74a2c246d" Revision="1" Stencil="System.MyShapes" StencilVersion="1.0"/>
+  <Id Name="3af3c69d-e93c-4e90-95f5-13afa1a89449" Revision="1" Stencil="85a07843-b809-41ee-b566-325b1850150a" StencilVersion="1.0"/>
 </Control>
 </file>
 
 <file path=customXml/itemProps1.xml><?xml version="1.0" encoding="utf-8"?>
-<ds:datastoreItem xmlns:ds="http://schemas.openxmlformats.org/officeDocument/2006/customXml" ds:itemID="{EB537FFA-BDFE-4B5C-A7BF-B70BEBF50B70}">
+<ds:datastoreItem xmlns:ds="http://schemas.openxmlformats.org/officeDocument/2006/customXml" ds:itemID="{5E15C4C1-7DC4-400D-83E2-CC75065C5F26}">
   <ds:schemaRefs>
     <ds:schemaRef ds:uri="http://schemas.microsoft.com/VisualStudio/2011/storyboarding/control"/>
   </ds:schemaRefs>
@@ -9839,7 +9839,7 @@
 </file>
 
 <file path=customXml/itemProps10.xml><?xml version="1.0" encoding="utf-8"?>
-<ds:datastoreItem xmlns:ds="http://schemas.openxmlformats.org/officeDocument/2006/customXml" ds:itemID="{A4C33EEA-7075-4651-97E3-4829E38E21EA}">
+<ds:datastoreItem xmlns:ds="http://schemas.openxmlformats.org/officeDocument/2006/customXml" ds:itemID="{2518A20E-034B-4E42-B0C9-3D8089CEF578}">
   <ds:schemaRefs>
     <ds:schemaRef ds:uri="http://schemas.microsoft.com/VisualStudio/2011/storyboarding/control"/>
   </ds:schemaRefs>
@@ -9847,7 +9847,7 @@
 </file>
 
 <file path=customXml/itemProps11.xml><?xml version="1.0" encoding="utf-8"?>
-<ds:datastoreItem xmlns:ds="http://schemas.openxmlformats.org/officeDocument/2006/customXml" ds:itemID="{76F1EE43-31A0-4919-A618-DFAA86460D6E}">
+<ds:datastoreItem xmlns:ds="http://schemas.openxmlformats.org/officeDocument/2006/customXml" ds:itemID="{C88BAED0-EFF4-4013-BA7C-6AA8222DBFDF}">
   <ds:schemaRefs>
     <ds:schemaRef ds:uri="http://schemas.microsoft.com/VisualStudio/2011/storyboarding/control"/>
   </ds:schemaRefs>
@@ -9855,7 +9855,7 @@
 </file>
 
 <file path=customXml/itemProps12.xml><?xml version="1.0" encoding="utf-8"?>
-<ds:datastoreItem xmlns:ds="http://schemas.openxmlformats.org/officeDocument/2006/customXml" ds:itemID="{E838889A-C741-48DA-8FAC-50ADAD37F748}">
+<ds:datastoreItem xmlns:ds="http://schemas.openxmlformats.org/officeDocument/2006/customXml" ds:itemID="{CCBA0FAD-D47F-4053-BB7A-FCDAF4A83483}">
   <ds:schemaRefs>
     <ds:schemaRef ds:uri="http://schemas.microsoft.com/VisualStudio/2011/storyboarding/control"/>
   </ds:schemaRefs>
@@ -9863,7 +9863,7 @@
 </file>
 
 <file path=customXml/itemProps13.xml><?xml version="1.0" encoding="utf-8"?>
-<ds:datastoreItem xmlns:ds="http://schemas.openxmlformats.org/officeDocument/2006/customXml" ds:itemID="{7FC1ACFC-5903-4315-BB83-531181E20214}">
+<ds:datastoreItem xmlns:ds="http://schemas.openxmlformats.org/officeDocument/2006/customXml" ds:itemID="{17887D8F-4CC8-4617-868E-91CB574B7BF1}">
   <ds:schemaRefs>
     <ds:schemaRef ds:uri="http://schemas.microsoft.com/VisualStudio/2011/storyboarding/control"/>
   </ds:schemaRefs>
@@ -9871,6 +9871,102 @@
 </file>
 
 <file path=customXml/itemProps14.xml><?xml version="1.0" encoding="utf-8"?>
+<ds:datastoreItem xmlns:ds="http://schemas.openxmlformats.org/officeDocument/2006/customXml" ds:itemID="{79342CAB-26BD-42C7-97B2-7342A28343AE}">
+  <ds:schemaRefs>
+    <ds:schemaRef ds:uri="http://schemas.microsoft.com/VisualStudio/2011/storyboarding/control"/>
+  </ds:schemaRefs>
+</ds:datastoreItem>
+</file>
+
+<file path=customXml/itemProps15.xml><?xml version="1.0" encoding="utf-8"?>
+<ds:datastoreItem xmlns:ds="http://schemas.openxmlformats.org/officeDocument/2006/customXml" ds:itemID="{ECD73F77-92DD-4C21-92E5-429F75002F17}">
+  <ds:schemaRefs>
+    <ds:schemaRef ds:uri="http://schemas.microsoft.com/VisualStudio/2011/storyboarding/control"/>
+  </ds:schemaRefs>
+</ds:datastoreItem>
+</file>
+
+<file path=customXml/itemProps16.xml><?xml version="1.0" encoding="utf-8"?>
+<ds:datastoreItem xmlns:ds="http://schemas.openxmlformats.org/officeDocument/2006/customXml" ds:itemID="{33F9240B-A1F1-4890-B5C1-DCFF5A6318AE}">
+  <ds:schemaRefs>
+    <ds:schemaRef ds:uri="http://schemas.microsoft.com/VisualStudio/2011/storyboarding/control"/>
+  </ds:schemaRefs>
+</ds:datastoreItem>
+</file>
+
+<file path=customXml/itemProps17.xml><?xml version="1.0" encoding="utf-8"?>
+<ds:datastoreItem xmlns:ds="http://schemas.openxmlformats.org/officeDocument/2006/customXml" ds:itemID="{4A64E2AC-D62A-494C-B40F-614637EDA4BC}">
+  <ds:schemaRefs>
+    <ds:schemaRef ds:uri="http://schemas.microsoft.com/VisualStudio/2011/storyboarding/control"/>
+  </ds:schemaRefs>
+</ds:datastoreItem>
+</file>
+
+<file path=customXml/itemProps18.xml><?xml version="1.0" encoding="utf-8"?>
+<ds:datastoreItem xmlns:ds="http://schemas.openxmlformats.org/officeDocument/2006/customXml" ds:itemID="{0A823B61-779C-4D48-8EA7-4CF7BA23E8BD}">
+  <ds:schemaRefs>
+    <ds:schemaRef ds:uri="http://schemas.microsoft.com/VisualStudio/2011/storyboarding/control"/>
+  </ds:schemaRefs>
+</ds:datastoreItem>
+</file>
+
+<file path=customXml/itemProps19.xml><?xml version="1.0" encoding="utf-8"?>
+<ds:datastoreItem xmlns:ds="http://schemas.openxmlformats.org/officeDocument/2006/customXml" ds:itemID="{2C0761D8-5FCB-4134-8B9E-19569EB02B32}">
+  <ds:schemaRefs>
+    <ds:schemaRef ds:uri="http://schemas.microsoft.com/VisualStudio/2011/storyboarding/control"/>
+  </ds:schemaRefs>
+</ds:datastoreItem>
+</file>
+
+<file path=customXml/itemProps2.xml><?xml version="1.0" encoding="utf-8"?>
+<ds:datastoreItem xmlns:ds="http://schemas.openxmlformats.org/officeDocument/2006/customXml" ds:itemID="{59D0772F-AC15-494E-909A-5BCC245ABAE9}">
+  <ds:schemaRefs>
+    <ds:schemaRef ds:uri="http://schemas.microsoft.com/VisualStudio/2011/storyboarding/control"/>
+  </ds:schemaRefs>
+</ds:datastoreItem>
+</file>
+
+<file path=customXml/itemProps20.xml><?xml version="1.0" encoding="utf-8"?>
+<ds:datastoreItem xmlns:ds="http://schemas.openxmlformats.org/officeDocument/2006/customXml" ds:itemID="{61A4FFB8-8D16-40C7-B4D8-66678F0EE78F}">
+  <ds:schemaRefs>
+    <ds:schemaRef ds:uri="http://schemas.microsoft.com/VisualStudio/2011/storyboarding/control"/>
+  </ds:schemaRefs>
+</ds:datastoreItem>
+</file>
+
+<file path=customXml/itemProps21.xml><?xml version="1.0" encoding="utf-8"?>
+<ds:datastoreItem xmlns:ds="http://schemas.openxmlformats.org/officeDocument/2006/customXml" ds:itemID="{328B6E1D-0753-426C-BAEA-4AAB939DA580}">
+  <ds:schemaRefs>
+    <ds:schemaRef ds:uri="http://schemas.microsoft.com/VisualStudio/2011/storyboarding/control"/>
+  </ds:schemaRefs>
+</ds:datastoreItem>
+</file>
+
+<file path=customXml/itemProps22.xml><?xml version="1.0" encoding="utf-8"?>
+<ds:datastoreItem xmlns:ds="http://schemas.openxmlformats.org/officeDocument/2006/customXml" ds:itemID="{19BFF073-C4AE-48BB-B931-137F09A448CB}">
+  <ds:schemaRefs>
+    <ds:schemaRef ds:uri="http://schemas.microsoft.com/VisualStudio/2011/storyboarding/control"/>
+  </ds:schemaRefs>
+</ds:datastoreItem>
+</file>
+
+<file path=customXml/itemProps23.xml><?xml version="1.0" encoding="utf-8"?>
+<ds:datastoreItem xmlns:ds="http://schemas.openxmlformats.org/officeDocument/2006/customXml" ds:itemID="{C319B4A2-3D63-4983-B472-838D460D4499}">
+  <ds:schemaRefs>
+    <ds:schemaRef ds:uri="http://schemas.microsoft.com/VisualStudio/2011/storyboarding/control"/>
+  </ds:schemaRefs>
+</ds:datastoreItem>
+</file>
+
+<file path=customXml/itemProps24.xml><?xml version="1.0" encoding="utf-8"?>
+<ds:datastoreItem xmlns:ds="http://schemas.openxmlformats.org/officeDocument/2006/customXml" ds:itemID="{1DD2346F-B9C4-4399-ABD4-BA9740D9BD88}">
+  <ds:schemaRefs>
+    <ds:schemaRef ds:uri="http://schemas.microsoft.com/VisualStudio/2011/storyboarding/control"/>
+  </ds:schemaRefs>
+</ds:datastoreItem>
+</file>
+
+<file path=customXml/itemProps25.xml><?xml version="1.0" encoding="utf-8"?>
 <ds:datastoreItem xmlns:ds="http://schemas.openxmlformats.org/officeDocument/2006/customXml" ds:itemID="{C4E818A4-7FE2-4B84-AEA0-A9F6FB50C5C3}">
   <ds:schemaRefs>
     <ds:schemaRef ds:uri="http://schemas.microsoft.com/VisualStudio/2011/storyboarding/control"/>
@@ -9878,104 +9974,8 @@
 </ds:datastoreItem>
 </file>
 
-<file path=customXml/itemProps15.xml><?xml version="1.0" encoding="utf-8"?>
-<ds:datastoreItem xmlns:ds="http://schemas.openxmlformats.org/officeDocument/2006/customXml" ds:itemID="{9E6F7571-4EBE-4180-B628-CCE77B77DF89}">
-  <ds:schemaRefs>
-    <ds:schemaRef ds:uri="http://schemas.microsoft.com/VisualStudio/2011/storyboarding/control"/>
-  </ds:schemaRefs>
-</ds:datastoreItem>
-</file>
-
-<file path=customXml/itemProps16.xml><?xml version="1.0" encoding="utf-8"?>
-<ds:datastoreItem xmlns:ds="http://schemas.openxmlformats.org/officeDocument/2006/customXml" ds:itemID="{0ECA24E0-E199-4F3E-B649-D315A016E4DD}">
-  <ds:schemaRefs>
-    <ds:schemaRef ds:uri="http://schemas.microsoft.com/VisualStudio/2011/storyboarding/control"/>
-  </ds:schemaRefs>
-</ds:datastoreItem>
-</file>
-
-<file path=customXml/itemProps17.xml><?xml version="1.0" encoding="utf-8"?>
-<ds:datastoreItem xmlns:ds="http://schemas.openxmlformats.org/officeDocument/2006/customXml" ds:itemID="{48ED4C6D-191C-453A-AEFA-D85B1870C59D}">
-  <ds:schemaRefs>
-    <ds:schemaRef ds:uri="http://schemas.microsoft.com/VisualStudio/2011/storyboarding/control"/>
-  </ds:schemaRefs>
-</ds:datastoreItem>
-</file>
-
-<file path=customXml/itemProps18.xml><?xml version="1.0" encoding="utf-8"?>
-<ds:datastoreItem xmlns:ds="http://schemas.openxmlformats.org/officeDocument/2006/customXml" ds:itemID="{A649D7B9-F715-40AB-A71C-B9B3842724BC}">
-  <ds:schemaRefs>
-    <ds:schemaRef ds:uri="http://schemas.microsoft.com/VisualStudio/2011/storyboarding/control"/>
-  </ds:schemaRefs>
-</ds:datastoreItem>
-</file>
-
-<file path=customXml/itemProps19.xml><?xml version="1.0" encoding="utf-8"?>
-<ds:datastoreItem xmlns:ds="http://schemas.openxmlformats.org/officeDocument/2006/customXml" ds:itemID="{1DD2346F-B9C4-4399-ABD4-BA9740D9BD88}">
-  <ds:schemaRefs>
-    <ds:schemaRef ds:uri="http://schemas.microsoft.com/VisualStudio/2011/storyboarding/control"/>
-  </ds:schemaRefs>
-</ds:datastoreItem>
-</file>
-
-<file path=customXml/itemProps2.xml><?xml version="1.0" encoding="utf-8"?>
-<ds:datastoreItem xmlns:ds="http://schemas.openxmlformats.org/officeDocument/2006/customXml" ds:itemID="{26C443F0-80A1-49EA-8A5C-61D529987C65}">
-  <ds:schemaRefs>
-    <ds:schemaRef ds:uri="http://schemas.microsoft.com/VisualStudio/2011/storyboarding/control"/>
-  </ds:schemaRefs>
-</ds:datastoreItem>
-</file>
-
-<file path=customXml/itemProps20.xml><?xml version="1.0" encoding="utf-8"?>
-<ds:datastoreItem xmlns:ds="http://schemas.openxmlformats.org/officeDocument/2006/customXml" ds:itemID="{B5097B66-9493-4961-9240-EE55C193BEC8}">
-  <ds:schemaRefs>
-    <ds:schemaRef ds:uri="http://schemas.microsoft.com/VisualStudio/2011/storyboarding/control"/>
-  </ds:schemaRefs>
-</ds:datastoreItem>
-</file>
-
-<file path=customXml/itemProps21.xml><?xml version="1.0" encoding="utf-8"?>
-<ds:datastoreItem xmlns:ds="http://schemas.openxmlformats.org/officeDocument/2006/customXml" ds:itemID="{B6CACD45-209B-4AE5-9003-E06B8E889661}">
-  <ds:schemaRefs>
-    <ds:schemaRef ds:uri="http://schemas.microsoft.com/VisualStudio/2011/storyboarding/control"/>
-  </ds:schemaRefs>
-</ds:datastoreItem>
-</file>
-
-<file path=customXml/itemProps22.xml><?xml version="1.0" encoding="utf-8"?>
+<file path=customXml/itemProps26.xml><?xml version="1.0" encoding="utf-8"?>
 <ds:datastoreItem xmlns:ds="http://schemas.openxmlformats.org/officeDocument/2006/customXml" ds:itemID="{87FB099B-3A5F-41E5-BC8E-F3D2EF159FCA}">
-  <ds:schemaRefs>
-    <ds:schemaRef ds:uri="http://schemas.microsoft.com/VisualStudio/2011/storyboarding/control"/>
-  </ds:schemaRefs>
-</ds:datastoreItem>
-</file>
-
-<file path=customXml/itemProps23.xml><?xml version="1.0" encoding="utf-8"?>
-<ds:datastoreItem xmlns:ds="http://schemas.openxmlformats.org/officeDocument/2006/customXml" ds:itemID="{0BF0DCCE-4795-4C92-AEFA-7B103386F702}">
-  <ds:schemaRefs>
-    <ds:schemaRef ds:uri="http://schemas.microsoft.com/VisualStudio/2011/storyboarding/control"/>
-  </ds:schemaRefs>
-</ds:datastoreItem>
-</file>
-
-<file path=customXml/itemProps24.xml><?xml version="1.0" encoding="utf-8"?>
-<ds:datastoreItem xmlns:ds="http://schemas.openxmlformats.org/officeDocument/2006/customXml" ds:itemID="{2518A20E-034B-4E42-B0C9-3D8089CEF578}">
-  <ds:schemaRefs>
-    <ds:schemaRef ds:uri="http://schemas.microsoft.com/VisualStudio/2011/storyboarding/control"/>
-  </ds:schemaRefs>
-</ds:datastoreItem>
-</file>
-
-<file path=customXml/itemProps25.xml><?xml version="1.0" encoding="utf-8"?>
-<ds:datastoreItem xmlns:ds="http://schemas.openxmlformats.org/officeDocument/2006/customXml" ds:itemID="{72BCF8D5-9CEC-40C5-8D88-80AB6FC9E9F8}">
-  <ds:schemaRefs>
-    <ds:schemaRef ds:uri="http://schemas.microsoft.com/VisualStudio/2011/storyboarding/control"/>
-  </ds:schemaRefs>
-</ds:datastoreItem>
-</file>
-
-<file path=customXml/itemProps26.xml><?xml version="1.0" encoding="utf-8"?>
-<ds:datastoreItem xmlns:ds="http://schemas.openxmlformats.org/officeDocument/2006/customXml" ds:itemID="{7D7CB359-8F7B-4D8A-808E-1C6B29A64ED6}">
   <ds:schemaRefs>
     <ds:schemaRef ds:uri="http://schemas.microsoft.com/VisualStudio/2011/storyboarding/control"/>
   </ds:schemaRefs>
@@ -9991,6 +9991,310 @@
 </file>
 
 <file path=customXml/itemProps28.xml><?xml version="1.0" encoding="utf-8"?>
+<ds:datastoreItem xmlns:ds="http://schemas.openxmlformats.org/officeDocument/2006/customXml" ds:itemID="{A8F37163-25F8-4E84-8279-D4574B49C22C}">
+  <ds:schemaRefs>
+    <ds:schemaRef ds:uri="http://schemas.microsoft.com/VisualStudio/2011/storyboarding/control"/>
+  </ds:schemaRefs>
+</ds:datastoreItem>
+</file>
+
+<file path=customXml/itemProps29.xml><?xml version="1.0" encoding="utf-8"?>
+<ds:datastoreItem xmlns:ds="http://schemas.openxmlformats.org/officeDocument/2006/customXml" ds:itemID="{E1B41B76-6F78-44DC-99A8-DFD2C2A83E34}">
+  <ds:schemaRefs>
+    <ds:schemaRef ds:uri="http://schemas.microsoft.com/VisualStudio/2011/storyboarding/control"/>
+  </ds:schemaRefs>
+</ds:datastoreItem>
+</file>
+
+<file path=customXml/itemProps3.xml><?xml version="1.0" encoding="utf-8"?>
+<ds:datastoreItem xmlns:ds="http://schemas.openxmlformats.org/officeDocument/2006/customXml" ds:itemID="{D32E724C-A4FF-4612-9996-DD4AED58BA62}">
+  <ds:schemaRefs>
+    <ds:schemaRef ds:uri="http://schemas.microsoft.com/VisualStudio/2011/storyboarding/control"/>
+  </ds:schemaRefs>
+</ds:datastoreItem>
+</file>
+
+<file path=customXml/itemProps30.xml><?xml version="1.0" encoding="utf-8"?>
+<ds:datastoreItem xmlns:ds="http://schemas.openxmlformats.org/officeDocument/2006/customXml" ds:itemID="{7BED5AAF-A887-4928-BFF1-AA6F41EAC01E}">
+  <ds:schemaRefs>
+    <ds:schemaRef ds:uri="http://schemas.microsoft.com/VisualStudio/2011/storyboarding/control"/>
+  </ds:schemaRefs>
+</ds:datastoreItem>
+</file>
+
+<file path=customXml/itemProps31.xml><?xml version="1.0" encoding="utf-8"?>
+<ds:datastoreItem xmlns:ds="http://schemas.openxmlformats.org/officeDocument/2006/customXml" ds:itemID="{6ED5C25D-E4FB-497F-A571-D33B7D1E81C6}">
+  <ds:schemaRefs>
+    <ds:schemaRef ds:uri="http://schemas.microsoft.com/VisualStudio/2011/storyboarding/control"/>
+  </ds:schemaRefs>
+</ds:datastoreItem>
+</file>
+
+<file path=customXml/itemProps32.xml><?xml version="1.0" encoding="utf-8"?>
+<ds:datastoreItem xmlns:ds="http://schemas.openxmlformats.org/officeDocument/2006/customXml" ds:itemID="{5DABBEE4-57BD-45BC-A909-91BEE00F4D9D}">
+  <ds:schemaRefs>
+    <ds:schemaRef ds:uri="http://schemas.microsoft.com/VisualStudio/2011/storyboarding/control"/>
+  </ds:schemaRefs>
+</ds:datastoreItem>
+</file>
+
+<file path=customXml/itemProps33.xml><?xml version="1.0" encoding="utf-8"?>
+<ds:datastoreItem xmlns:ds="http://schemas.openxmlformats.org/officeDocument/2006/customXml" ds:itemID="{E45C5231-5AD7-483C-88AF-E2C3D79A2934}">
+  <ds:schemaRefs>
+    <ds:schemaRef ds:uri="http://schemas.microsoft.com/VisualStudio/2011/storyboarding/control"/>
+  </ds:schemaRefs>
+</ds:datastoreItem>
+</file>
+
+<file path=customXml/itemProps34.xml><?xml version="1.0" encoding="utf-8"?>
+<ds:datastoreItem xmlns:ds="http://schemas.openxmlformats.org/officeDocument/2006/customXml" ds:itemID="{D9902FB6-2525-4994-B39F-C5A28D8845BE}">
+  <ds:schemaRefs>
+    <ds:schemaRef ds:uri="http://schemas.microsoft.com/VisualStudio/2011/storyboarding/control"/>
+  </ds:schemaRefs>
+</ds:datastoreItem>
+</file>
+
+<file path=customXml/itemProps35.xml><?xml version="1.0" encoding="utf-8"?>
+<ds:datastoreItem xmlns:ds="http://schemas.openxmlformats.org/officeDocument/2006/customXml" ds:itemID="{562ACCBE-45D0-481A-9D8E-F557CFF8F221}">
+  <ds:schemaRefs>
+    <ds:schemaRef ds:uri="http://schemas.microsoft.com/VisualStudio/2011/storyboarding/control"/>
+  </ds:schemaRefs>
+</ds:datastoreItem>
+</file>
+
+<file path=customXml/itemProps36.xml><?xml version="1.0" encoding="utf-8"?>
+<ds:datastoreItem xmlns:ds="http://schemas.openxmlformats.org/officeDocument/2006/customXml" ds:itemID="{3A4B9090-FA2C-4120-907D-9A914A5A1DCD}">
+  <ds:schemaRefs>
+    <ds:schemaRef ds:uri="http://schemas.microsoft.com/VisualStudio/2011/storyboarding/control"/>
+  </ds:schemaRefs>
+</ds:datastoreItem>
+</file>
+
+<file path=customXml/itemProps37.xml><?xml version="1.0" encoding="utf-8"?>
+<ds:datastoreItem xmlns:ds="http://schemas.openxmlformats.org/officeDocument/2006/customXml" ds:itemID="{F1193E09-28D8-4D6A-BD76-F3CA7F0134F6}">
+  <ds:schemaRefs>
+    <ds:schemaRef ds:uri="http://schemas.microsoft.com/VisualStudio/2011/storyboarding/control"/>
+  </ds:schemaRefs>
+</ds:datastoreItem>
+</file>
+
+<file path=customXml/itemProps38.xml><?xml version="1.0" encoding="utf-8"?>
+<ds:datastoreItem xmlns:ds="http://schemas.openxmlformats.org/officeDocument/2006/customXml" ds:itemID="{5C77B942-C8F3-4BD4-8F58-308320A4A91D}">
+  <ds:schemaRefs>
+    <ds:schemaRef ds:uri="http://schemas.microsoft.com/VisualStudio/2011/storyboarding/control"/>
+  </ds:schemaRefs>
+</ds:datastoreItem>
+</file>
+
+<file path=customXml/itemProps39.xml><?xml version="1.0" encoding="utf-8"?>
+<ds:datastoreItem xmlns:ds="http://schemas.openxmlformats.org/officeDocument/2006/customXml" ds:itemID="{2A81C5BB-30D6-4F7B-8126-E973D833C10A}">
+  <ds:schemaRefs>
+    <ds:schemaRef ds:uri="http://schemas.microsoft.com/VisualStudio/2011/storyboarding/control"/>
+  </ds:schemaRefs>
+</ds:datastoreItem>
+</file>
+
+<file path=customXml/itemProps4.xml><?xml version="1.0" encoding="utf-8"?>
+<ds:datastoreItem xmlns:ds="http://schemas.openxmlformats.org/officeDocument/2006/customXml" ds:itemID="{D1ACB713-CD12-472D-9AC5-BEBD9BEDA96D}">
+  <ds:schemaRefs>
+    <ds:schemaRef ds:uri="http://schemas.microsoft.com/VisualStudio/2011/storyboarding/control"/>
+  </ds:schemaRefs>
+</ds:datastoreItem>
+</file>
+
+<file path=customXml/itemProps40.xml><?xml version="1.0" encoding="utf-8"?>
+<ds:datastoreItem xmlns:ds="http://schemas.openxmlformats.org/officeDocument/2006/customXml" ds:itemID="{DB44F08D-A554-4DAE-AB92-9F19A0AF0E0F}">
+  <ds:schemaRefs>
+    <ds:schemaRef ds:uri="http://schemas.microsoft.com/VisualStudio/2011/storyboarding/control"/>
+  </ds:schemaRefs>
+</ds:datastoreItem>
+</file>
+
+<file path=customXml/itemProps41.xml><?xml version="1.0" encoding="utf-8"?>
+<ds:datastoreItem xmlns:ds="http://schemas.openxmlformats.org/officeDocument/2006/customXml" ds:itemID="{BA1D1506-1E64-4120-88FA-59E429E224FA}">
+  <ds:schemaRefs>
+    <ds:schemaRef ds:uri="http://schemas.microsoft.com/VisualStudio/2011/storyboarding/control"/>
+  </ds:schemaRefs>
+</ds:datastoreItem>
+</file>
+
+<file path=customXml/itemProps42.xml><?xml version="1.0" encoding="utf-8"?>
+<ds:datastoreItem xmlns:ds="http://schemas.openxmlformats.org/officeDocument/2006/customXml" ds:itemID="{E838889A-C741-48DA-8FAC-50ADAD37F748}">
+  <ds:schemaRefs>
+    <ds:schemaRef ds:uri="http://schemas.microsoft.com/VisualStudio/2011/storyboarding/control"/>
+  </ds:schemaRefs>
+</ds:datastoreItem>
+</file>
+
+<file path=customXml/itemProps43.xml><?xml version="1.0" encoding="utf-8"?>
+<ds:datastoreItem xmlns:ds="http://schemas.openxmlformats.org/officeDocument/2006/customXml" ds:itemID="{48ED4C6D-191C-453A-AEFA-D85B1870C59D}">
+  <ds:schemaRefs>
+    <ds:schemaRef ds:uri="http://schemas.microsoft.com/VisualStudio/2011/storyboarding/control"/>
+  </ds:schemaRefs>
+</ds:datastoreItem>
+</file>
+
+<file path=customXml/itemProps44.xml><?xml version="1.0" encoding="utf-8"?>
+<ds:datastoreItem xmlns:ds="http://schemas.openxmlformats.org/officeDocument/2006/customXml" ds:itemID="{72BCF8D5-9CEC-40C5-8D88-80AB6FC9E9F8}">
+  <ds:schemaRefs>
+    <ds:schemaRef ds:uri="http://schemas.microsoft.com/VisualStudio/2011/storyboarding/control"/>
+  </ds:schemaRefs>
+</ds:datastoreItem>
+</file>
+
+<file path=customXml/itemProps45.xml><?xml version="1.0" encoding="utf-8"?>
+<ds:datastoreItem xmlns:ds="http://schemas.openxmlformats.org/officeDocument/2006/customXml" ds:itemID="{3C705390-41B2-4E4B-9A77-9CFC82A2CBE4}">
+  <ds:schemaRefs>
+    <ds:schemaRef ds:uri="http://schemas.microsoft.com/VisualStudio/2011/storyboarding/control"/>
+  </ds:schemaRefs>
+</ds:datastoreItem>
+</file>
+
+<file path=customXml/itemProps46.xml><?xml version="1.0" encoding="utf-8"?>
+<ds:datastoreItem xmlns:ds="http://schemas.openxmlformats.org/officeDocument/2006/customXml" ds:itemID="{767C30FE-3B3A-4F21-844A-AB59F94E4161}">
+  <ds:schemaRefs>
+    <ds:schemaRef ds:uri="http://schemas.microsoft.com/VisualStudio/2011/storyboarding/control"/>
+  </ds:schemaRefs>
+</ds:datastoreItem>
+</file>
+
+<file path=customXml/itemProps47.xml><?xml version="1.0" encoding="utf-8"?>
+<ds:datastoreItem xmlns:ds="http://schemas.openxmlformats.org/officeDocument/2006/customXml" ds:itemID="{4C05EC8C-ACA8-4019-9C83-70D84CC6A97D}">
+  <ds:schemaRefs>
+    <ds:schemaRef ds:uri="http://schemas.microsoft.com/VisualStudio/2011/storyboarding/control"/>
+  </ds:schemaRefs>
+</ds:datastoreItem>
+</file>
+
+<file path=customXml/itemProps48.xml><?xml version="1.0" encoding="utf-8"?>
+<ds:datastoreItem xmlns:ds="http://schemas.openxmlformats.org/officeDocument/2006/customXml" ds:itemID="{AD83DFF5-57DB-43D9-8557-02521D85CE79}">
+  <ds:schemaRefs>
+    <ds:schemaRef ds:uri="http://schemas.microsoft.com/VisualStudio/2011/storyboarding/control"/>
+  </ds:schemaRefs>
+</ds:datastoreItem>
+</file>
+
+<file path=customXml/itemProps49.xml><?xml version="1.0" encoding="utf-8"?>
+<ds:datastoreItem xmlns:ds="http://schemas.openxmlformats.org/officeDocument/2006/customXml" ds:itemID="{DCBF3B82-B87A-477C-A0E2-FAE47BAE2AFE}">
+  <ds:schemaRefs>
+    <ds:schemaRef ds:uri="http://schemas.microsoft.com/VisualStudio/2011/storyboarding/control"/>
+  </ds:schemaRefs>
+</ds:datastoreItem>
+</file>
+
+<file path=customXml/itemProps5.xml><?xml version="1.0" encoding="utf-8"?>
+<ds:datastoreItem xmlns:ds="http://schemas.openxmlformats.org/officeDocument/2006/customXml" ds:itemID="{1FC499BC-B9AC-4176-8DBF-CE3270ED72C9}">
+  <ds:schemaRefs>
+    <ds:schemaRef ds:uri="http://schemas.microsoft.com/VisualStudio/2011/storyboarding/control"/>
+  </ds:schemaRefs>
+</ds:datastoreItem>
+</file>
+
+<file path=customXml/itemProps50.xml><?xml version="1.0" encoding="utf-8"?>
+<ds:datastoreItem xmlns:ds="http://schemas.openxmlformats.org/officeDocument/2006/customXml" ds:itemID="{B5097B66-9493-4961-9240-EE55C193BEC8}">
+  <ds:schemaRefs>
+    <ds:schemaRef ds:uri="http://schemas.microsoft.com/VisualStudio/2011/storyboarding/control"/>
+  </ds:schemaRefs>
+</ds:datastoreItem>
+</file>
+
+<file path=customXml/itemProps51.xml><?xml version="1.0" encoding="utf-8"?>
+<ds:datastoreItem xmlns:ds="http://schemas.openxmlformats.org/officeDocument/2006/customXml" ds:itemID="{6D917542-4CB5-4F33-83FB-7158BE7AA367}">
+  <ds:schemaRefs>
+    <ds:schemaRef ds:uri="http://schemas.microsoft.com/VisualStudio/2011/storyboarding/control"/>
+  </ds:schemaRefs>
+</ds:datastoreItem>
+</file>
+
+<file path=customXml/itemProps52.xml><?xml version="1.0" encoding="utf-8"?>
+<ds:datastoreItem xmlns:ds="http://schemas.openxmlformats.org/officeDocument/2006/customXml" ds:itemID="{B6D3FCD1-1D67-4BCA-8C64-D3FAB60D9726}">
+  <ds:schemaRefs>
+    <ds:schemaRef ds:uri="http://schemas.microsoft.com/VisualStudio/2011/storyboarding/control"/>
+  </ds:schemaRefs>
+</ds:datastoreItem>
+</file>
+
+<file path=customXml/itemProps53.xml><?xml version="1.0" encoding="utf-8"?>
+<ds:datastoreItem xmlns:ds="http://schemas.openxmlformats.org/officeDocument/2006/customXml" ds:itemID="{DC354CCD-34CB-4038-9E97-5D641FC3188E}">
+  <ds:schemaRefs>
+    <ds:schemaRef ds:uri="http://schemas.microsoft.com/VisualStudio/2011/storyboarding/control"/>
+  </ds:schemaRefs>
+</ds:datastoreItem>
+</file>
+
+<file path=customXml/itemProps54.xml><?xml version="1.0" encoding="utf-8"?>
+<ds:datastoreItem xmlns:ds="http://schemas.openxmlformats.org/officeDocument/2006/customXml" ds:itemID="{74FA862F-2270-42C7-94BA-05FAE460400B}">
+  <ds:schemaRefs>
+    <ds:schemaRef ds:uri="http://schemas.microsoft.com/VisualStudio/2011/storyboarding/control"/>
+  </ds:schemaRefs>
+</ds:datastoreItem>
+</file>
+
+<file path=customXml/itemProps55.xml><?xml version="1.0" encoding="utf-8"?>
+<ds:datastoreItem xmlns:ds="http://schemas.openxmlformats.org/officeDocument/2006/customXml" ds:itemID="{EAEA75B6-A05A-46AD-8999-E1144746839A}">
+  <ds:schemaRefs>
+    <ds:schemaRef ds:uri="http://schemas.microsoft.com/VisualStudio/2011/storyboarding/control"/>
+  </ds:schemaRefs>
+</ds:datastoreItem>
+</file>
+
+<file path=customXml/itemProps56.xml><?xml version="1.0" encoding="utf-8"?>
+<ds:datastoreItem xmlns:ds="http://schemas.openxmlformats.org/officeDocument/2006/customXml" ds:itemID="{91ED9130-D964-4E58-94E1-100812A62FA4}">
+  <ds:schemaRefs>
+    <ds:schemaRef ds:uri="http://schemas.microsoft.com/VisualStudio/2011/storyboarding/control"/>
+  </ds:schemaRefs>
+</ds:datastoreItem>
+</file>
+
+<file path=customXml/itemProps57.xml><?xml version="1.0" encoding="utf-8"?>
+<ds:datastoreItem xmlns:ds="http://schemas.openxmlformats.org/officeDocument/2006/customXml" ds:itemID="{501253E0-06C6-4CEC-8FFC-EEC832BFF7AD}">
+  <ds:schemaRefs>
+    <ds:schemaRef ds:uri="http://schemas.microsoft.com/VisualStudio/2011/storyboarding/control"/>
+  </ds:schemaRefs>
+</ds:datastoreItem>
+</file>
+
+<file path=customXml/itemProps58.xml><?xml version="1.0" encoding="utf-8"?>
+<ds:datastoreItem xmlns:ds="http://schemas.openxmlformats.org/officeDocument/2006/customXml" ds:itemID="{EB537FFA-BDFE-4B5C-A7BF-B70BEBF50B70}">
+  <ds:schemaRefs>
+    <ds:schemaRef ds:uri="http://schemas.microsoft.com/VisualStudio/2011/storyboarding/control"/>
+  </ds:schemaRefs>
+</ds:datastoreItem>
+</file>
+
+<file path=customXml/itemProps59.xml><?xml version="1.0" encoding="utf-8"?>
+<ds:datastoreItem xmlns:ds="http://schemas.openxmlformats.org/officeDocument/2006/customXml" ds:itemID="{ADFC0E54-32DF-4EF6-AA10-65C2084BA5CF}">
+  <ds:schemaRefs>
+    <ds:schemaRef ds:uri="http://schemas.microsoft.com/VisualStudio/2011/storyboarding/control"/>
+  </ds:schemaRefs>
+</ds:datastoreItem>
+</file>
+
+<file path=customXml/itemProps6.xml><?xml version="1.0" encoding="utf-8"?>
+<ds:datastoreItem xmlns:ds="http://schemas.openxmlformats.org/officeDocument/2006/customXml" ds:itemID="{26C443F0-80A1-49EA-8A5C-61D529987C65}">
+  <ds:schemaRefs>
+    <ds:schemaRef ds:uri="http://schemas.microsoft.com/VisualStudio/2011/storyboarding/control"/>
+  </ds:schemaRefs>
+</ds:datastoreItem>
+</file>
+
+<file path=customXml/itemProps60.xml><?xml version="1.0" encoding="utf-8"?>
+<ds:datastoreItem xmlns:ds="http://schemas.openxmlformats.org/officeDocument/2006/customXml" ds:itemID="{9E6F7571-4EBE-4180-B628-CCE77B77DF89}">
+  <ds:schemaRefs>
+    <ds:schemaRef ds:uri="http://schemas.microsoft.com/VisualStudio/2011/storyboarding/control"/>
+  </ds:schemaRefs>
+</ds:datastoreItem>
+</file>
+
+<file path=customXml/itemProps61.xml><?xml version="1.0" encoding="utf-8"?>
+<ds:datastoreItem xmlns:ds="http://schemas.openxmlformats.org/officeDocument/2006/customXml" ds:itemID="{0BF0DCCE-4795-4C92-AEFA-7B103386F702}">
+  <ds:schemaRefs>
+    <ds:schemaRef ds:uri="http://schemas.microsoft.com/VisualStudio/2011/storyboarding/control"/>
+  </ds:schemaRefs>
+</ds:datastoreItem>
+</file>
+
+<file path=customXml/itemProps62.xml><?xml version="1.0" encoding="utf-8"?>
 <ds:datastoreItem xmlns:ds="http://schemas.openxmlformats.org/officeDocument/2006/customXml" ds:itemID="{832B116A-63C5-420F-9558-05BBB3EA9C8F}">
   <ds:schemaRefs>
     <ds:schemaRef ds:uri="http://schemas.microsoft.com/VisualStudio/2011/storyboarding/control"/>
@@ -9998,7 +10302,151 @@
 </ds:datastoreItem>
 </file>
 
-<file path=customXml/itemProps29.xml><?xml version="1.0" encoding="utf-8"?>
+<file path=customXml/itemProps63.xml><?xml version="1.0" encoding="utf-8"?>
+<ds:datastoreItem xmlns:ds="http://schemas.openxmlformats.org/officeDocument/2006/customXml" ds:itemID="{066B72A9-6778-44B8-9F8D-925F93B5D2D7}">
+  <ds:schemaRefs>
+    <ds:schemaRef ds:uri="http://schemas.microsoft.com/VisualStudio/2011/storyboarding/control"/>
+  </ds:schemaRefs>
+</ds:datastoreItem>
+</file>
+
+<file path=customXml/itemProps64.xml><?xml version="1.0" encoding="utf-8"?>
+<ds:datastoreItem xmlns:ds="http://schemas.openxmlformats.org/officeDocument/2006/customXml" ds:itemID="{581C7DE6-5844-4025-8BA4-BE4D62ED991F}">
+  <ds:schemaRefs>
+    <ds:schemaRef ds:uri="http://schemas.microsoft.com/VisualStudio/2011/storyboarding/control"/>
+  </ds:schemaRefs>
+</ds:datastoreItem>
+</file>
+
+<file path=customXml/itemProps65.xml><?xml version="1.0" encoding="utf-8"?>
+<ds:datastoreItem xmlns:ds="http://schemas.openxmlformats.org/officeDocument/2006/customXml" ds:itemID="{C64738E3-6587-4CA4-848D-91D0AFDA1A6D}">
+  <ds:schemaRefs>
+    <ds:schemaRef ds:uri="http://schemas.microsoft.com/VisualStudio/2011/storyboarding/control"/>
+  </ds:schemaRefs>
+</ds:datastoreItem>
+</file>
+
+<file path=customXml/itemProps66.xml><?xml version="1.0" encoding="utf-8"?>
+<ds:datastoreItem xmlns:ds="http://schemas.openxmlformats.org/officeDocument/2006/customXml" ds:itemID="{A4C33EEA-7075-4651-97E3-4829E38E21EA}">
+  <ds:schemaRefs>
+    <ds:schemaRef ds:uri="http://schemas.microsoft.com/VisualStudio/2011/storyboarding/control"/>
+  </ds:schemaRefs>
+</ds:datastoreItem>
+</file>
+
+<file path=customXml/itemProps67.xml><?xml version="1.0" encoding="utf-8"?>
+<ds:datastoreItem xmlns:ds="http://schemas.openxmlformats.org/officeDocument/2006/customXml" ds:itemID="{EF9DB188-6753-4B9A-AF3E-8E01D022A2D0}">
+  <ds:schemaRefs>
+    <ds:schemaRef ds:uri="http://schemas.microsoft.com/VisualStudio/2011/storyboarding/control"/>
+  </ds:schemaRefs>
+</ds:datastoreItem>
+</file>
+
+<file path=customXml/itemProps68.xml><?xml version="1.0" encoding="utf-8"?>
+<ds:datastoreItem xmlns:ds="http://schemas.openxmlformats.org/officeDocument/2006/customXml" ds:itemID="{DCF09C28-3B24-44E3-BF7A-CA6BC9D292C3}">
+  <ds:schemaRefs>
+    <ds:schemaRef ds:uri="http://schemas.microsoft.com/VisualStudio/2011/storyboarding/control"/>
+  </ds:schemaRefs>
+</ds:datastoreItem>
+</file>
+
+<file path=customXml/itemProps69.xml><?xml version="1.0" encoding="utf-8"?>
+<ds:datastoreItem xmlns:ds="http://schemas.openxmlformats.org/officeDocument/2006/customXml" ds:itemID="{9C6A7914-511A-42E6-908E-AEFBA51CB63F}">
+  <ds:schemaRefs>
+    <ds:schemaRef ds:uri="http://schemas.microsoft.com/VisualStudio/2011/storyboarding/control"/>
+  </ds:schemaRefs>
+</ds:datastoreItem>
+</file>
+
+<file path=customXml/itemProps7.xml><?xml version="1.0" encoding="utf-8"?>
+<ds:datastoreItem xmlns:ds="http://schemas.openxmlformats.org/officeDocument/2006/customXml" ds:itemID="{0ECA24E0-E199-4F3E-B649-D315A016E4DD}">
+  <ds:schemaRefs>
+    <ds:schemaRef ds:uri="http://schemas.microsoft.com/VisualStudio/2011/storyboarding/control"/>
+  </ds:schemaRefs>
+</ds:datastoreItem>
+</file>
+
+<file path=customXml/itemProps70.xml><?xml version="1.0" encoding="utf-8"?>
+<ds:datastoreItem xmlns:ds="http://schemas.openxmlformats.org/officeDocument/2006/customXml" ds:itemID="{69B6F2B9-DC41-419F-BF45-B4C3B79D72C8}">
+  <ds:schemaRefs>
+    <ds:schemaRef ds:uri="http://schemas.microsoft.com/VisualStudio/2011/storyboarding/control"/>
+  </ds:schemaRefs>
+</ds:datastoreItem>
+</file>
+
+<file path=customXml/itemProps71.xml><?xml version="1.0" encoding="utf-8"?>
+<ds:datastoreItem xmlns:ds="http://schemas.openxmlformats.org/officeDocument/2006/customXml" ds:itemID="{DCA7DBC9-E7E7-45F7-96F6-0FE75525CEC3}">
+  <ds:schemaRefs>
+    <ds:schemaRef ds:uri="http://schemas.microsoft.com/VisualStudio/2011/storyboarding/control"/>
+  </ds:schemaRefs>
+</ds:datastoreItem>
+</file>
+
+<file path=customXml/itemProps72.xml><?xml version="1.0" encoding="utf-8"?>
+<ds:datastoreItem xmlns:ds="http://schemas.openxmlformats.org/officeDocument/2006/customXml" ds:itemID="{612C3170-3E5D-4B6F-AB08-FAAC8693224E}">
+  <ds:schemaRefs>
+    <ds:schemaRef ds:uri="http://schemas.microsoft.com/VisualStudio/2011/storyboarding/control"/>
+  </ds:schemaRefs>
+</ds:datastoreItem>
+</file>
+
+<file path=customXml/itemProps73.xml><?xml version="1.0" encoding="utf-8"?>
+<ds:datastoreItem xmlns:ds="http://schemas.openxmlformats.org/officeDocument/2006/customXml" ds:itemID="{3105808A-F8E4-4B7C-BA46-C221EDA3D356}">
+  <ds:schemaRefs>
+    <ds:schemaRef ds:uri="http://schemas.microsoft.com/VisualStudio/2011/storyboarding/control"/>
+  </ds:schemaRefs>
+</ds:datastoreItem>
+</file>
+
+<file path=customXml/itemProps74.xml><?xml version="1.0" encoding="utf-8"?>
+<ds:datastoreItem xmlns:ds="http://schemas.openxmlformats.org/officeDocument/2006/customXml" ds:itemID="{CA0BFCDC-CA14-4412-ACD5-B19572428A30}">
+  <ds:schemaRefs>
+    <ds:schemaRef ds:uri="http://schemas.microsoft.com/VisualStudio/2011/storyboarding/control"/>
+  </ds:schemaRefs>
+</ds:datastoreItem>
+</file>
+
+<file path=customXml/itemProps75.xml><?xml version="1.0" encoding="utf-8"?>
+<ds:datastoreItem xmlns:ds="http://schemas.openxmlformats.org/officeDocument/2006/customXml" ds:itemID="{D9BEE98F-34AD-4470-830C-0712E5B34DAB}">
+  <ds:schemaRefs>
+    <ds:schemaRef ds:uri="http://schemas.microsoft.com/VisualStudio/2011/storyboarding/control"/>
+  </ds:schemaRefs>
+</ds:datastoreItem>
+</file>
+
+<file path=customXml/itemProps76.xml><?xml version="1.0" encoding="utf-8"?>
+<ds:datastoreItem xmlns:ds="http://schemas.openxmlformats.org/officeDocument/2006/customXml" ds:itemID="{BA7FA624-CB09-44D6-8994-2F6E015D448E}">
+  <ds:schemaRefs>
+    <ds:schemaRef ds:uri="http://schemas.microsoft.com/VisualStudio/2011/storyboarding/control"/>
+  </ds:schemaRefs>
+</ds:datastoreItem>
+</file>
+
+<file path=customXml/itemProps77.xml><?xml version="1.0" encoding="utf-8"?>
+<ds:datastoreItem xmlns:ds="http://schemas.openxmlformats.org/officeDocument/2006/customXml" ds:itemID="{AAAD0EC6-A22B-48B1-82D8-79572FE29363}">
+  <ds:schemaRefs>
+    <ds:schemaRef ds:uri="http://schemas.microsoft.com/VisualStudio/2011/storyboarding/control"/>
+  </ds:schemaRefs>
+</ds:datastoreItem>
+</file>
+
+<file path=customXml/itemProps78.xml><?xml version="1.0" encoding="utf-8"?>
+<ds:datastoreItem xmlns:ds="http://schemas.openxmlformats.org/officeDocument/2006/customXml" ds:itemID="{7FC1ACFC-5903-4315-BB83-531181E20214}">
+  <ds:schemaRefs>
+    <ds:schemaRef ds:uri="http://schemas.microsoft.com/VisualStudio/2011/storyboarding/control"/>
+  </ds:schemaRefs>
+</ds:datastoreItem>
+</file>
+
+<file path=customXml/itemProps79.xml><?xml version="1.0" encoding="utf-8"?>
+<ds:datastoreItem xmlns:ds="http://schemas.openxmlformats.org/officeDocument/2006/customXml" ds:itemID="{A649D7B9-F715-40AB-A71C-B9B3842724BC}">
+  <ds:schemaRefs>
+    <ds:schemaRef ds:uri="http://schemas.microsoft.com/VisualStudio/2011/storyboarding/control"/>
+  </ds:schemaRefs>
+</ds:datastoreItem>
+</file>
+
+<file path=customXml/itemProps8.xml><?xml version="1.0" encoding="utf-8"?>
 <ds:datastoreItem xmlns:ds="http://schemas.openxmlformats.org/officeDocument/2006/customXml" ds:itemID="{0CEB70F9-7616-444A-9041-F0769F94E65B}">
   <ds:schemaRefs>
     <ds:schemaRef ds:uri="http://schemas.microsoft.com/VisualStudio/2011/storyboarding/control"/>
@@ -10006,47 +10454,31 @@
 </ds:datastoreItem>
 </file>
 
-<file path=customXml/itemProps3.xml><?xml version="1.0" encoding="utf-8"?>
-<ds:datastoreItem xmlns:ds="http://schemas.openxmlformats.org/officeDocument/2006/customXml" ds:itemID="{BA1D1506-1E64-4120-88FA-59E429E224FA}">
+<file path=customXml/itemProps80.xml><?xml version="1.0" encoding="utf-8"?>
+<ds:datastoreItem xmlns:ds="http://schemas.openxmlformats.org/officeDocument/2006/customXml" ds:itemID="{A4268BD8-7853-4881-9E53-4FE1E08A411E}">
   <ds:schemaRefs>
     <ds:schemaRef ds:uri="http://schemas.microsoft.com/VisualStudio/2011/storyboarding/control"/>
   </ds:schemaRefs>
 </ds:datastoreItem>
 </file>
 
-<file path=customXml/itemProps30.xml><?xml version="1.0" encoding="utf-8"?>
-<ds:datastoreItem xmlns:ds="http://schemas.openxmlformats.org/officeDocument/2006/customXml" ds:itemID="{A8F37163-25F8-4E84-8279-D4574B49C22C}">
+<file path=customXml/itemProps81.xml><?xml version="1.0" encoding="utf-8"?>
+<ds:datastoreItem xmlns:ds="http://schemas.openxmlformats.org/officeDocument/2006/customXml" ds:itemID="{7D7CB359-8F7B-4D8A-808E-1C6B29A64ED6}">
   <ds:schemaRefs>
     <ds:schemaRef ds:uri="http://schemas.microsoft.com/VisualStudio/2011/storyboarding/control"/>
   </ds:schemaRefs>
 </ds:datastoreItem>
 </file>
 
-<file path=customXml/itemProps31.xml><?xml version="1.0" encoding="utf-8"?>
-<ds:datastoreItem xmlns:ds="http://schemas.openxmlformats.org/officeDocument/2006/customXml" ds:itemID="{EF9DB188-6753-4B9A-AF3E-8E01D022A2D0}">
+<file path=customXml/itemProps82.xml><?xml version="1.0" encoding="utf-8"?>
+<ds:datastoreItem xmlns:ds="http://schemas.openxmlformats.org/officeDocument/2006/customXml" ds:itemID="{B6CACD45-209B-4AE5-9003-E06B8E889661}">
   <ds:schemaRefs>
     <ds:schemaRef ds:uri="http://schemas.microsoft.com/VisualStudio/2011/storyboarding/control"/>
   </ds:schemaRefs>
 </ds:datastoreItem>
 </file>
 
-<file path=customXml/itemProps32.xml><?xml version="1.0" encoding="utf-8"?>
-<ds:datastoreItem xmlns:ds="http://schemas.openxmlformats.org/officeDocument/2006/customXml" ds:itemID="{C88BAED0-EFF4-4013-BA7C-6AA8222DBFDF}">
-  <ds:schemaRefs>
-    <ds:schemaRef ds:uri="http://schemas.microsoft.com/VisualStudio/2011/storyboarding/control"/>
-  </ds:schemaRefs>
-</ds:datastoreItem>
-</file>
-
-<file path=customXml/itemProps33.xml><?xml version="1.0" encoding="utf-8"?>
-<ds:datastoreItem xmlns:ds="http://schemas.openxmlformats.org/officeDocument/2006/customXml" ds:itemID="{3C705390-41B2-4E4B-9A77-9CFC82A2CBE4}">
-  <ds:schemaRefs>
-    <ds:schemaRef ds:uri="http://schemas.microsoft.com/VisualStudio/2011/storyboarding/control"/>
-  </ds:schemaRefs>
-</ds:datastoreItem>
-</file>
-
-<file path=customXml/itemProps34.xml><?xml version="1.0" encoding="utf-8"?>
+<file path=customXml/itemProps83.xml><?xml version="1.0" encoding="utf-8"?>
 <ds:datastoreItem xmlns:ds="http://schemas.openxmlformats.org/officeDocument/2006/customXml" ds:itemID="{CE5F796C-1B15-4955-82E0-926F6326F48E}">
   <ds:schemaRefs>
     <ds:schemaRef ds:uri="http://schemas.microsoft.com/VisualStudio/2011/storyboarding/control"/>
@@ -10054,71 +10486,7 @@
 </ds:datastoreItem>
 </file>
 
-<file path=customXml/itemProps35.xml><?xml version="1.0" encoding="utf-8"?>
-<ds:datastoreItem xmlns:ds="http://schemas.openxmlformats.org/officeDocument/2006/customXml" ds:itemID="{E1B41B76-6F78-44DC-99A8-DFD2C2A83E34}">
-  <ds:schemaRefs>
-    <ds:schemaRef ds:uri="http://schemas.microsoft.com/VisualStudio/2011/storyboarding/control"/>
-  </ds:schemaRefs>
-</ds:datastoreItem>
-</file>
-
-<file path=customXml/itemProps36.xml><?xml version="1.0" encoding="utf-8"?>
-<ds:datastoreItem xmlns:ds="http://schemas.openxmlformats.org/officeDocument/2006/customXml" ds:itemID="{066B72A9-6778-44B8-9F8D-925F93B5D2D7}">
-  <ds:schemaRefs>
-    <ds:schemaRef ds:uri="http://schemas.microsoft.com/VisualStudio/2011/storyboarding/control"/>
-  </ds:schemaRefs>
-</ds:datastoreItem>
-</file>
-
-<file path=customXml/itemProps37.xml><?xml version="1.0" encoding="utf-8"?>
-<ds:datastoreItem xmlns:ds="http://schemas.openxmlformats.org/officeDocument/2006/customXml" ds:itemID="{CCBA0FAD-D47F-4053-BB7A-FCDAF4A83483}">
-  <ds:schemaRefs>
-    <ds:schemaRef ds:uri="http://schemas.microsoft.com/VisualStudio/2011/storyboarding/control"/>
-  </ds:schemaRefs>
-</ds:datastoreItem>
-</file>
-
-<file path=customXml/itemProps38.xml><?xml version="1.0" encoding="utf-8"?>
-<ds:datastoreItem xmlns:ds="http://schemas.openxmlformats.org/officeDocument/2006/customXml" ds:itemID="{767C30FE-3B3A-4F21-844A-AB59F94E4161}">
-  <ds:schemaRefs>
-    <ds:schemaRef ds:uri="http://schemas.microsoft.com/VisualStudio/2011/storyboarding/control"/>
-  </ds:schemaRefs>
-</ds:datastoreItem>
-</file>
-
-<file path=customXml/itemProps39.xml><?xml version="1.0" encoding="utf-8"?>
-<ds:datastoreItem xmlns:ds="http://schemas.openxmlformats.org/officeDocument/2006/customXml" ds:itemID="{A4268BD8-7853-4881-9E53-4FE1E08A411E}">
-  <ds:schemaRefs>
-    <ds:schemaRef ds:uri="http://schemas.microsoft.com/VisualStudio/2011/storyboarding/control"/>
-  </ds:schemaRefs>
-</ds:datastoreItem>
-</file>
-
-<file path=customXml/itemProps4.xml><?xml version="1.0" encoding="utf-8"?>
-<ds:datastoreItem xmlns:ds="http://schemas.openxmlformats.org/officeDocument/2006/customXml" ds:itemID="{BA7FA624-CB09-44D6-8994-2F6E015D448E}">
-  <ds:schemaRefs>
-    <ds:schemaRef ds:uri="http://schemas.microsoft.com/VisualStudio/2011/storyboarding/control"/>
-  </ds:schemaRefs>
-</ds:datastoreItem>
-</file>
-
-<file path=customXml/itemProps40.xml><?xml version="1.0" encoding="utf-8"?>
-<ds:datastoreItem xmlns:ds="http://schemas.openxmlformats.org/officeDocument/2006/customXml" ds:itemID="{17887D8F-4CC8-4617-868E-91CB574B7BF1}">
-  <ds:schemaRefs>
-    <ds:schemaRef ds:uri="http://schemas.microsoft.com/VisualStudio/2011/storyboarding/control"/>
-  </ds:schemaRefs>
-</ds:datastoreItem>
-</file>
-
-<file path=customXml/itemProps41.xml><?xml version="1.0" encoding="utf-8"?>
-<ds:datastoreItem xmlns:ds="http://schemas.openxmlformats.org/officeDocument/2006/customXml" ds:itemID="{6D917542-4CB5-4F33-83FB-7158BE7AA367}">
-  <ds:schemaRefs>
-    <ds:schemaRef ds:uri="http://schemas.microsoft.com/VisualStudio/2011/storyboarding/control"/>
-  </ds:schemaRefs>
-</ds:datastoreItem>
-</file>
-
-<file path=customXml/itemProps42.xml><?xml version="1.0" encoding="utf-8"?>
+<file path=customXml/itemProps84.xml><?xml version="1.0" encoding="utf-8"?>
 <ds:datastoreItem xmlns:ds="http://schemas.openxmlformats.org/officeDocument/2006/customXml" ds:itemID="{07647DA0-E684-4907-8046-3DFC43ED9042}">
   <ds:schemaRefs>
     <ds:schemaRef ds:uri="http://schemas.microsoft.com/VisualStudio/2011/storyboarding/control"/>
@@ -10126,39 +10494,7 @@
 </ds:datastoreItem>
 </file>
 
-<file path=customXml/itemProps43.xml><?xml version="1.0" encoding="utf-8"?>
-<ds:datastoreItem xmlns:ds="http://schemas.openxmlformats.org/officeDocument/2006/customXml" ds:itemID="{7BED5AAF-A887-4928-BFF1-AA6F41EAC01E}">
-  <ds:schemaRefs>
-    <ds:schemaRef ds:uri="http://schemas.microsoft.com/VisualStudio/2011/storyboarding/control"/>
-  </ds:schemaRefs>
-</ds:datastoreItem>
-</file>
-
-<file path=customXml/itemProps44.xml><?xml version="1.0" encoding="utf-8"?>
-<ds:datastoreItem xmlns:ds="http://schemas.openxmlformats.org/officeDocument/2006/customXml" ds:itemID="{DCF09C28-3B24-44E3-BF7A-CA6BC9D292C3}">
-  <ds:schemaRefs>
-    <ds:schemaRef ds:uri="http://schemas.microsoft.com/VisualStudio/2011/storyboarding/control"/>
-  </ds:schemaRefs>
-</ds:datastoreItem>
-</file>
-
-<file path=customXml/itemProps45.xml><?xml version="1.0" encoding="utf-8"?>
-<ds:datastoreItem xmlns:ds="http://schemas.openxmlformats.org/officeDocument/2006/customXml" ds:itemID="{79342CAB-26BD-42C7-97B2-7342A28343AE}">
-  <ds:schemaRefs>
-    <ds:schemaRef ds:uri="http://schemas.microsoft.com/VisualStudio/2011/storyboarding/control"/>
-  </ds:schemaRefs>
-</ds:datastoreItem>
-</file>
-
-<file path=customXml/itemProps46.xml><?xml version="1.0" encoding="utf-8"?>
-<ds:datastoreItem xmlns:ds="http://schemas.openxmlformats.org/officeDocument/2006/customXml" ds:itemID="{4C05EC8C-ACA8-4019-9C83-70D84CC6A97D}">
-  <ds:schemaRefs>
-    <ds:schemaRef ds:uri="http://schemas.microsoft.com/VisualStudio/2011/storyboarding/control"/>
-  </ds:schemaRefs>
-</ds:datastoreItem>
-</file>
-
-<file path=customXml/itemProps47.xml><?xml version="1.0" encoding="utf-8"?>
+<file path=customXml/itemProps85.xml><?xml version="1.0" encoding="utf-8"?>
 <ds:datastoreItem xmlns:ds="http://schemas.openxmlformats.org/officeDocument/2006/customXml" ds:itemID="{FDA6DE73-A91D-4E02-94C3-C6DB0DC6D010}">
   <ds:schemaRefs>
     <ds:schemaRef ds:uri="http://schemas.microsoft.com/VisualStudio/2011/storyboarding/control"/>
@@ -10166,31 +10502,7 @@
 </ds:datastoreItem>
 </file>
 
-<file path=customXml/itemProps48.xml><?xml version="1.0" encoding="utf-8"?>
-<ds:datastoreItem xmlns:ds="http://schemas.openxmlformats.org/officeDocument/2006/customXml" ds:itemID="{6ED5C25D-E4FB-497F-A571-D33B7D1E81C6}">
-  <ds:schemaRefs>
-    <ds:schemaRef ds:uri="http://schemas.microsoft.com/VisualStudio/2011/storyboarding/control"/>
-  </ds:schemaRefs>
-</ds:datastoreItem>
-</file>
-
-<file path=customXml/itemProps49.xml><?xml version="1.0" encoding="utf-8"?>
-<ds:datastoreItem xmlns:ds="http://schemas.openxmlformats.org/officeDocument/2006/customXml" ds:itemID="{581C7DE6-5844-4025-8BA4-BE4D62ED991F}">
-  <ds:schemaRefs>
-    <ds:schemaRef ds:uri="http://schemas.microsoft.com/VisualStudio/2011/storyboarding/control"/>
-  </ds:schemaRefs>
-</ds:datastoreItem>
-</file>
-
-<file path=customXml/itemProps5.xml><?xml version="1.0" encoding="utf-8"?>
-<ds:datastoreItem xmlns:ds="http://schemas.openxmlformats.org/officeDocument/2006/customXml" ds:itemID="{328B6E1D-0753-426C-BAEA-4AAB939DA580}">
-  <ds:schemaRefs>
-    <ds:schemaRef ds:uri="http://schemas.microsoft.com/VisualStudio/2011/storyboarding/control"/>
-  </ds:schemaRefs>
-</ds:datastoreItem>
-</file>
-
-<file path=customXml/itemProps50.xml><?xml version="1.0" encoding="utf-8"?>
+<file path=customXml/itemProps86.xml><?xml version="1.0" encoding="utf-8"?>
 <ds:datastoreItem xmlns:ds="http://schemas.openxmlformats.org/officeDocument/2006/customXml" ds:itemID="{5B4794DC-66F7-4498-B3C3-DCD5F74D5FD8}">
   <ds:schemaRefs>
     <ds:schemaRef ds:uri="http://schemas.microsoft.com/VisualStudio/2011/storyboarding/control"/>
@@ -10198,39 +10510,7 @@
 </ds:datastoreItem>
 </file>
 
-<file path=customXml/itemProps51.xml><?xml version="1.0" encoding="utf-8"?>
-<ds:datastoreItem xmlns:ds="http://schemas.openxmlformats.org/officeDocument/2006/customXml" ds:itemID="{F1193E09-28D8-4D6A-BD76-F3CA7F0134F6}">
-  <ds:schemaRefs>
-    <ds:schemaRef ds:uri="http://schemas.microsoft.com/VisualStudio/2011/storyboarding/control"/>
-  </ds:schemaRefs>
-</ds:datastoreItem>
-</file>
-
-<file path=customXml/itemProps52.xml><?xml version="1.0" encoding="utf-8"?>
-<ds:datastoreItem xmlns:ds="http://schemas.openxmlformats.org/officeDocument/2006/customXml" ds:itemID="{9C6A7914-511A-42E6-908E-AEFBA51CB63F}">
-  <ds:schemaRefs>
-    <ds:schemaRef ds:uri="http://schemas.microsoft.com/VisualStudio/2011/storyboarding/control"/>
-  </ds:schemaRefs>
-</ds:datastoreItem>
-</file>
-
-<file path=customXml/itemProps53.xml><?xml version="1.0" encoding="utf-8"?>
-<ds:datastoreItem xmlns:ds="http://schemas.openxmlformats.org/officeDocument/2006/customXml" ds:itemID="{ECD73F77-92DD-4C21-92E5-429F75002F17}">
-  <ds:schemaRefs>
-    <ds:schemaRef ds:uri="http://schemas.microsoft.com/VisualStudio/2011/storyboarding/control"/>
-  </ds:schemaRefs>
-</ds:datastoreItem>
-</file>
-
-<file path=customXml/itemProps54.xml><?xml version="1.0" encoding="utf-8"?>
-<ds:datastoreItem xmlns:ds="http://schemas.openxmlformats.org/officeDocument/2006/customXml" ds:itemID="{B6D3FCD1-1D67-4BCA-8C64-D3FAB60D9726}">
-  <ds:schemaRefs>
-    <ds:schemaRef ds:uri="http://schemas.microsoft.com/VisualStudio/2011/storyboarding/control"/>
-  </ds:schemaRefs>
-</ds:datastoreItem>
-</file>
-
-<file path=customXml/itemProps55.xml><?xml version="1.0" encoding="utf-8"?>
+<file path=customXml/itemProps87.xml><?xml version="1.0" encoding="utf-8"?>
 <ds:datastoreItem xmlns:ds="http://schemas.openxmlformats.org/officeDocument/2006/customXml" ds:itemID="{1572FC1B-ECED-45E5-A387-4981CB104905}">
   <ds:schemaRefs>
     <ds:schemaRef ds:uri="http://schemas.microsoft.com/VisualStudio/2011/storyboarding/control"/>
@@ -10238,71 +10518,7 @@
 </ds:datastoreItem>
 </file>
 
-<file path=customXml/itemProps56.xml><?xml version="1.0" encoding="utf-8"?>
-<ds:datastoreItem xmlns:ds="http://schemas.openxmlformats.org/officeDocument/2006/customXml" ds:itemID="{5DABBEE4-57BD-45BC-A909-91BEE00F4D9D}">
-  <ds:schemaRefs>
-    <ds:schemaRef ds:uri="http://schemas.microsoft.com/VisualStudio/2011/storyboarding/control"/>
-  </ds:schemaRefs>
-</ds:datastoreItem>
-</file>
-
-<file path=customXml/itemProps57.xml><?xml version="1.0" encoding="utf-8"?>
-<ds:datastoreItem xmlns:ds="http://schemas.openxmlformats.org/officeDocument/2006/customXml" ds:itemID="{C64738E3-6587-4CA4-848D-91D0AFDA1A6D}">
-  <ds:schemaRefs>
-    <ds:schemaRef ds:uri="http://schemas.microsoft.com/VisualStudio/2011/storyboarding/control"/>
-  </ds:schemaRefs>
-</ds:datastoreItem>
-</file>
-
-<file path=customXml/itemProps58.xml><?xml version="1.0" encoding="utf-8"?>
-<ds:datastoreItem xmlns:ds="http://schemas.openxmlformats.org/officeDocument/2006/customXml" ds:itemID="{33F9240B-A1F1-4890-B5C1-DCFF5A6318AE}">
-  <ds:schemaRefs>
-    <ds:schemaRef ds:uri="http://schemas.microsoft.com/VisualStudio/2011/storyboarding/control"/>
-  </ds:schemaRefs>
-</ds:datastoreItem>
-</file>
-
-<file path=customXml/itemProps59.xml><?xml version="1.0" encoding="utf-8"?>
-<ds:datastoreItem xmlns:ds="http://schemas.openxmlformats.org/officeDocument/2006/customXml" ds:itemID="{AD83DFF5-57DB-43D9-8557-02521D85CE79}">
-  <ds:schemaRefs>
-    <ds:schemaRef ds:uri="http://schemas.microsoft.com/VisualStudio/2011/storyboarding/control"/>
-  </ds:schemaRefs>
-</ds:datastoreItem>
-</file>
-
-<file path=customXml/itemProps6.xml><?xml version="1.0" encoding="utf-8"?>
-<ds:datastoreItem xmlns:ds="http://schemas.openxmlformats.org/officeDocument/2006/customXml" ds:itemID="{ADFC0E54-32DF-4EF6-AA10-65C2084BA5CF}">
-  <ds:schemaRefs>
-    <ds:schemaRef ds:uri="http://schemas.microsoft.com/VisualStudio/2011/storyboarding/control"/>
-  </ds:schemaRefs>
-</ds:datastoreItem>
-</file>
-
-<file path=customXml/itemProps60.xml><?xml version="1.0" encoding="utf-8"?>
-<ds:datastoreItem xmlns:ds="http://schemas.openxmlformats.org/officeDocument/2006/customXml" ds:itemID="{69B6F2B9-DC41-419F-BF45-B4C3B79D72C8}">
-  <ds:schemaRefs>
-    <ds:schemaRef ds:uri="http://schemas.microsoft.com/VisualStudio/2011/storyboarding/control"/>
-  </ds:schemaRefs>
-</ds:datastoreItem>
-</file>
-
-<file path=customXml/itemProps61.xml><?xml version="1.0" encoding="utf-8"?>
-<ds:datastoreItem xmlns:ds="http://schemas.openxmlformats.org/officeDocument/2006/customXml" ds:itemID="{19BFF073-C4AE-48BB-B931-137F09A448CB}">
-  <ds:schemaRefs>
-    <ds:schemaRef ds:uri="http://schemas.microsoft.com/VisualStudio/2011/storyboarding/control"/>
-  </ds:schemaRefs>
-</ds:datastoreItem>
-</file>
-
-<file path=customXml/itemProps62.xml><?xml version="1.0" encoding="utf-8"?>
-<ds:datastoreItem xmlns:ds="http://schemas.openxmlformats.org/officeDocument/2006/customXml" ds:itemID="{DC354CCD-34CB-4038-9E97-5D641FC3188E}">
-  <ds:schemaRefs>
-    <ds:schemaRef ds:uri="http://schemas.microsoft.com/VisualStudio/2011/storyboarding/control"/>
-  </ds:schemaRefs>
-</ds:datastoreItem>
-</file>
-
-<file path=customXml/itemProps63.xml><?xml version="1.0" encoding="utf-8"?>
+<file path=customXml/itemProps88.xml><?xml version="1.0" encoding="utf-8"?>
 <ds:datastoreItem xmlns:ds="http://schemas.openxmlformats.org/officeDocument/2006/customXml" ds:itemID="{BEA4C740-500C-473C-84AE-9914EC453753}">
   <ds:schemaRefs>
     <ds:schemaRef ds:uri="http://schemas.microsoft.com/VisualStudio/2011/storyboarding/control"/>
@@ -10310,39 +10526,7 @@
 </ds:datastoreItem>
 </file>
 
-<file path=customXml/itemProps64.xml><?xml version="1.0" encoding="utf-8"?>
-<ds:datastoreItem xmlns:ds="http://schemas.openxmlformats.org/officeDocument/2006/customXml" ds:itemID="{E45C5231-5AD7-483C-88AF-E2C3D79A2934}">
-  <ds:schemaRefs>
-    <ds:schemaRef ds:uri="http://schemas.microsoft.com/VisualStudio/2011/storyboarding/control"/>
-  </ds:schemaRefs>
-</ds:datastoreItem>
-</file>
-
-<file path=customXml/itemProps65.xml><?xml version="1.0" encoding="utf-8"?>
-<ds:datastoreItem xmlns:ds="http://schemas.openxmlformats.org/officeDocument/2006/customXml" ds:itemID="{DCA7DBC9-E7E7-45F7-96F6-0FE75525CEC3}">
-  <ds:schemaRefs>
-    <ds:schemaRef ds:uri="http://schemas.microsoft.com/VisualStudio/2011/storyboarding/control"/>
-  </ds:schemaRefs>
-</ds:datastoreItem>
-</file>
-
-<file path=customXml/itemProps66.xml><?xml version="1.0" encoding="utf-8"?>
-<ds:datastoreItem xmlns:ds="http://schemas.openxmlformats.org/officeDocument/2006/customXml" ds:itemID="{4A64E2AC-D62A-494C-B40F-614637EDA4BC}">
-  <ds:schemaRefs>
-    <ds:schemaRef ds:uri="http://schemas.microsoft.com/VisualStudio/2011/storyboarding/control"/>
-  </ds:schemaRefs>
-</ds:datastoreItem>
-</file>
-
-<file path=customXml/itemProps67.xml><?xml version="1.0" encoding="utf-8"?>
-<ds:datastoreItem xmlns:ds="http://schemas.openxmlformats.org/officeDocument/2006/customXml" ds:itemID="{DCBF3B82-B87A-477C-A0E2-FAE47BAE2AFE}">
-  <ds:schemaRefs>
-    <ds:schemaRef ds:uri="http://schemas.microsoft.com/VisualStudio/2011/storyboarding/control"/>
-  </ds:schemaRefs>
-</ds:datastoreItem>
-</file>
-
-<file path=customXml/itemProps68.xml><?xml version="1.0" encoding="utf-8"?>
+<file path=customXml/itemProps89.xml><?xml version="1.0" encoding="utf-8"?>
 <ds:datastoreItem xmlns:ds="http://schemas.openxmlformats.org/officeDocument/2006/customXml" ds:itemID="{4F13B1CD-3D80-4353-A955-9FAE5724071A}">
   <ds:schemaRefs>
     <ds:schemaRef ds:uri="http://schemas.microsoft.com/VisualStudio/2011/storyboarding/control"/>
@@ -10350,192 +10534,8 @@
 </ds:datastoreItem>
 </file>
 
-<file path=customXml/itemProps69.xml><?xml version="1.0" encoding="utf-8"?>
-<ds:datastoreItem xmlns:ds="http://schemas.openxmlformats.org/officeDocument/2006/customXml" ds:itemID="{D9902FB6-2525-4994-B39F-C5A28D8845BE}">
-  <ds:schemaRefs>
-    <ds:schemaRef ds:uri="http://schemas.microsoft.com/VisualStudio/2011/storyboarding/control"/>
-  </ds:schemaRefs>
-</ds:datastoreItem>
-</file>
-
-<file path=customXml/itemProps7.xml><?xml version="1.0" encoding="utf-8"?>
-<ds:datastoreItem xmlns:ds="http://schemas.openxmlformats.org/officeDocument/2006/customXml" ds:itemID="{D1ACB713-CD12-472D-9AC5-BEBD9BEDA96D}">
-  <ds:schemaRefs>
-    <ds:schemaRef ds:uri="http://schemas.microsoft.com/VisualStudio/2011/storyboarding/control"/>
-  </ds:schemaRefs>
-</ds:datastoreItem>
-</file>
-
-<file path=customXml/itemProps70.xml><?xml version="1.0" encoding="utf-8"?>
-<ds:datastoreItem xmlns:ds="http://schemas.openxmlformats.org/officeDocument/2006/customXml" ds:itemID="{74FA862F-2270-42C7-94BA-05FAE460400B}">
-  <ds:schemaRefs>
-    <ds:schemaRef ds:uri="http://schemas.microsoft.com/VisualStudio/2011/storyboarding/control"/>
-  </ds:schemaRefs>
-</ds:datastoreItem>
-</file>
-
-<file path=customXml/itemProps71.xml><?xml version="1.0" encoding="utf-8"?>
-<ds:datastoreItem xmlns:ds="http://schemas.openxmlformats.org/officeDocument/2006/customXml" ds:itemID="{1FC499BC-B9AC-4176-8DBF-CE3270ED72C9}">
-  <ds:schemaRefs>
-    <ds:schemaRef ds:uri="http://schemas.microsoft.com/VisualStudio/2011/storyboarding/control"/>
-  </ds:schemaRefs>
-</ds:datastoreItem>
-</file>
-
-<file path=customXml/itemProps72.xml><?xml version="1.0" encoding="utf-8"?>
-<ds:datastoreItem xmlns:ds="http://schemas.openxmlformats.org/officeDocument/2006/customXml" ds:itemID="{5C77B942-C8F3-4BD4-8F58-308320A4A91D}">
-  <ds:schemaRefs>
-    <ds:schemaRef ds:uri="http://schemas.microsoft.com/VisualStudio/2011/storyboarding/control"/>
-  </ds:schemaRefs>
-</ds:datastoreItem>
-</file>
-
-<file path=customXml/itemProps73.xml><?xml version="1.0" encoding="utf-8"?>
-<ds:datastoreItem xmlns:ds="http://schemas.openxmlformats.org/officeDocument/2006/customXml" ds:itemID="{612C3170-3E5D-4B6F-AB08-FAAC8693224E}">
-  <ds:schemaRefs>
-    <ds:schemaRef ds:uri="http://schemas.microsoft.com/VisualStudio/2011/storyboarding/control"/>
-  </ds:schemaRefs>
-</ds:datastoreItem>
-</file>
-
-<file path=customXml/itemProps74.xml><?xml version="1.0" encoding="utf-8"?>
-<ds:datastoreItem xmlns:ds="http://schemas.openxmlformats.org/officeDocument/2006/customXml" ds:itemID="{0A823B61-779C-4D48-8EA7-4CF7BA23E8BD}">
-  <ds:schemaRefs>
-    <ds:schemaRef ds:uri="http://schemas.microsoft.com/VisualStudio/2011/storyboarding/control"/>
-  </ds:schemaRefs>
-</ds:datastoreItem>
-</file>
-
-<file path=customXml/itemProps75.xml><?xml version="1.0" encoding="utf-8"?>
-<ds:datastoreItem xmlns:ds="http://schemas.openxmlformats.org/officeDocument/2006/customXml" ds:itemID="{EAEA75B6-A05A-46AD-8999-E1144746839A}">
-  <ds:schemaRefs>
-    <ds:schemaRef ds:uri="http://schemas.microsoft.com/VisualStudio/2011/storyboarding/control"/>
-  </ds:schemaRefs>
-</ds:datastoreItem>
-</file>
-
-<file path=customXml/itemProps76.xml><?xml version="1.0" encoding="utf-8"?>
-<ds:datastoreItem xmlns:ds="http://schemas.openxmlformats.org/officeDocument/2006/customXml" ds:itemID="{5E15C4C1-7DC4-400D-83E2-CC75065C5F26}">
-  <ds:schemaRefs>
-    <ds:schemaRef ds:uri="http://schemas.microsoft.com/VisualStudio/2011/storyboarding/control"/>
-  </ds:schemaRefs>
-</ds:datastoreItem>
-</file>
-
-<file path=customXml/itemProps77.xml><?xml version="1.0" encoding="utf-8"?>
-<ds:datastoreItem xmlns:ds="http://schemas.openxmlformats.org/officeDocument/2006/customXml" ds:itemID="{562ACCBE-45D0-481A-9D8E-F557CFF8F221}">
-  <ds:schemaRefs>
-    <ds:schemaRef ds:uri="http://schemas.microsoft.com/VisualStudio/2011/storyboarding/control"/>
-  </ds:schemaRefs>
-</ds:datastoreItem>
-</file>
-
-<file path=customXml/itemProps78.xml><?xml version="1.0" encoding="utf-8"?>
-<ds:datastoreItem xmlns:ds="http://schemas.openxmlformats.org/officeDocument/2006/customXml" ds:itemID="{3105808A-F8E4-4B7C-BA46-C221EDA3D356}">
-  <ds:schemaRefs>
-    <ds:schemaRef ds:uri="http://schemas.microsoft.com/VisualStudio/2011/storyboarding/control"/>
-  </ds:schemaRefs>
-</ds:datastoreItem>
-</file>
-
-<file path=customXml/itemProps79.xml><?xml version="1.0" encoding="utf-8"?>
-<ds:datastoreItem xmlns:ds="http://schemas.openxmlformats.org/officeDocument/2006/customXml" ds:itemID="{2C0761D8-5FCB-4134-8B9E-19569EB02B32}">
-  <ds:schemaRefs>
-    <ds:schemaRef ds:uri="http://schemas.microsoft.com/VisualStudio/2011/storyboarding/control"/>
-  </ds:schemaRefs>
-</ds:datastoreItem>
-</file>
-
-<file path=customXml/itemProps8.xml><?xml version="1.0" encoding="utf-8"?>
-<ds:datastoreItem xmlns:ds="http://schemas.openxmlformats.org/officeDocument/2006/customXml" ds:itemID="{3A4B9090-FA2C-4120-907D-9A914A5A1DCD}">
-  <ds:schemaRefs>
-    <ds:schemaRef ds:uri="http://schemas.microsoft.com/VisualStudio/2011/storyboarding/control"/>
-  </ds:schemaRefs>
-</ds:datastoreItem>
-</file>
-
-<file path=customXml/itemProps80.xml><?xml version="1.0" encoding="utf-8"?>
-<ds:datastoreItem xmlns:ds="http://schemas.openxmlformats.org/officeDocument/2006/customXml" ds:itemID="{2A81C5BB-30D6-4F7B-8126-E973D833C10A}">
-  <ds:schemaRefs>
-    <ds:schemaRef ds:uri="http://schemas.microsoft.com/VisualStudio/2011/storyboarding/control"/>
-  </ds:schemaRefs>
-</ds:datastoreItem>
-</file>
-
-<file path=customXml/itemProps81.xml><?xml version="1.0" encoding="utf-8"?>
-<ds:datastoreItem xmlns:ds="http://schemas.openxmlformats.org/officeDocument/2006/customXml" ds:itemID="{CA0BFCDC-CA14-4412-ACD5-B19572428A30}">
-  <ds:schemaRefs>
-    <ds:schemaRef ds:uri="http://schemas.microsoft.com/VisualStudio/2011/storyboarding/control"/>
-  </ds:schemaRefs>
-</ds:datastoreItem>
-</file>
-
-<file path=customXml/itemProps82.xml><?xml version="1.0" encoding="utf-8"?>
-<ds:datastoreItem xmlns:ds="http://schemas.openxmlformats.org/officeDocument/2006/customXml" ds:itemID="{C319B4A2-3D63-4983-B472-838D460D4499}">
-  <ds:schemaRefs>
-    <ds:schemaRef ds:uri="http://schemas.microsoft.com/VisualStudio/2011/storyboarding/control"/>
-  </ds:schemaRefs>
-</ds:datastoreItem>
-</file>
-
-<file path=customXml/itemProps83.xml><?xml version="1.0" encoding="utf-8"?>
-<ds:datastoreItem xmlns:ds="http://schemas.openxmlformats.org/officeDocument/2006/customXml" ds:itemID="{91ED9130-D964-4E58-94E1-100812A62FA4}">
-  <ds:schemaRefs>
-    <ds:schemaRef ds:uri="http://schemas.microsoft.com/VisualStudio/2011/storyboarding/control"/>
-  </ds:schemaRefs>
-</ds:datastoreItem>
-</file>
-
-<file path=customXml/itemProps84.xml><?xml version="1.0" encoding="utf-8"?>
-<ds:datastoreItem xmlns:ds="http://schemas.openxmlformats.org/officeDocument/2006/customXml" ds:itemID="{59D0772F-AC15-494E-909A-5BCC245ABAE9}">
-  <ds:schemaRefs>
-    <ds:schemaRef ds:uri="http://schemas.microsoft.com/VisualStudio/2011/storyboarding/control"/>
-  </ds:schemaRefs>
-</ds:datastoreItem>
-</file>
-
-<file path=customXml/itemProps85.xml><?xml version="1.0" encoding="utf-8"?>
-<ds:datastoreItem xmlns:ds="http://schemas.openxmlformats.org/officeDocument/2006/customXml" ds:itemID="{DB44F08D-A554-4DAE-AB92-9F19A0AF0E0F}">
-  <ds:schemaRefs>
-    <ds:schemaRef ds:uri="http://schemas.microsoft.com/VisualStudio/2011/storyboarding/control"/>
-  </ds:schemaRefs>
-</ds:datastoreItem>
-</file>
-
-<file path=customXml/itemProps86.xml><?xml version="1.0" encoding="utf-8"?>
-<ds:datastoreItem xmlns:ds="http://schemas.openxmlformats.org/officeDocument/2006/customXml" ds:itemID="{D9BEE98F-34AD-4470-830C-0712E5B34DAB}">
-  <ds:schemaRefs>
-    <ds:schemaRef ds:uri="http://schemas.microsoft.com/VisualStudio/2011/storyboarding/control"/>
-  </ds:schemaRefs>
-</ds:datastoreItem>
-</file>
-
-<file path=customXml/itemProps87.xml><?xml version="1.0" encoding="utf-8"?>
-<ds:datastoreItem xmlns:ds="http://schemas.openxmlformats.org/officeDocument/2006/customXml" ds:itemID="{61A4FFB8-8D16-40C7-B4D8-66678F0EE78F}">
-  <ds:schemaRefs>
-    <ds:schemaRef ds:uri="http://schemas.microsoft.com/VisualStudio/2011/storyboarding/control"/>
-  </ds:schemaRefs>
-</ds:datastoreItem>
-</file>
-
-<file path=customXml/itemProps88.xml><?xml version="1.0" encoding="utf-8"?>
-<ds:datastoreItem xmlns:ds="http://schemas.openxmlformats.org/officeDocument/2006/customXml" ds:itemID="{501253E0-06C6-4CEC-8FFC-EEC832BFF7AD}">
-  <ds:schemaRefs>
-    <ds:schemaRef ds:uri="http://schemas.microsoft.com/VisualStudio/2011/storyboarding/control"/>
-  </ds:schemaRefs>
-</ds:datastoreItem>
-</file>
-
-<file path=customXml/itemProps89.xml><?xml version="1.0" encoding="utf-8"?>
-<ds:datastoreItem xmlns:ds="http://schemas.openxmlformats.org/officeDocument/2006/customXml" ds:itemID="{D32E724C-A4FF-4612-9996-DD4AED58BA62}">
-  <ds:schemaRefs>
-    <ds:schemaRef ds:uri="http://schemas.microsoft.com/VisualStudio/2011/storyboarding/control"/>
-  </ds:schemaRefs>
-</ds:datastoreItem>
-</file>
-
 <file path=customXml/itemProps9.xml><?xml version="1.0" encoding="utf-8"?>
-<ds:datastoreItem xmlns:ds="http://schemas.openxmlformats.org/officeDocument/2006/customXml" ds:itemID="{AAAD0EC6-A22B-48B1-82D8-79572FE29363}">
+<ds:datastoreItem xmlns:ds="http://schemas.openxmlformats.org/officeDocument/2006/customXml" ds:itemID="{76F1EE43-31A0-4919-A618-DFAA86460D6E}">
   <ds:schemaRefs>
     <ds:schemaRef ds:uri="http://schemas.microsoft.com/VisualStudio/2011/storyboarding/control"/>
   </ds:schemaRefs>

</xml_diff>